<commit_message>
- XGI PLC : XGI xml 생성 expression 중복 bug fix.  xml comment 생성 코드 제거.
</commit_message>
<xml_diff>
--- a/DsDotNet/src/PLC/PLC.CodeGen.LSXGI/Documents/XgiLadder.pptx
+++ b/DsDotNet/src/PLC/PLC.CodeGen.LSXGI/Documents/XgiLadder.pptx
@@ -6,7 +6,8 @@
   </p:sldMasterIdLst>
   <p:sldIdLst>
     <p:sldId id="256" r:id="rId2"/>
-    <p:sldId id="257" r:id="rId3"/>
+    <p:sldId id="258" r:id="rId3"/>
+    <p:sldId id="257" r:id="rId4"/>
   </p:sldIdLst>
   <p:sldSz cx="12192000" cy="6858000"/>
   <p:notesSz cx="6858000" cy="9144000"/>
@@ -105,6 +106,11 @@
       </a:defRPr>
     </a:lvl9pPr>
   </p:defaultTextStyle>
+  <p:extLst>
+    <p:ext uri="{EFAFB233-063F-42B5-8137-9DF3F51BA10A}">
+      <p15:sldGuideLst xmlns:p15="http://schemas.microsoft.com/office/powerpoint/2012/main"/>
+    </p:ext>
+  </p:extLst>
 </p:presentation>
 </file>
 
@@ -255,7 +261,7 @@
           <a:p>
             <a:fld id="{A371AD95-3711-4947-8024-9511B852D977}" type="datetimeFigureOut">
               <a:rPr lang="ko-KR" altLang="en-US" smtClean="0"/>
-              <a:t>2023-01-03</a:t>
+              <a:t>2023-01-05</a:t>
             </a:fld>
             <a:endParaRPr lang="ko-KR" altLang="en-US"/>
           </a:p>
@@ -453,7 +459,7 @@
           <a:p>
             <a:fld id="{A371AD95-3711-4947-8024-9511B852D977}" type="datetimeFigureOut">
               <a:rPr lang="ko-KR" altLang="en-US" smtClean="0"/>
-              <a:t>2023-01-03</a:t>
+              <a:t>2023-01-05</a:t>
             </a:fld>
             <a:endParaRPr lang="ko-KR" altLang="en-US"/>
           </a:p>
@@ -661,7 +667,7 @@
           <a:p>
             <a:fld id="{A371AD95-3711-4947-8024-9511B852D977}" type="datetimeFigureOut">
               <a:rPr lang="ko-KR" altLang="en-US" smtClean="0"/>
-              <a:t>2023-01-03</a:t>
+              <a:t>2023-01-05</a:t>
             </a:fld>
             <a:endParaRPr lang="ko-KR" altLang="en-US"/>
           </a:p>
@@ -859,7 +865,7 @@
           <a:p>
             <a:fld id="{A371AD95-3711-4947-8024-9511B852D977}" type="datetimeFigureOut">
               <a:rPr lang="ko-KR" altLang="en-US" smtClean="0"/>
-              <a:t>2023-01-03</a:t>
+              <a:t>2023-01-05</a:t>
             </a:fld>
             <a:endParaRPr lang="ko-KR" altLang="en-US"/>
           </a:p>
@@ -1134,7 +1140,7 @@
           <a:p>
             <a:fld id="{A371AD95-3711-4947-8024-9511B852D977}" type="datetimeFigureOut">
               <a:rPr lang="ko-KR" altLang="en-US" smtClean="0"/>
-              <a:t>2023-01-03</a:t>
+              <a:t>2023-01-05</a:t>
             </a:fld>
             <a:endParaRPr lang="ko-KR" altLang="en-US"/>
           </a:p>
@@ -1399,7 +1405,7 @@
           <a:p>
             <a:fld id="{A371AD95-3711-4947-8024-9511B852D977}" type="datetimeFigureOut">
               <a:rPr lang="ko-KR" altLang="en-US" smtClean="0"/>
-              <a:t>2023-01-03</a:t>
+              <a:t>2023-01-05</a:t>
             </a:fld>
             <a:endParaRPr lang="ko-KR" altLang="en-US"/>
           </a:p>
@@ -1811,7 +1817,7 @@
           <a:p>
             <a:fld id="{A371AD95-3711-4947-8024-9511B852D977}" type="datetimeFigureOut">
               <a:rPr lang="ko-KR" altLang="en-US" smtClean="0"/>
-              <a:t>2023-01-03</a:t>
+              <a:t>2023-01-05</a:t>
             </a:fld>
             <a:endParaRPr lang="ko-KR" altLang="en-US"/>
           </a:p>
@@ -1952,7 +1958,7 @@
           <a:p>
             <a:fld id="{A371AD95-3711-4947-8024-9511B852D977}" type="datetimeFigureOut">
               <a:rPr lang="ko-KR" altLang="en-US" smtClean="0"/>
-              <a:t>2023-01-03</a:t>
+              <a:t>2023-01-05</a:t>
             </a:fld>
             <a:endParaRPr lang="ko-KR" altLang="en-US"/>
           </a:p>
@@ -2065,7 +2071,7 @@
           <a:p>
             <a:fld id="{A371AD95-3711-4947-8024-9511B852D977}" type="datetimeFigureOut">
               <a:rPr lang="ko-KR" altLang="en-US" smtClean="0"/>
-              <a:t>2023-01-03</a:t>
+              <a:t>2023-01-05</a:t>
             </a:fld>
             <a:endParaRPr lang="ko-KR" altLang="en-US"/>
           </a:p>
@@ -2376,7 +2382,7 @@
           <a:p>
             <a:fld id="{A371AD95-3711-4947-8024-9511B852D977}" type="datetimeFigureOut">
               <a:rPr lang="ko-KR" altLang="en-US" smtClean="0"/>
-              <a:t>2023-01-03</a:t>
+              <a:t>2023-01-05</a:t>
             </a:fld>
             <a:endParaRPr lang="ko-KR" altLang="en-US"/>
           </a:p>
@@ -2664,7 +2670,7 @@
           <a:p>
             <a:fld id="{A371AD95-3711-4947-8024-9511B852D977}" type="datetimeFigureOut">
               <a:rPr lang="ko-KR" altLang="en-US" smtClean="0"/>
-              <a:t>2023-01-03</a:t>
+              <a:t>2023-01-05</a:t>
             </a:fld>
             <a:endParaRPr lang="ko-KR" altLang="en-US"/>
           </a:p>
@@ -2905,7 +2911,7 @@
           <a:p>
             <a:fld id="{A371AD95-3711-4947-8024-9511B852D977}" type="datetimeFigureOut">
               <a:rPr lang="ko-KR" altLang="en-US" smtClean="0"/>
-              <a:t>2023-01-03</a:t>
+              <a:t>2023-01-05</a:t>
             </a:fld>
             <a:endParaRPr lang="ko-KR" altLang="en-US"/>
           </a:p>
@@ -3427,6 +3433,1270 @@
           <p:cNvPr id="2" name="제목 1">
             <a:extLst>
               <a:ext uri="{FF2B5EF4-FFF2-40B4-BE49-F238E27FC236}">
+                <a16:creationId xmlns:a16="http://schemas.microsoft.com/office/drawing/2014/main" id="{D8976606-EA2E-337A-AE61-D69B13956565}"/>
+              </a:ext>
+            </a:extLst>
+          </p:cNvPr>
+          <p:cNvSpPr>
+            <a:spLocks noGrp="1"/>
+          </p:cNvSpPr>
+          <p:nvPr>
+            <p:ph type="title"/>
+          </p:nvPr>
+        </p:nvSpPr>
+        <p:spPr/>
+        <p:txBody>
+          <a:bodyPr/>
+          <a:lstStyle/>
+          <a:p>
+            <a:endParaRPr lang="ko-KR" altLang="en-US"/>
+          </a:p>
+        </p:txBody>
+      </p:sp>
+      <p:pic>
+        <p:nvPicPr>
+          <p:cNvPr id="5" name="그림 4">
+            <a:extLst>
+              <a:ext uri="{FF2B5EF4-FFF2-40B4-BE49-F238E27FC236}">
+                <a16:creationId xmlns:a16="http://schemas.microsoft.com/office/drawing/2014/main" id="{CD509B58-2C42-28C2-42F4-9A6E02FB9D00}"/>
+              </a:ext>
+            </a:extLst>
+          </p:cNvPr>
+          <p:cNvPicPr>
+            <a:picLocks noChangeAspect="1"/>
+          </p:cNvPicPr>
+          <p:nvPr/>
+        </p:nvPicPr>
+        <p:blipFill>
+          <a:blip r:embed="rId2"/>
+          <a:stretch>
+            <a:fillRect/>
+          </a:stretch>
+        </p:blipFill>
+        <p:spPr>
+          <a:xfrm>
+            <a:off x="1530317" y="2641049"/>
+            <a:ext cx="4410075" cy="1781175"/>
+          </a:xfrm>
+          <a:prstGeom prst="rect">
+            <a:avLst/>
+          </a:prstGeom>
+        </p:spPr>
+      </p:pic>
+      <p:cxnSp>
+        <p:nvCxnSpPr>
+          <p:cNvPr id="7" name="직선 연결선 6">
+            <a:extLst>
+              <a:ext uri="{FF2B5EF4-FFF2-40B4-BE49-F238E27FC236}">
+                <a16:creationId xmlns:a16="http://schemas.microsoft.com/office/drawing/2014/main" id="{F1EA4335-B584-FE7A-BFD4-7DF158D481D1}"/>
+              </a:ext>
+            </a:extLst>
+          </p:cNvPr>
+          <p:cNvCxnSpPr/>
+          <p:nvPr/>
+        </p:nvCxnSpPr>
+        <p:spPr>
+          <a:xfrm>
+            <a:off x="3424335" y="2444620"/>
+            <a:ext cx="0" cy="2323323"/>
+          </a:xfrm>
+          <a:prstGeom prst="line">
+            <a:avLst/>
+          </a:prstGeom>
+        </p:spPr>
+        <p:style>
+          <a:lnRef idx="1">
+            <a:schemeClr val="accent1"/>
+          </a:lnRef>
+          <a:fillRef idx="0">
+            <a:schemeClr val="accent1"/>
+          </a:fillRef>
+          <a:effectRef idx="0">
+            <a:schemeClr val="accent1"/>
+          </a:effectRef>
+          <a:fontRef idx="minor">
+            <a:schemeClr val="tx1"/>
+          </a:fontRef>
+        </p:style>
+      </p:cxnSp>
+      <p:cxnSp>
+        <p:nvCxnSpPr>
+          <p:cNvPr id="8" name="직선 연결선 7">
+            <a:extLst>
+              <a:ext uri="{FF2B5EF4-FFF2-40B4-BE49-F238E27FC236}">
+                <a16:creationId xmlns:a16="http://schemas.microsoft.com/office/drawing/2014/main" id="{CB0E0000-D1DD-2EE6-845D-81102A407A03}"/>
+              </a:ext>
+            </a:extLst>
+          </p:cNvPr>
+          <p:cNvCxnSpPr/>
+          <p:nvPr/>
+        </p:nvCxnSpPr>
+        <p:spPr>
+          <a:xfrm>
+            <a:off x="4481899" y="2444619"/>
+            <a:ext cx="0" cy="2323323"/>
+          </a:xfrm>
+          <a:prstGeom prst="line">
+            <a:avLst/>
+          </a:prstGeom>
+        </p:spPr>
+        <p:style>
+          <a:lnRef idx="1">
+            <a:schemeClr val="accent1"/>
+          </a:lnRef>
+          <a:fillRef idx="0">
+            <a:schemeClr val="accent1"/>
+          </a:fillRef>
+          <a:effectRef idx="0">
+            <a:schemeClr val="accent1"/>
+          </a:effectRef>
+          <a:fontRef idx="minor">
+            <a:schemeClr val="tx1"/>
+          </a:fontRef>
+        </p:style>
+      </p:cxnSp>
+      <p:cxnSp>
+        <p:nvCxnSpPr>
+          <p:cNvPr id="9" name="직선 연결선 8">
+            <a:extLst>
+              <a:ext uri="{FF2B5EF4-FFF2-40B4-BE49-F238E27FC236}">
+                <a16:creationId xmlns:a16="http://schemas.microsoft.com/office/drawing/2014/main" id="{5ADE8566-062E-16A0-4F5D-C8823FAF0873}"/>
+              </a:ext>
+            </a:extLst>
+          </p:cNvPr>
+          <p:cNvCxnSpPr/>
+          <p:nvPr/>
+        </p:nvCxnSpPr>
+        <p:spPr>
+          <a:xfrm>
+            <a:off x="5507135" y="2444619"/>
+            <a:ext cx="0" cy="2323323"/>
+          </a:xfrm>
+          <a:prstGeom prst="line">
+            <a:avLst/>
+          </a:prstGeom>
+        </p:spPr>
+        <p:style>
+          <a:lnRef idx="1">
+            <a:schemeClr val="accent1"/>
+          </a:lnRef>
+          <a:fillRef idx="0">
+            <a:schemeClr val="accent1"/>
+          </a:fillRef>
+          <a:effectRef idx="0">
+            <a:schemeClr val="accent1"/>
+          </a:effectRef>
+          <a:fontRef idx="minor">
+            <a:schemeClr val="tx1"/>
+          </a:fontRef>
+        </p:style>
+      </p:cxnSp>
+      <p:sp>
+        <p:nvSpPr>
+          <p:cNvPr id="10" name="TextBox 9">
+            <a:extLst>
+              <a:ext uri="{FF2B5EF4-FFF2-40B4-BE49-F238E27FC236}">
+                <a16:creationId xmlns:a16="http://schemas.microsoft.com/office/drawing/2014/main" id="{3E6EBEF4-3BCA-9D6D-CD03-D296727D8628}"/>
+              </a:ext>
+            </a:extLst>
+          </p:cNvPr>
+          <p:cNvSpPr txBox="1"/>
+          <p:nvPr/>
+        </p:nvSpPr>
+        <p:spPr>
+          <a:xfrm>
+            <a:off x="775737" y="3377747"/>
+            <a:ext cx="451598" cy="307777"/>
+          </a:xfrm>
+          <a:prstGeom prst="rect">
+            <a:avLst/>
+          </a:prstGeom>
+          <a:noFill/>
+        </p:spPr>
+        <p:txBody>
+          <a:bodyPr wrap="none" rtlCol="0">
+            <a:spAutoFit/>
+          </a:bodyPr>
+          <a:lstStyle/>
+          <a:p>
+            <a:r>
+              <a:rPr lang="en-US" altLang="ko-KR" sz="1400" dirty="0"/>
+              <a:t>Ly7</a:t>
+            </a:r>
+            <a:endParaRPr lang="ko-KR" altLang="en-US" sz="1400" dirty="0"/>
+          </a:p>
+        </p:txBody>
+      </p:sp>
+      <p:sp>
+        <p:nvSpPr>
+          <p:cNvPr id="11" name="TextBox 10">
+            <a:extLst>
+              <a:ext uri="{FF2B5EF4-FFF2-40B4-BE49-F238E27FC236}">
+                <a16:creationId xmlns:a16="http://schemas.microsoft.com/office/drawing/2014/main" id="{55C4E4E4-CB76-98DE-ECD2-EAB1DCD7E47A}"/>
+              </a:ext>
+            </a:extLst>
+          </p:cNvPr>
+          <p:cNvSpPr txBox="1"/>
+          <p:nvPr/>
+        </p:nvSpPr>
+        <p:spPr>
+          <a:xfrm>
+            <a:off x="770509" y="3927310"/>
+            <a:ext cx="451598" cy="307777"/>
+          </a:xfrm>
+          <a:prstGeom prst="rect">
+            <a:avLst/>
+          </a:prstGeom>
+          <a:noFill/>
+        </p:spPr>
+        <p:txBody>
+          <a:bodyPr wrap="none" rtlCol="0">
+            <a:spAutoFit/>
+          </a:bodyPr>
+          <a:lstStyle/>
+          <a:p>
+            <a:r>
+              <a:rPr lang="en-US" altLang="ko-KR" sz="1400" dirty="0"/>
+              <a:t>Ly8</a:t>
+            </a:r>
+            <a:endParaRPr lang="ko-KR" altLang="en-US" sz="1400" dirty="0"/>
+          </a:p>
+        </p:txBody>
+      </p:sp>
+      <p:sp>
+        <p:nvSpPr>
+          <p:cNvPr id="12" name="TextBox 11">
+            <a:extLst>
+              <a:ext uri="{FF2B5EF4-FFF2-40B4-BE49-F238E27FC236}">
+                <a16:creationId xmlns:a16="http://schemas.microsoft.com/office/drawing/2014/main" id="{D456C1B6-FB6A-9D09-0102-91B74D0AF209}"/>
+              </a:ext>
+            </a:extLst>
+          </p:cNvPr>
+          <p:cNvSpPr txBox="1"/>
+          <p:nvPr/>
+        </p:nvSpPr>
+        <p:spPr>
+          <a:xfrm>
+            <a:off x="2669755" y="2290730"/>
+            <a:ext cx="451598" cy="307777"/>
+          </a:xfrm>
+          <a:prstGeom prst="rect">
+            <a:avLst/>
+          </a:prstGeom>
+          <a:noFill/>
+        </p:spPr>
+        <p:txBody>
+          <a:bodyPr wrap="none" rtlCol="0">
+            <a:spAutoFit/>
+          </a:bodyPr>
+          <a:lstStyle/>
+          <a:p>
+            <a:r>
+              <a:rPr lang="en-US" altLang="ko-KR" sz="1400" dirty="0"/>
+              <a:t>Lx0</a:t>
+            </a:r>
+            <a:endParaRPr lang="ko-KR" altLang="en-US" sz="1400" dirty="0"/>
+          </a:p>
+        </p:txBody>
+      </p:sp>
+      <p:sp>
+        <p:nvSpPr>
+          <p:cNvPr id="13" name="TextBox 12">
+            <a:extLst>
+              <a:ext uri="{FF2B5EF4-FFF2-40B4-BE49-F238E27FC236}">
+                <a16:creationId xmlns:a16="http://schemas.microsoft.com/office/drawing/2014/main" id="{7D0E1A7A-79A9-3D55-6B8B-38777C59974D}"/>
+              </a:ext>
+            </a:extLst>
+          </p:cNvPr>
+          <p:cNvSpPr txBox="1"/>
+          <p:nvPr/>
+        </p:nvSpPr>
+        <p:spPr>
+          <a:xfrm>
+            <a:off x="3641724" y="2290729"/>
+            <a:ext cx="451598" cy="307777"/>
+          </a:xfrm>
+          <a:prstGeom prst="rect">
+            <a:avLst/>
+          </a:prstGeom>
+          <a:noFill/>
+        </p:spPr>
+        <p:txBody>
+          <a:bodyPr wrap="none" rtlCol="0">
+            <a:spAutoFit/>
+          </a:bodyPr>
+          <a:lstStyle/>
+          <a:p>
+            <a:r>
+              <a:rPr lang="en-US" altLang="ko-KR" sz="1400" dirty="0"/>
+              <a:t>Lx1</a:t>
+            </a:r>
+            <a:endParaRPr lang="ko-KR" altLang="en-US" sz="1400" dirty="0"/>
+          </a:p>
+        </p:txBody>
+      </p:sp>
+      <p:sp>
+        <p:nvSpPr>
+          <p:cNvPr id="14" name="TextBox 13">
+            <a:extLst>
+              <a:ext uri="{FF2B5EF4-FFF2-40B4-BE49-F238E27FC236}">
+                <a16:creationId xmlns:a16="http://schemas.microsoft.com/office/drawing/2014/main" id="{5AB1E381-8AF2-1847-9D37-BFF07AD88119}"/>
+              </a:ext>
+            </a:extLst>
+          </p:cNvPr>
+          <p:cNvSpPr txBox="1"/>
+          <p:nvPr/>
+        </p:nvSpPr>
+        <p:spPr>
+          <a:xfrm>
+            <a:off x="4767179" y="2290729"/>
+            <a:ext cx="451598" cy="307777"/>
+          </a:xfrm>
+          <a:prstGeom prst="rect">
+            <a:avLst/>
+          </a:prstGeom>
+          <a:noFill/>
+        </p:spPr>
+        <p:txBody>
+          <a:bodyPr wrap="none" rtlCol="0">
+            <a:spAutoFit/>
+          </a:bodyPr>
+          <a:lstStyle/>
+          <a:p>
+            <a:r>
+              <a:rPr lang="en-US" altLang="ko-KR" sz="1400" dirty="0"/>
+              <a:t>Lx2</a:t>
+            </a:r>
+            <a:endParaRPr lang="ko-KR" altLang="en-US" sz="1400" dirty="0"/>
+          </a:p>
+        </p:txBody>
+      </p:sp>
+      <p:cxnSp>
+        <p:nvCxnSpPr>
+          <p:cNvPr id="16" name="연결선: 구부러짐 15">
+            <a:extLst>
+              <a:ext uri="{FF2B5EF4-FFF2-40B4-BE49-F238E27FC236}">
+                <a16:creationId xmlns:a16="http://schemas.microsoft.com/office/drawing/2014/main" id="{CDE98ABC-BAE8-6392-66CF-6BE5DDAFE40F}"/>
+              </a:ext>
+            </a:extLst>
+          </p:cNvPr>
+          <p:cNvCxnSpPr>
+            <a:cxnSpLocks/>
+            <a:endCxn id="18" idx="0"/>
+          </p:cNvCxnSpPr>
+          <p:nvPr/>
+        </p:nvCxnSpPr>
+        <p:spPr>
+          <a:xfrm rot="5400000">
+            <a:off x="3678310" y="2315816"/>
+            <a:ext cx="1210191" cy="660577"/>
+          </a:xfrm>
+          <a:prstGeom prst="curvedConnector3">
+            <a:avLst>
+              <a:gd name="adj1" fmla="val 50000"/>
+            </a:avLst>
+          </a:prstGeom>
+          <a:ln>
+            <a:tailEnd type="triangle"/>
+          </a:ln>
+        </p:spPr>
+        <p:style>
+          <a:lnRef idx="1">
+            <a:schemeClr val="accent1"/>
+          </a:lnRef>
+          <a:fillRef idx="0">
+            <a:schemeClr val="accent1"/>
+          </a:fillRef>
+          <a:effectRef idx="0">
+            <a:schemeClr val="accent1"/>
+          </a:effectRef>
+          <a:fontRef idx="minor">
+            <a:schemeClr val="tx1"/>
+          </a:fontRef>
+        </p:style>
+      </p:cxnSp>
+      <p:sp>
+        <p:nvSpPr>
+          <p:cNvPr id="18" name="직사각형 17">
+            <a:extLst>
+              <a:ext uri="{FF2B5EF4-FFF2-40B4-BE49-F238E27FC236}">
+                <a16:creationId xmlns:a16="http://schemas.microsoft.com/office/drawing/2014/main" id="{E135AB39-00CC-78F1-45A4-6ADE389F021E}"/>
+              </a:ext>
+            </a:extLst>
+          </p:cNvPr>
+          <p:cNvSpPr/>
+          <p:nvPr/>
+        </p:nvSpPr>
+        <p:spPr>
+          <a:xfrm>
+            <a:off x="3424335" y="3251200"/>
+            <a:ext cx="1057562" cy="572655"/>
+          </a:xfrm>
+          <a:prstGeom prst="rect">
+            <a:avLst/>
+          </a:prstGeom>
+          <a:noFill/>
+        </p:spPr>
+        <p:style>
+          <a:lnRef idx="2">
+            <a:schemeClr val="accent1">
+              <a:shade val="50000"/>
+            </a:schemeClr>
+          </a:lnRef>
+          <a:fillRef idx="1">
+            <a:schemeClr val="accent1"/>
+          </a:fillRef>
+          <a:effectRef idx="0">
+            <a:schemeClr val="accent1"/>
+          </a:effectRef>
+          <a:fontRef idx="minor">
+            <a:schemeClr val="lt1"/>
+          </a:fontRef>
+        </p:style>
+        <p:txBody>
+          <a:bodyPr rtlCol="0" anchor="ctr"/>
+          <a:lstStyle/>
+          <a:p>
+            <a:pPr algn="ctr"/>
+            <a:endParaRPr lang="ko-KR" altLang="en-US">
+              <a:noFill/>
+            </a:endParaRPr>
+          </a:p>
+        </p:txBody>
+      </p:sp>
+      <p:sp>
+        <p:nvSpPr>
+          <p:cNvPr id="21" name="TextBox 20">
+            <a:extLst>
+              <a:ext uri="{FF2B5EF4-FFF2-40B4-BE49-F238E27FC236}">
+                <a16:creationId xmlns:a16="http://schemas.microsoft.com/office/drawing/2014/main" id="{D5EF8A1D-6928-6D23-BA97-AA7D971C5E9F}"/>
+              </a:ext>
+            </a:extLst>
+          </p:cNvPr>
+          <p:cNvSpPr txBox="1"/>
+          <p:nvPr/>
+        </p:nvSpPr>
+        <p:spPr>
+          <a:xfrm>
+            <a:off x="4567744" y="1879364"/>
+            <a:ext cx="1380250" cy="307777"/>
+          </a:xfrm>
+          <a:prstGeom prst="rect">
+            <a:avLst/>
+          </a:prstGeom>
+          <a:noFill/>
+        </p:spPr>
+        <p:txBody>
+          <a:bodyPr wrap="none" rtlCol="0">
+            <a:spAutoFit/>
+          </a:bodyPr>
+          <a:lstStyle/>
+          <a:p>
+            <a:r>
+              <a:rPr lang="en-US" altLang="ko-KR" sz="1400" dirty="0"/>
+              <a:t>cursor at (1, 7)</a:t>
+            </a:r>
+            <a:endParaRPr lang="ko-KR" altLang="en-US" sz="1400" dirty="0"/>
+          </a:p>
+        </p:txBody>
+      </p:sp>
+      <p:sp>
+        <p:nvSpPr>
+          <p:cNvPr id="22" name="타원 21">
+            <a:extLst>
+              <a:ext uri="{FF2B5EF4-FFF2-40B4-BE49-F238E27FC236}">
+                <a16:creationId xmlns:a16="http://schemas.microsoft.com/office/drawing/2014/main" id="{F786EE06-B22E-E6AC-41F4-784A5E2D6B05}"/>
+              </a:ext>
+            </a:extLst>
+          </p:cNvPr>
+          <p:cNvSpPr/>
+          <p:nvPr/>
+        </p:nvSpPr>
+        <p:spPr>
+          <a:xfrm>
+            <a:off x="3860753" y="3416793"/>
+            <a:ext cx="184728" cy="184728"/>
+          </a:xfrm>
+          <a:prstGeom prst="ellipse">
+            <a:avLst/>
+          </a:prstGeom>
+        </p:spPr>
+        <p:style>
+          <a:lnRef idx="2">
+            <a:schemeClr val="accent1">
+              <a:shade val="50000"/>
+            </a:schemeClr>
+          </a:lnRef>
+          <a:fillRef idx="1">
+            <a:schemeClr val="accent1"/>
+          </a:fillRef>
+          <a:effectRef idx="0">
+            <a:schemeClr val="accent1"/>
+          </a:effectRef>
+          <a:fontRef idx="minor">
+            <a:schemeClr val="lt1"/>
+          </a:fontRef>
+        </p:style>
+        <p:txBody>
+          <a:bodyPr rtlCol="0" anchor="ctr"/>
+          <a:lstStyle/>
+          <a:p>
+            <a:pPr algn="ctr"/>
+            <a:endParaRPr lang="ko-KR" altLang="en-US"/>
+          </a:p>
+        </p:txBody>
+      </p:sp>
+      <p:cxnSp>
+        <p:nvCxnSpPr>
+          <p:cNvPr id="23" name="연결선: 구부러짐 22">
+            <a:extLst>
+              <a:ext uri="{FF2B5EF4-FFF2-40B4-BE49-F238E27FC236}">
+                <a16:creationId xmlns:a16="http://schemas.microsoft.com/office/drawing/2014/main" id="{1B328D7A-B776-1266-1B87-3C9E87941DB6}"/>
+              </a:ext>
+            </a:extLst>
+          </p:cNvPr>
+          <p:cNvCxnSpPr>
+            <a:cxnSpLocks/>
+            <a:stCxn id="26" idx="1"/>
+            <a:endCxn id="22" idx="6"/>
+          </p:cNvCxnSpPr>
+          <p:nvPr/>
+        </p:nvCxnSpPr>
+        <p:spPr>
+          <a:xfrm rot="10800000">
+            <a:off x="4045482" y="3509158"/>
+            <a:ext cx="1054573" cy="1213087"/>
+          </a:xfrm>
+          <a:prstGeom prst="curvedConnector3">
+            <a:avLst>
+              <a:gd name="adj1" fmla="val 62284"/>
+            </a:avLst>
+          </a:prstGeom>
+          <a:ln>
+            <a:tailEnd type="triangle"/>
+          </a:ln>
+        </p:spPr>
+        <p:style>
+          <a:lnRef idx="1">
+            <a:schemeClr val="accent1"/>
+          </a:lnRef>
+          <a:fillRef idx="0">
+            <a:schemeClr val="accent1"/>
+          </a:fillRef>
+          <a:effectRef idx="0">
+            <a:schemeClr val="accent1"/>
+          </a:effectRef>
+          <a:fontRef idx="minor">
+            <a:schemeClr val="tx1"/>
+          </a:fontRef>
+        </p:style>
+      </p:cxnSp>
+      <p:sp>
+        <p:nvSpPr>
+          <p:cNvPr id="26" name="TextBox 25">
+            <a:extLst>
+              <a:ext uri="{FF2B5EF4-FFF2-40B4-BE49-F238E27FC236}">
+                <a16:creationId xmlns:a16="http://schemas.microsoft.com/office/drawing/2014/main" id="{616D0952-BF1B-C069-FEF4-E89C68C799A6}"/>
+              </a:ext>
+            </a:extLst>
+          </p:cNvPr>
+          <p:cNvSpPr txBox="1"/>
+          <p:nvPr/>
+        </p:nvSpPr>
+        <p:spPr>
+          <a:xfrm>
+            <a:off x="5100054" y="4568355"/>
+            <a:ext cx="1991892" cy="307777"/>
+          </a:xfrm>
+          <a:prstGeom prst="rect">
+            <a:avLst/>
+          </a:prstGeom>
+          <a:noFill/>
+        </p:spPr>
+        <p:txBody>
+          <a:bodyPr wrap="none" rtlCol="0">
+            <a:spAutoFit/>
+          </a:bodyPr>
+          <a:lstStyle/>
+          <a:p>
+            <a:r>
+              <a:rPr lang="en-US" altLang="ko-KR" sz="1400" dirty="0" err="1"/>
+              <a:t>coord</a:t>
+            </a:r>
+            <a:r>
+              <a:rPr lang="en-US" altLang="ko-KR" sz="1400" dirty="0"/>
+              <a:t> at (1, 7) = 7172</a:t>
+            </a:r>
+            <a:endParaRPr lang="ko-KR" altLang="en-US" sz="1400" dirty="0"/>
+          </a:p>
+        </p:txBody>
+      </p:sp>
+      <p:cxnSp>
+        <p:nvCxnSpPr>
+          <p:cNvPr id="30" name="직선 연결선 29">
+            <a:extLst>
+              <a:ext uri="{FF2B5EF4-FFF2-40B4-BE49-F238E27FC236}">
+                <a16:creationId xmlns:a16="http://schemas.microsoft.com/office/drawing/2014/main" id="{871A30D1-1C0D-1E51-AF88-965EA12A5F30}"/>
+              </a:ext>
+            </a:extLst>
+          </p:cNvPr>
+          <p:cNvCxnSpPr/>
+          <p:nvPr/>
+        </p:nvCxnSpPr>
+        <p:spPr>
+          <a:xfrm>
+            <a:off x="3362036" y="3508543"/>
+            <a:ext cx="0" cy="572655"/>
+          </a:xfrm>
+          <a:prstGeom prst="line">
+            <a:avLst/>
+          </a:prstGeom>
+          <a:ln w="57150">
+            <a:solidFill>
+              <a:srgbClr val="FF0000"/>
+            </a:solidFill>
+          </a:ln>
+        </p:spPr>
+        <p:style>
+          <a:lnRef idx="1">
+            <a:schemeClr val="accent1"/>
+          </a:lnRef>
+          <a:fillRef idx="0">
+            <a:schemeClr val="accent1"/>
+          </a:fillRef>
+          <a:effectRef idx="0">
+            <a:schemeClr val="accent1"/>
+          </a:effectRef>
+          <a:fontRef idx="minor">
+            <a:schemeClr val="tx1"/>
+          </a:fontRef>
+        </p:style>
+      </p:cxnSp>
+      <p:cxnSp>
+        <p:nvCxnSpPr>
+          <p:cNvPr id="32" name="연결선: 구부러짐 31">
+            <a:extLst>
+              <a:ext uri="{FF2B5EF4-FFF2-40B4-BE49-F238E27FC236}">
+                <a16:creationId xmlns:a16="http://schemas.microsoft.com/office/drawing/2014/main" id="{A8EE03FB-6A22-9359-F2E1-EAC3B21E22BC}"/>
+              </a:ext>
+            </a:extLst>
+          </p:cNvPr>
+          <p:cNvCxnSpPr>
+            <a:cxnSpLocks/>
+          </p:cNvCxnSpPr>
+          <p:nvPr/>
+        </p:nvCxnSpPr>
+        <p:spPr>
+          <a:xfrm flipV="1">
+            <a:off x="2038189" y="3794532"/>
+            <a:ext cx="1320490" cy="1035747"/>
+          </a:xfrm>
+          <a:prstGeom prst="curvedConnector3">
+            <a:avLst>
+              <a:gd name="adj1" fmla="val 50000"/>
+            </a:avLst>
+          </a:prstGeom>
+          <a:ln>
+            <a:tailEnd type="triangle"/>
+          </a:ln>
+        </p:spPr>
+        <p:style>
+          <a:lnRef idx="1">
+            <a:schemeClr val="accent1"/>
+          </a:lnRef>
+          <a:fillRef idx="0">
+            <a:schemeClr val="accent1"/>
+          </a:fillRef>
+          <a:effectRef idx="0">
+            <a:schemeClr val="accent1"/>
+          </a:effectRef>
+          <a:fontRef idx="minor">
+            <a:schemeClr val="tx1"/>
+          </a:fontRef>
+        </p:style>
+      </p:cxnSp>
+      <p:sp>
+        <p:nvSpPr>
+          <p:cNvPr id="36" name="TextBox 35">
+            <a:extLst>
+              <a:ext uri="{FF2B5EF4-FFF2-40B4-BE49-F238E27FC236}">
+                <a16:creationId xmlns:a16="http://schemas.microsoft.com/office/drawing/2014/main" id="{CAD0F09A-AEA4-8D8D-7B6A-B4AA65639761}"/>
+              </a:ext>
+            </a:extLst>
+          </p:cNvPr>
+          <p:cNvSpPr txBox="1"/>
+          <p:nvPr/>
+        </p:nvSpPr>
+        <p:spPr>
+          <a:xfrm>
+            <a:off x="556373" y="4839007"/>
+            <a:ext cx="2470548" cy="577081"/>
+          </a:xfrm>
+          <a:prstGeom prst="rect">
+            <a:avLst/>
+          </a:prstGeom>
+          <a:noFill/>
+        </p:spPr>
+        <p:txBody>
+          <a:bodyPr wrap="none" rtlCol="0">
+            <a:spAutoFit/>
+          </a:bodyPr>
+          <a:lstStyle/>
+          <a:p>
+            <a:r>
+              <a:rPr lang="en-US" altLang="ko-KR" sz="1050" dirty="0"/>
+              <a:t>Ly7 </a:t>
+            </a:r>
+            <a:r>
+              <a:rPr lang="ko-KR" altLang="en-US" sz="1050" dirty="0"/>
+              <a:t>에서 </a:t>
+            </a:r>
+            <a:r>
+              <a:rPr lang="en-US" altLang="ko-KR" sz="1050" dirty="0" err="1"/>
+              <a:t>Vline</a:t>
+            </a:r>
+            <a:r>
+              <a:rPr lang="en-US" altLang="ko-KR" sz="1050" dirty="0"/>
+              <a:t> </a:t>
+            </a:r>
+            <a:r>
+              <a:rPr lang="ko-KR" altLang="en-US" sz="1050" dirty="0"/>
+              <a:t>그린 것</a:t>
+            </a:r>
+            <a:endParaRPr lang="en-US" altLang="ko-KR" sz="1050" dirty="0"/>
+          </a:p>
+          <a:p>
+            <a:r>
+              <a:rPr lang="en-US" altLang="ko-KR" sz="1050" dirty="0"/>
+              <a:t>Lx0 </a:t>
+            </a:r>
+            <a:r>
+              <a:rPr lang="ko-KR" altLang="en-US" sz="1050" dirty="0"/>
+              <a:t>의 우측 </a:t>
+            </a:r>
+            <a:r>
+              <a:rPr lang="en-US" altLang="ko-KR" sz="1050" dirty="0"/>
+              <a:t>: </a:t>
+            </a:r>
+            <a:r>
+              <a:rPr lang="en-US" altLang="ko-KR" sz="1050" dirty="0" err="1"/>
+              <a:t>coord</a:t>
+            </a:r>
+            <a:r>
+              <a:rPr lang="en-US" altLang="ko-KR" sz="1050" dirty="0"/>
+              <a:t> (0, 7) + 2 = 7171</a:t>
+            </a:r>
+          </a:p>
+          <a:p>
+            <a:r>
+              <a:rPr lang="en-US" altLang="ko-KR" sz="1050" dirty="0">
+                <a:solidFill>
+                  <a:schemeClr val="bg1">
+                    <a:lumMod val="65000"/>
+                  </a:schemeClr>
+                </a:solidFill>
+              </a:rPr>
+              <a:t>Lx1 </a:t>
+            </a:r>
+            <a:r>
+              <a:rPr lang="ko-KR" altLang="en-US" sz="1050" dirty="0">
+                <a:solidFill>
+                  <a:schemeClr val="bg1">
+                    <a:lumMod val="65000"/>
+                  </a:schemeClr>
+                </a:solidFill>
+              </a:rPr>
+              <a:t>의 좌측 </a:t>
+            </a:r>
+            <a:r>
+              <a:rPr lang="en-US" altLang="ko-KR" sz="1050" dirty="0">
+                <a:solidFill>
+                  <a:schemeClr val="bg1">
+                    <a:lumMod val="65000"/>
+                  </a:schemeClr>
+                </a:solidFill>
+              </a:rPr>
+              <a:t>: </a:t>
+            </a:r>
+            <a:r>
+              <a:rPr lang="en-US" altLang="ko-KR" sz="1050" dirty="0" err="1">
+                <a:solidFill>
+                  <a:schemeClr val="bg1">
+                    <a:lumMod val="65000"/>
+                  </a:schemeClr>
+                </a:solidFill>
+              </a:rPr>
+              <a:t>coord</a:t>
+            </a:r>
+            <a:r>
+              <a:rPr lang="en-US" altLang="ko-KR" sz="1050" dirty="0">
+                <a:solidFill>
+                  <a:schemeClr val="bg1">
+                    <a:lumMod val="65000"/>
+                  </a:schemeClr>
+                </a:solidFill>
+              </a:rPr>
+              <a:t> (1, 7) – 1 = 7171</a:t>
+            </a:r>
+            <a:endParaRPr lang="ko-KR" altLang="en-US" sz="1050" dirty="0">
+              <a:solidFill>
+                <a:schemeClr val="bg1">
+                  <a:lumMod val="65000"/>
+                </a:schemeClr>
+              </a:solidFill>
+            </a:endParaRPr>
+          </a:p>
+        </p:txBody>
+      </p:sp>
+      <p:sp>
+        <p:nvSpPr>
+          <p:cNvPr id="37" name="TextBox 36">
+            <a:extLst>
+              <a:ext uri="{FF2B5EF4-FFF2-40B4-BE49-F238E27FC236}">
+                <a16:creationId xmlns:a16="http://schemas.microsoft.com/office/drawing/2014/main" id="{8C70240E-9F64-AC1A-8534-660641B99D1B}"/>
+              </a:ext>
+            </a:extLst>
+          </p:cNvPr>
+          <p:cNvSpPr txBox="1"/>
+          <p:nvPr/>
+        </p:nvSpPr>
+        <p:spPr>
+          <a:xfrm>
+            <a:off x="7758545" y="2530764"/>
+            <a:ext cx="5238998" cy="369332"/>
+          </a:xfrm>
+          <a:prstGeom prst="rect">
+            <a:avLst/>
+          </a:prstGeom>
+          <a:noFill/>
+        </p:spPr>
+        <p:txBody>
+          <a:bodyPr wrap="none" rtlCol="0">
+            <a:spAutoFit/>
+          </a:bodyPr>
+          <a:lstStyle/>
+          <a:p>
+            <a:r>
+              <a:rPr lang="en-US" altLang="ko-KR" dirty="0" err="1"/>
+              <a:t>vLine</a:t>
+            </a:r>
+            <a:r>
+              <a:rPr lang="en-US" altLang="ko-KR" dirty="0"/>
+              <a:t> </a:t>
+            </a:r>
+            <a:r>
+              <a:rPr lang="ko-KR" altLang="en-US" dirty="0"/>
+              <a:t>은 </a:t>
+            </a:r>
+            <a:r>
+              <a:rPr lang="en-US" altLang="ko-KR" dirty="0"/>
+              <a:t>Ly </a:t>
+            </a:r>
+            <a:r>
+              <a:rPr lang="ko-KR" altLang="en-US" dirty="0"/>
+              <a:t>기준으로 </a:t>
+            </a:r>
+            <a:r>
+              <a:rPr lang="en-US" altLang="ko-KR" dirty="0"/>
+              <a:t>center </a:t>
+            </a:r>
+            <a:r>
+              <a:rPr lang="ko-KR" altLang="en-US" dirty="0"/>
+              <a:t>에서 아래로 내려 옴</a:t>
+            </a:r>
+          </a:p>
+        </p:txBody>
+      </p:sp>
+      <p:cxnSp>
+        <p:nvCxnSpPr>
+          <p:cNvPr id="38" name="직선 연결선 37">
+            <a:extLst>
+              <a:ext uri="{FF2B5EF4-FFF2-40B4-BE49-F238E27FC236}">
+                <a16:creationId xmlns:a16="http://schemas.microsoft.com/office/drawing/2014/main" id="{98B80891-D6A7-98E2-B44F-CC1BB7D24421}"/>
+              </a:ext>
+            </a:extLst>
+          </p:cNvPr>
+          <p:cNvCxnSpPr/>
+          <p:nvPr/>
+        </p:nvCxnSpPr>
+        <p:spPr>
+          <a:xfrm>
+            <a:off x="4540036" y="3498968"/>
+            <a:ext cx="0" cy="572655"/>
+          </a:xfrm>
+          <a:prstGeom prst="line">
+            <a:avLst/>
+          </a:prstGeom>
+          <a:ln w="57150">
+            <a:solidFill>
+              <a:srgbClr val="FF0000"/>
+            </a:solidFill>
+          </a:ln>
+        </p:spPr>
+        <p:style>
+          <a:lnRef idx="1">
+            <a:schemeClr val="accent1"/>
+          </a:lnRef>
+          <a:fillRef idx="0">
+            <a:schemeClr val="accent1"/>
+          </a:fillRef>
+          <a:effectRef idx="0">
+            <a:schemeClr val="accent1"/>
+          </a:effectRef>
+          <a:fontRef idx="minor">
+            <a:schemeClr val="tx1"/>
+          </a:fontRef>
+        </p:style>
+      </p:cxnSp>
+      <p:cxnSp>
+        <p:nvCxnSpPr>
+          <p:cNvPr id="41" name="연결선: 구부러짐 40">
+            <a:extLst>
+              <a:ext uri="{FF2B5EF4-FFF2-40B4-BE49-F238E27FC236}">
+                <a16:creationId xmlns:a16="http://schemas.microsoft.com/office/drawing/2014/main" id="{E0FF2323-4BD1-4809-2B1D-F003FE25BA40}"/>
+              </a:ext>
+            </a:extLst>
+          </p:cNvPr>
+          <p:cNvCxnSpPr>
+            <a:cxnSpLocks/>
+          </p:cNvCxnSpPr>
+          <p:nvPr/>
+        </p:nvCxnSpPr>
+        <p:spPr>
+          <a:xfrm rot="10800000" flipV="1">
+            <a:off x="4613696" y="3685523"/>
+            <a:ext cx="1629678" cy="138331"/>
+          </a:xfrm>
+          <a:prstGeom prst="curvedConnector3">
+            <a:avLst>
+              <a:gd name="adj1" fmla="val 50000"/>
+            </a:avLst>
+          </a:prstGeom>
+          <a:ln>
+            <a:tailEnd type="triangle"/>
+          </a:ln>
+        </p:spPr>
+        <p:style>
+          <a:lnRef idx="1">
+            <a:schemeClr val="accent1"/>
+          </a:lnRef>
+          <a:fillRef idx="0">
+            <a:schemeClr val="accent1"/>
+          </a:fillRef>
+          <a:effectRef idx="0">
+            <a:schemeClr val="accent1"/>
+          </a:effectRef>
+          <a:fontRef idx="minor">
+            <a:schemeClr val="tx1"/>
+          </a:fontRef>
+        </p:style>
+      </p:cxnSp>
+      <p:sp>
+        <p:nvSpPr>
+          <p:cNvPr id="44" name="TextBox 43">
+            <a:extLst>
+              <a:ext uri="{FF2B5EF4-FFF2-40B4-BE49-F238E27FC236}">
+                <a16:creationId xmlns:a16="http://schemas.microsoft.com/office/drawing/2014/main" id="{8C282BF7-6695-D427-5CD6-93C94AAF0844}"/>
+              </a:ext>
+            </a:extLst>
+          </p:cNvPr>
+          <p:cNvSpPr txBox="1"/>
+          <p:nvPr/>
+        </p:nvSpPr>
+        <p:spPr>
+          <a:xfrm>
+            <a:off x="6157618" y="3466148"/>
+            <a:ext cx="2470548" cy="577081"/>
+          </a:xfrm>
+          <a:prstGeom prst="rect">
+            <a:avLst/>
+          </a:prstGeom>
+          <a:noFill/>
+        </p:spPr>
+        <p:txBody>
+          <a:bodyPr wrap="none" rtlCol="0">
+            <a:spAutoFit/>
+          </a:bodyPr>
+          <a:lstStyle/>
+          <a:p>
+            <a:r>
+              <a:rPr lang="en-US" altLang="ko-KR" sz="1050" dirty="0"/>
+              <a:t>Ly7 </a:t>
+            </a:r>
+            <a:r>
+              <a:rPr lang="ko-KR" altLang="en-US" sz="1050" dirty="0"/>
+              <a:t>에서 </a:t>
+            </a:r>
+            <a:r>
+              <a:rPr lang="en-US" altLang="ko-KR" sz="1050" dirty="0" err="1"/>
+              <a:t>Vline</a:t>
+            </a:r>
+            <a:r>
+              <a:rPr lang="en-US" altLang="ko-KR" sz="1050" dirty="0"/>
+              <a:t> </a:t>
+            </a:r>
+            <a:r>
+              <a:rPr lang="ko-KR" altLang="en-US" sz="1050" dirty="0"/>
+              <a:t>그린 것</a:t>
+            </a:r>
+            <a:endParaRPr lang="en-US" altLang="ko-KR" sz="1050" dirty="0"/>
+          </a:p>
+          <a:p>
+            <a:r>
+              <a:rPr lang="en-US" altLang="ko-KR" sz="1050" dirty="0"/>
+              <a:t>Lx1 </a:t>
+            </a:r>
+            <a:r>
+              <a:rPr lang="ko-KR" altLang="en-US" sz="1050" dirty="0"/>
+              <a:t>의 우측 </a:t>
+            </a:r>
+            <a:r>
+              <a:rPr lang="en-US" altLang="ko-KR" sz="1050" dirty="0"/>
+              <a:t>: </a:t>
+            </a:r>
+            <a:r>
+              <a:rPr lang="en-US" altLang="ko-KR" sz="1050" dirty="0" err="1"/>
+              <a:t>coord</a:t>
+            </a:r>
+            <a:r>
+              <a:rPr lang="en-US" altLang="ko-KR" sz="1050" dirty="0"/>
+              <a:t> (1, 7) + 2 = 7174</a:t>
+            </a:r>
+          </a:p>
+          <a:p>
+            <a:r>
+              <a:rPr lang="en-US" altLang="ko-KR" sz="1050" dirty="0">
+                <a:solidFill>
+                  <a:schemeClr val="bg1">
+                    <a:lumMod val="65000"/>
+                  </a:schemeClr>
+                </a:solidFill>
+              </a:rPr>
+              <a:t>Lx2 </a:t>
+            </a:r>
+            <a:r>
+              <a:rPr lang="ko-KR" altLang="en-US" sz="1050" dirty="0">
+                <a:solidFill>
+                  <a:schemeClr val="bg1">
+                    <a:lumMod val="65000"/>
+                  </a:schemeClr>
+                </a:solidFill>
+              </a:rPr>
+              <a:t>의 좌측 </a:t>
+            </a:r>
+            <a:r>
+              <a:rPr lang="en-US" altLang="ko-KR" sz="1050" dirty="0">
+                <a:solidFill>
+                  <a:schemeClr val="bg1">
+                    <a:lumMod val="65000"/>
+                  </a:schemeClr>
+                </a:solidFill>
+              </a:rPr>
+              <a:t>: </a:t>
+            </a:r>
+            <a:r>
+              <a:rPr lang="en-US" altLang="ko-KR" sz="1050" dirty="0" err="1">
+                <a:solidFill>
+                  <a:schemeClr val="bg1">
+                    <a:lumMod val="65000"/>
+                  </a:schemeClr>
+                </a:solidFill>
+              </a:rPr>
+              <a:t>coord</a:t>
+            </a:r>
+            <a:r>
+              <a:rPr lang="en-US" altLang="ko-KR" sz="1050" dirty="0">
+                <a:solidFill>
+                  <a:schemeClr val="bg1">
+                    <a:lumMod val="65000"/>
+                  </a:schemeClr>
+                </a:solidFill>
+              </a:rPr>
+              <a:t> (2, 7) – 1 = 7174</a:t>
+            </a:r>
+            <a:endParaRPr lang="ko-KR" altLang="en-US" sz="1050" dirty="0">
+              <a:solidFill>
+                <a:schemeClr val="bg1">
+                  <a:lumMod val="65000"/>
+                </a:schemeClr>
+              </a:solidFill>
+            </a:endParaRPr>
+          </a:p>
+        </p:txBody>
+      </p:sp>
+      <p:cxnSp>
+        <p:nvCxnSpPr>
+          <p:cNvPr id="46" name="직선 연결선 45">
+            <a:extLst>
+              <a:ext uri="{FF2B5EF4-FFF2-40B4-BE49-F238E27FC236}">
+                <a16:creationId xmlns:a16="http://schemas.microsoft.com/office/drawing/2014/main" id="{9A932024-1391-4124-B8A1-53D933D11C88}"/>
+              </a:ext>
+            </a:extLst>
+          </p:cNvPr>
+          <p:cNvCxnSpPr/>
+          <p:nvPr/>
+        </p:nvCxnSpPr>
+        <p:spPr>
+          <a:xfrm>
+            <a:off x="3424335" y="4071623"/>
+            <a:ext cx="1057562" cy="0"/>
+          </a:xfrm>
+          <a:prstGeom prst="line">
+            <a:avLst/>
+          </a:prstGeom>
+          <a:ln w="57150">
+            <a:solidFill>
+              <a:srgbClr val="FF0000"/>
+            </a:solidFill>
+          </a:ln>
+        </p:spPr>
+        <p:style>
+          <a:lnRef idx="1">
+            <a:schemeClr val="accent1"/>
+          </a:lnRef>
+          <a:fillRef idx="0">
+            <a:schemeClr val="accent1"/>
+          </a:fillRef>
+          <a:effectRef idx="0">
+            <a:schemeClr val="accent1"/>
+          </a:effectRef>
+          <a:fontRef idx="minor">
+            <a:schemeClr val="tx1"/>
+          </a:fontRef>
+        </p:style>
+      </p:cxnSp>
+      <p:cxnSp>
+        <p:nvCxnSpPr>
+          <p:cNvPr id="47" name="연결선: 구부러짐 46">
+            <a:extLst>
+              <a:ext uri="{FF2B5EF4-FFF2-40B4-BE49-F238E27FC236}">
+                <a16:creationId xmlns:a16="http://schemas.microsoft.com/office/drawing/2014/main" id="{862BB338-6E2E-1BED-736F-9C0865B65C9F}"/>
+              </a:ext>
+            </a:extLst>
+          </p:cNvPr>
+          <p:cNvCxnSpPr>
+            <a:cxnSpLocks/>
+          </p:cNvCxnSpPr>
+          <p:nvPr/>
+        </p:nvCxnSpPr>
+        <p:spPr>
+          <a:xfrm rot="16200000" flipV="1">
+            <a:off x="3762846" y="4305135"/>
+            <a:ext cx="1435116" cy="1054575"/>
+          </a:xfrm>
+          <a:prstGeom prst="curvedConnector3">
+            <a:avLst>
+              <a:gd name="adj1" fmla="val 50000"/>
+            </a:avLst>
+          </a:prstGeom>
+          <a:ln>
+            <a:tailEnd type="triangle"/>
+          </a:ln>
+        </p:spPr>
+        <p:style>
+          <a:lnRef idx="1">
+            <a:schemeClr val="accent1"/>
+          </a:lnRef>
+          <a:fillRef idx="0">
+            <a:schemeClr val="accent1"/>
+          </a:fillRef>
+          <a:effectRef idx="0">
+            <a:schemeClr val="accent1"/>
+          </a:effectRef>
+          <a:fontRef idx="minor">
+            <a:schemeClr val="tx1"/>
+          </a:fontRef>
+        </p:style>
+      </p:cxnSp>
+      <p:sp>
+        <p:nvSpPr>
+          <p:cNvPr id="49" name="TextBox 48">
+            <a:extLst>
+              <a:ext uri="{FF2B5EF4-FFF2-40B4-BE49-F238E27FC236}">
+                <a16:creationId xmlns:a16="http://schemas.microsoft.com/office/drawing/2014/main" id="{2E08DFB4-F429-4A35-2863-3B30ECA9CAF6}"/>
+              </a:ext>
+            </a:extLst>
+          </p:cNvPr>
+          <p:cNvSpPr txBox="1"/>
+          <p:nvPr/>
+        </p:nvSpPr>
+        <p:spPr>
+          <a:xfrm>
+            <a:off x="4366373" y="5649033"/>
+            <a:ext cx="1428596" cy="415498"/>
+          </a:xfrm>
+          <a:prstGeom prst="rect">
+            <a:avLst/>
+          </a:prstGeom>
+          <a:noFill/>
+        </p:spPr>
+        <p:txBody>
+          <a:bodyPr wrap="none" rtlCol="0">
+            <a:spAutoFit/>
+          </a:bodyPr>
+          <a:lstStyle/>
+          <a:p>
+            <a:r>
+              <a:rPr lang="en-US" altLang="ko-KR" sz="1050" dirty="0"/>
+              <a:t>(1, 8) </a:t>
+            </a:r>
+            <a:r>
+              <a:rPr lang="ko-KR" altLang="en-US" sz="1050" dirty="0"/>
+              <a:t>에서의 </a:t>
+            </a:r>
+            <a:r>
+              <a:rPr lang="en-US" altLang="ko-KR" sz="1050" dirty="0" err="1"/>
+              <a:t>hLine</a:t>
+            </a:r>
+            <a:endParaRPr lang="en-US" altLang="ko-KR" sz="1050" dirty="0"/>
+          </a:p>
+          <a:p>
+            <a:r>
+              <a:rPr lang="en-US" altLang="ko-KR" sz="1050" dirty="0" err="1"/>
+              <a:t>coord</a:t>
+            </a:r>
+            <a:r>
+              <a:rPr lang="en-US" altLang="ko-KR" sz="1050" dirty="0"/>
+              <a:t> (1, 8) = 8196 </a:t>
+            </a:r>
+          </a:p>
+        </p:txBody>
+      </p:sp>
+    </p:spTree>
+    <p:extLst>
+      <p:ext uri="{BB962C8B-B14F-4D97-AF65-F5344CB8AC3E}">
+        <p14:creationId xmlns:p14="http://schemas.microsoft.com/office/powerpoint/2010/main" val="4179824473"/>
+      </p:ext>
+    </p:extLst>
+  </p:cSld>
+  <p:clrMapOvr>
+    <a:masterClrMapping/>
+  </p:clrMapOvr>
+</p:sld>
+</file>
+
+<file path=ppt/slides/slide3.xml><?xml version="1.0" encoding="utf-8"?>
+<p:sld xmlns:a="http://schemas.openxmlformats.org/drawingml/2006/main" xmlns:r="http://schemas.openxmlformats.org/officeDocument/2006/relationships" xmlns:p="http://schemas.openxmlformats.org/presentationml/2006/main">
+  <p:cSld>
+    <p:spTree>
+      <p:nvGrpSpPr>
+        <p:cNvPr id="1" name=""/>
+        <p:cNvGrpSpPr/>
+        <p:nvPr/>
+      </p:nvGrpSpPr>
+      <p:grpSpPr>
+        <a:xfrm>
+          <a:off x="0" y="0"/>
+          <a:ext cx="0" cy="0"/>
+          <a:chOff x="0" y="0"/>
+          <a:chExt cx="0" cy="0"/>
+        </a:xfrm>
+      </p:grpSpPr>
+      <p:sp>
+        <p:nvSpPr>
+          <p:cNvPr id="2" name="제목 1">
+            <a:extLst>
+              <a:ext uri="{FF2B5EF4-FFF2-40B4-BE49-F238E27FC236}">
                 <a16:creationId xmlns:a16="http://schemas.microsoft.com/office/drawing/2014/main" id="{2C3A8A6E-88C0-7C06-1430-B337666E1747}"/>
               </a:ext>
             </a:extLst>

</xml_diff>

<commit_message>
- Terminal<'T> union case 변경    * DuLiteral of 'T => DuLiteral of LiteralHolder<'T>
</commit_message>
<xml_diff>
--- a/DsDotNet/src/PLC/PLC.CodeGen.LSXGI/Documents/XgiLadder.pptx
+++ b/DsDotNet/src/PLC/PLC.CodeGen.LSXGI/Documents/XgiLadder.pptx
@@ -7,7 +7,9 @@
   <p:sldIdLst>
     <p:sldId id="256" r:id="rId2"/>
     <p:sldId id="258" r:id="rId3"/>
-    <p:sldId id="257" r:id="rId4"/>
+    <p:sldId id="273" r:id="rId4"/>
+    <p:sldId id="257" r:id="rId5"/>
+    <p:sldId id="259" r:id="rId6"/>
   </p:sldIdLst>
   <p:sldSz cx="12192000" cy="6858000"/>
   <p:notesSz cx="6858000" cy="9144000"/>
@@ -4697,7 +4699,7 @@
           <p:cNvPr id="2" name="제목 1">
             <a:extLst>
               <a:ext uri="{FF2B5EF4-FFF2-40B4-BE49-F238E27FC236}">
-                <a16:creationId xmlns:a16="http://schemas.microsoft.com/office/drawing/2014/main" id="{2C3A8A6E-88C0-7C06-1430-B337666E1747}"/>
+                <a16:creationId xmlns:a16="http://schemas.microsoft.com/office/drawing/2014/main" id="{E51AE384-C5FA-1804-37B2-A4BB49FE9C63}"/>
               </a:ext>
             </a:extLst>
           </p:cNvPr>
@@ -4713,7 +4715,27 @@
           <a:bodyPr/>
           <a:lstStyle/>
           <a:p>
-            <a:endParaRPr lang="ko-KR" altLang="en-US"/>
+            <a:r>
+              <a:rPr lang="en-US" altLang="ko-KR" dirty="0"/>
+              <a:t>Input</a:t>
+            </a:r>
+            <a:r>
+              <a:rPr lang="ko-KR" altLang="en-US" dirty="0"/>
+              <a:t> </a:t>
+            </a:r>
+            <a:r>
+              <a:rPr lang="en-US" altLang="ko-KR" dirty="0"/>
+              <a:t>side</a:t>
+            </a:r>
+            <a:r>
+              <a:rPr lang="ko-KR" altLang="en-US" dirty="0"/>
+              <a:t> </a:t>
+            </a:r>
+            <a:r>
+              <a:rPr lang="ko-KR" altLang="en-US" dirty="0" err="1"/>
+              <a:t>다릿발</a:t>
+            </a:r>
+            <a:endParaRPr lang="ko-KR" altLang="en-US" dirty="0"/>
           </a:p>
         </p:txBody>
       </p:sp>
@@ -4722,7 +4744,7 @@
           <p:cNvPr id="5" name="그림 4">
             <a:extLst>
               <a:ext uri="{FF2B5EF4-FFF2-40B4-BE49-F238E27FC236}">
-                <a16:creationId xmlns:a16="http://schemas.microsoft.com/office/drawing/2014/main" id="{AF449C71-31B9-8182-16D6-5A8071EB0F7D}"/>
+                <a16:creationId xmlns:a16="http://schemas.microsoft.com/office/drawing/2014/main" id="{B4B38613-F556-BB1D-0024-D0915F8F29D2}"/>
               </a:ext>
             </a:extLst>
           </p:cNvPr>
@@ -4739,20 +4761,80 @@
         </p:blipFill>
         <p:spPr>
           <a:xfrm>
-            <a:off x="631971" y="3677349"/>
-            <a:ext cx="7010400" cy="2095500"/>
+            <a:off x="421130" y="1485415"/>
+            <a:ext cx="3632678" cy="3178025"/>
           </a:xfrm>
           <a:prstGeom prst="rect">
             <a:avLst/>
           </a:prstGeom>
         </p:spPr>
       </p:pic>
+      <p:pic>
+        <p:nvPicPr>
+          <p:cNvPr id="9" name="그림 8">
+            <a:extLst>
+              <a:ext uri="{FF2B5EF4-FFF2-40B4-BE49-F238E27FC236}">
+                <a16:creationId xmlns:a16="http://schemas.microsoft.com/office/drawing/2014/main" id="{231C9CA6-EAAC-459A-2A13-691FEC12F1CC}"/>
+              </a:ext>
+            </a:extLst>
+          </p:cNvPr>
+          <p:cNvPicPr>
+            <a:picLocks noChangeAspect="1"/>
+          </p:cNvPicPr>
+          <p:nvPr/>
+        </p:nvPicPr>
+        <p:blipFill>
+          <a:blip r:embed="rId3"/>
+          <a:stretch>
+            <a:fillRect/>
+          </a:stretch>
+        </p:blipFill>
+        <p:spPr>
+          <a:xfrm>
+            <a:off x="6066842" y="3483495"/>
+            <a:ext cx="5947402" cy="2298996"/>
+          </a:xfrm>
+          <a:prstGeom prst="rect">
+            <a:avLst/>
+          </a:prstGeom>
+        </p:spPr>
+      </p:pic>
+      <p:pic>
+        <p:nvPicPr>
+          <p:cNvPr id="4" name="그림 3">
+            <a:extLst>
+              <a:ext uri="{FF2B5EF4-FFF2-40B4-BE49-F238E27FC236}">
+                <a16:creationId xmlns:a16="http://schemas.microsoft.com/office/drawing/2014/main" id="{E6207DF8-5E4E-6D87-725D-2C8A94E9CFE4}"/>
+              </a:ext>
+            </a:extLst>
+          </p:cNvPr>
+          <p:cNvPicPr>
+            <a:picLocks noChangeAspect="1"/>
+          </p:cNvPicPr>
+          <p:nvPr/>
+        </p:nvPicPr>
+        <p:blipFill>
+          <a:blip r:embed="rId4"/>
+          <a:stretch>
+            <a:fillRect/>
+          </a:stretch>
+        </p:blipFill>
+        <p:spPr>
+          <a:xfrm>
+            <a:off x="7053943" y="119188"/>
+            <a:ext cx="4163066" cy="3142999"/>
+          </a:xfrm>
+          <a:prstGeom prst="rect">
+            <a:avLst/>
+          </a:prstGeom>
+        </p:spPr>
+      </p:pic>
       <p:sp>
         <p:nvSpPr>
           <p:cNvPr id="7" name="TextBox 6">
             <a:extLst>
               <a:ext uri="{FF2B5EF4-FFF2-40B4-BE49-F238E27FC236}">
-                <a16:creationId xmlns:a16="http://schemas.microsoft.com/office/drawing/2014/main" id="{2DDA802C-E8C4-8739-302F-EB09AB420A71}"/>
+                <a16:creationId xmlns:a16="http://schemas.microsoft.com/office/drawing/2014/main" id="{B19BB55D-7667-9B5A-B563-A8A5E73C7148}"/>
               </a:ext>
             </a:extLst>
           </p:cNvPr>
@@ -4761,8 +4843,8 @@
         </p:nvSpPr>
         <p:spPr>
           <a:xfrm>
-            <a:off x="631971" y="3180651"/>
-            <a:ext cx="6096698" cy="369332"/>
+            <a:off x="6873379" y="0"/>
+            <a:ext cx="6096000" cy="215444"/>
           </a:xfrm>
           <a:prstGeom prst="rect">
             <a:avLst/>
@@ -4776,6 +4858,313 @@
           <a:lstStyle/>
           <a:p>
             <a:r>
+              <a:rPr lang="ko-KR" altLang="en-US" sz="800" dirty="0">
+                <a:hlinkClick r:id="rId5"/>
+              </a:rPr>
+              <a:t>http://duduji.iptime.org/gnuboard/data/file/du_board_study/XGI_%EC%B4%88%EA%B8%89(V18).pdf</a:t>
+            </a:r>
+            <a:r>
+              <a:rPr lang="ko-KR" altLang="en-US" sz="800" dirty="0"/>
+              <a:t>    </a:t>
+            </a:r>
+            <a:r>
+              <a:rPr lang="en-US" altLang="ko-KR" sz="800" dirty="0"/>
+              <a:t>pp.43</a:t>
+            </a:r>
+            <a:endParaRPr lang="ko-KR" altLang="en-US" sz="800" dirty="0"/>
+          </a:p>
+        </p:txBody>
+      </p:sp>
+      <p:sp>
+        <p:nvSpPr>
+          <p:cNvPr id="3" name="TextBox 2">
+            <a:extLst>
+              <a:ext uri="{FF2B5EF4-FFF2-40B4-BE49-F238E27FC236}">
+                <a16:creationId xmlns:a16="http://schemas.microsoft.com/office/drawing/2014/main" id="{93878D70-AF78-59EE-8C80-8D25AAD6A29B}"/>
+              </a:ext>
+            </a:extLst>
+          </p:cNvPr>
+          <p:cNvSpPr txBox="1"/>
+          <p:nvPr/>
+        </p:nvSpPr>
+        <p:spPr>
+          <a:xfrm>
+            <a:off x="727166" y="5068389"/>
+            <a:ext cx="4855816" cy="369332"/>
+          </a:xfrm>
+          <a:prstGeom prst="rect">
+            <a:avLst/>
+          </a:prstGeom>
+          <a:noFill/>
+        </p:spPr>
+        <p:txBody>
+          <a:bodyPr wrap="none" rtlCol="0">
+            <a:spAutoFit/>
+          </a:bodyPr>
+          <a:lstStyle/>
+          <a:p>
+            <a:r>
+              <a:rPr lang="en-US" altLang="ko-KR" dirty="0"/>
+              <a:t>Input </a:t>
+            </a:r>
+            <a:r>
+              <a:rPr lang="ko-KR" altLang="en-US" dirty="0"/>
+              <a:t>쪽 </a:t>
+            </a:r>
+            <a:r>
+              <a:rPr lang="en-US" altLang="ko-KR" dirty="0"/>
+              <a:t>bool </a:t>
+            </a:r>
+            <a:r>
+              <a:rPr lang="ko-KR" altLang="en-US" dirty="0"/>
+              <a:t>값은 복수개로 전원 연결 가능</a:t>
+            </a:r>
+          </a:p>
+        </p:txBody>
+      </p:sp>
+      <p:sp>
+        <p:nvSpPr>
+          <p:cNvPr id="6" name="타원 5">
+            <a:extLst>
+              <a:ext uri="{FF2B5EF4-FFF2-40B4-BE49-F238E27FC236}">
+                <a16:creationId xmlns:a16="http://schemas.microsoft.com/office/drawing/2014/main" id="{60BC367E-0CA0-76DF-AE1B-A07EF437C993}"/>
+              </a:ext>
+            </a:extLst>
+          </p:cNvPr>
+          <p:cNvSpPr/>
+          <p:nvPr/>
+        </p:nvSpPr>
+        <p:spPr>
+          <a:xfrm>
+            <a:off x="9653451" y="1920240"/>
+            <a:ext cx="431075" cy="701040"/>
+          </a:xfrm>
+          <a:prstGeom prst="ellipse">
+            <a:avLst/>
+          </a:prstGeom>
+          <a:noFill/>
+          <a:ln>
+            <a:solidFill>
+              <a:srgbClr val="FF0000"/>
+            </a:solidFill>
+          </a:ln>
+        </p:spPr>
+        <p:style>
+          <a:lnRef idx="2">
+            <a:schemeClr val="accent1"/>
+          </a:lnRef>
+          <a:fillRef idx="1">
+            <a:schemeClr val="lt1"/>
+          </a:fillRef>
+          <a:effectRef idx="0">
+            <a:schemeClr val="accent1"/>
+          </a:effectRef>
+          <a:fontRef idx="minor">
+            <a:schemeClr val="dk1"/>
+          </a:fontRef>
+        </p:style>
+        <p:txBody>
+          <a:bodyPr rtlCol="0" anchor="ctr"/>
+          <a:lstStyle/>
+          <a:p>
+            <a:pPr algn="ctr"/>
+            <a:endParaRPr lang="ko-KR" altLang="en-US"/>
+          </a:p>
+        </p:txBody>
+      </p:sp>
+      <p:cxnSp>
+        <p:nvCxnSpPr>
+          <p:cNvPr id="10" name="직선 화살표 연결선 9">
+            <a:extLst>
+              <a:ext uri="{FF2B5EF4-FFF2-40B4-BE49-F238E27FC236}">
+                <a16:creationId xmlns:a16="http://schemas.microsoft.com/office/drawing/2014/main" id="{3B57078A-D59E-810D-B7D5-7A93FBA9AA1A}"/>
+              </a:ext>
+            </a:extLst>
+          </p:cNvPr>
+          <p:cNvCxnSpPr>
+            <a:cxnSpLocks/>
+            <a:stCxn id="11" idx="0"/>
+            <a:endCxn id="6" idx="2"/>
+          </p:cNvCxnSpPr>
+          <p:nvPr/>
+        </p:nvCxnSpPr>
+        <p:spPr>
+          <a:xfrm flipV="1">
+            <a:off x="9196287" y="2270760"/>
+            <a:ext cx="457164" cy="656998"/>
+          </a:xfrm>
+          <a:prstGeom prst="straightConnector1">
+            <a:avLst/>
+          </a:prstGeom>
+          <a:ln>
+            <a:tailEnd type="triangle"/>
+          </a:ln>
+        </p:spPr>
+        <p:style>
+          <a:lnRef idx="1">
+            <a:schemeClr val="accent1"/>
+          </a:lnRef>
+          <a:fillRef idx="0">
+            <a:schemeClr val="accent1"/>
+          </a:fillRef>
+          <a:effectRef idx="0">
+            <a:schemeClr val="accent1"/>
+          </a:effectRef>
+          <a:fontRef idx="minor">
+            <a:schemeClr val="tx1"/>
+          </a:fontRef>
+        </p:style>
+      </p:cxnSp>
+      <p:sp>
+        <p:nvSpPr>
+          <p:cNvPr id="11" name="TextBox 10">
+            <a:extLst>
+              <a:ext uri="{FF2B5EF4-FFF2-40B4-BE49-F238E27FC236}">
+                <a16:creationId xmlns:a16="http://schemas.microsoft.com/office/drawing/2014/main" id="{E6D47E95-CD7B-9120-822E-312599035B65}"/>
+              </a:ext>
+            </a:extLst>
+          </p:cNvPr>
+          <p:cNvSpPr txBox="1"/>
+          <p:nvPr/>
+        </p:nvSpPr>
+        <p:spPr>
+          <a:xfrm>
+            <a:off x="8946859" y="2927758"/>
+            <a:ext cx="498855" cy="369332"/>
+          </a:xfrm>
+          <a:prstGeom prst="rect">
+            <a:avLst/>
+          </a:prstGeom>
+          <a:noFill/>
+        </p:spPr>
+        <p:txBody>
+          <a:bodyPr wrap="none" rtlCol="0">
+            <a:spAutoFit/>
+          </a:bodyPr>
+          <a:lstStyle/>
+          <a:p>
+            <a:r>
+              <a:rPr lang="en-US" altLang="ko-KR" dirty="0"/>
+              <a:t>OK</a:t>
+            </a:r>
+            <a:endParaRPr lang="ko-KR" altLang="en-US" dirty="0"/>
+          </a:p>
+        </p:txBody>
+      </p:sp>
+    </p:spTree>
+    <p:extLst>
+      <p:ext uri="{BB962C8B-B14F-4D97-AF65-F5344CB8AC3E}">
+        <p14:creationId xmlns:p14="http://schemas.microsoft.com/office/powerpoint/2010/main" val="2898261055"/>
+      </p:ext>
+    </p:extLst>
+  </p:cSld>
+  <p:clrMapOvr>
+    <a:masterClrMapping/>
+  </p:clrMapOvr>
+</p:sld>
+</file>
+
+<file path=ppt/slides/slide4.xml><?xml version="1.0" encoding="utf-8"?>
+<p:sld xmlns:a="http://schemas.openxmlformats.org/drawingml/2006/main" xmlns:r="http://schemas.openxmlformats.org/officeDocument/2006/relationships" xmlns:p="http://schemas.openxmlformats.org/presentationml/2006/main">
+  <p:cSld>
+    <p:spTree>
+      <p:nvGrpSpPr>
+        <p:cNvPr id="1" name=""/>
+        <p:cNvGrpSpPr/>
+        <p:nvPr/>
+      </p:nvGrpSpPr>
+      <p:grpSpPr>
+        <a:xfrm>
+          <a:off x="0" y="0"/>
+          <a:ext cx="0" cy="0"/>
+          <a:chOff x="0" y="0"/>
+          <a:chExt cx="0" cy="0"/>
+        </a:xfrm>
+      </p:grpSpPr>
+      <p:sp>
+        <p:nvSpPr>
+          <p:cNvPr id="2" name="제목 1">
+            <a:extLst>
+              <a:ext uri="{FF2B5EF4-FFF2-40B4-BE49-F238E27FC236}">
+                <a16:creationId xmlns:a16="http://schemas.microsoft.com/office/drawing/2014/main" id="{2C3A8A6E-88C0-7C06-1430-B337666E1747}"/>
+              </a:ext>
+            </a:extLst>
+          </p:cNvPr>
+          <p:cNvSpPr>
+            <a:spLocks noGrp="1"/>
+          </p:cNvSpPr>
+          <p:nvPr>
+            <p:ph type="title"/>
+          </p:nvPr>
+        </p:nvSpPr>
+        <p:spPr/>
+        <p:txBody>
+          <a:bodyPr/>
+          <a:lstStyle/>
+          <a:p>
+            <a:endParaRPr lang="ko-KR" altLang="en-US"/>
+          </a:p>
+        </p:txBody>
+      </p:sp>
+      <p:pic>
+        <p:nvPicPr>
+          <p:cNvPr id="5" name="그림 4">
+            <a:extLst>
+              <a:ext uri="{FF2B5EF4-FFF2-40B4-BE49-F238E27FC236}">
+                <a16:creationId xmlns:a16="http://schemas.microsoft.com/office/drawing/2014/main" id="{AF449C71-31B9-8182-16D6-5A8071EB0F7D}"/>
+              </a:ext>
+            </a:extLst>
+          </p:cNvPr>
+          <p:cNvPicPr>
+            <a:picLocks noChangeAspect="1"/>
+          </p:cNvPicPr>
+          <p:nvPr/>
+        </p:nvPicPr>
+        <p:blipFill>
+          <a:blip r:embed="rId2"/>
+          <a:stretch>
+            <a:fillRect/>
+          </a:stretch>
+        </p:blipFill>
+        <p:spPr>
+          <a:xfrm>
+            <a:off x="631971" y="3677349"/>
+            <a:ext cx="7010400" cy="2095500"/>
+          </a:xfrm>
+          <a:prstGeom prst="rect">
+            <a:avLst/>
+          </a:prstGeom>
+        </p:spPr>
+      </p:pic>
+      <p:sp>
+        <p:nvSpPr>
+          <p:cNvPr id="7" name="TextBox 6">
+            <a:extLst>
+              <a:ext uri="{FF2B5EF4-FFF2-40B4-BE49-F238E27FC236}">
+                <a16:creationId xmlns:a16="http://schemas.microsoft.com/office/drawing/2014/main" id="{2DDA802C-E8C4-8739-302F-EB09AB420A71}"/>
+              </a:ext>
+            </a:extLst>
+          </p:cNvPr>
+          <p:cNvSpPr txBox="1"/>
+          <p:nvPr/>
+        </p:nvSpPr>
+        <p:spPr>
+          <a:xfrm>
+            <a:off x="631971" y="3180651"/>
+            <a:ext cx="6096698" cy="369332"/>
+          </a:xfrm>
+          <a:prstGeom prst="rect">
+            <a:avLst/>
+          </a:prstGeom>
+          <a:noFill/>
+        </p:spPr>
+        <p:txBody>
+          <a:bodyPr wrap="square">
+            <a:spAutoFit/>
+          </a:bodyPr>
+          <a:lstStyle/>
+          <a:p>
+            <a:r>
               <a:rPr lang="ko-KR" altLang="en-US" dirty="0"/>
               <a:t>https://engineering-mino.tistory.com/22</a:t>
             </a:r>
@@ -4786,6 +5175,260 @@
     <p:extLst>
       <p:ext uri="{BB962C8B-B14F-4D97-AF65-F5344CB8AC3E}">
         <p14:creationId xmlns:p14="http://schemas.microsoft.com/office/powerpoint/2010/main" val="2663435116"/>
+      </p:ext>
+    </p:extLst>
+  </p:cSld>
+  <p:clrMapOvr>
+    <a:masterClrMapping/>
+  </p:clrMapOvr>
+</p:sld>
+</file>
+
+<file path=ppt/slides/slide5.xml><?xml version="1.0" encoding="utf-8"?>
+<p:sld xmlns:a="http://schemas.openxmlformats.org/drawingml/2006/main" xmlns:r="http://schemas.openxmlformats.org/officeDocument/2006/relationships" xmlns:p="http://schemas.openxmlformats.org/presentationml/2006/main">
+  <p:cSld>
+    <p:spTree>
+      <p:nvGrpSpPr>
+        <p:cNvPr id="1" name=""/>
+        <p:cNvGrpSpPr/>
+        <p:nvPr/>
+      </p:nvGrpSpPr>
+      <p:grpSpPr>
+        <a:xfrm>
+          <a:off x="0" y="0"/>
+          <a:ext cx="0" cy="0"/>
+          <a:chOff x="0" y="0"/>
+          <a:chExt cx="0" cy="0"/>
+        </a:xfrm>
+      </p:grpSpPr>
+      <p:sp>
+        <p:nvSpPr>
+          <p:cNvPr id="2" name="제목 1">
+            <a:extLst>
+              <a:ext uri="{FF2B5EF4-FFF2-40B4-BE49-F238E27FC236}">
+                <a16:creationId xmlns:a16="http://schemas.microsoft.com/office/drawing/2014/main" id="{FCE79B0F-2F96-D4A6-2318-DEB438B18B46}"/>
+              </a:ext>
+            </a:extLst>
+          </p:cNvPr>
+          <p:cNvSpPr>
+            <a:spLocks noGrp="1"/>
+          </p:cNvSpPr>
+          <p:nvPr>
+            <p:ph type="title"/>
+          </p:nvPr>
+        </p:nvSpPr>
+        <p:spPr/>
+        <p:txBody>
+          <a:bodyPr/>
+          <a:lstStyle/>
+          <a:p>
+            <a:endParaRPr lang="ko-KR" altLang="en-US"/>
+          </a:p>
+        </p:txBody>
+      </p:sp>
+      <p:pic>
+        <p:nvPicPr>
+          <p:cNvPr id="7" name="그림 6">
+            <a:extLst>
+              <a:ext uri="{FF2B5EF4-FFF2-40B4-BE49-F238E27FC236}">
+                <a16:creationId xmlns:a16="http://schemas.microsoft.com/office/drawing/2014/main" id="{96CDB90C-524F-90BD-9366-AF5B12B8EB16}"/>
+              </a:ext>
+            </a:extLst>
+          </p:cNvPr>
+          <p:cNvPicPr>
+            <a:picLocks noChangeAspect="1"/>
+          </p:cNvPicPr>
+          <p:nvPr/>
+        </p:nvPicPr>
+        <p:blipFill>
+          <a:blip r:embed="rId2"/>
+          <a:stretch>
+            <a:fillRect/>
+          </a:stretch>
+        </p:blipFill>
+        <p:spPr>
+          <a:xfrm>
+            <a:off x="583163" y="1935811"/>
+            <a:ext cx="5155087" cy="1665806"/>
+          </a:xfrm>
+          <a:prstGeom prst="rect">
+            <a:avLst/>
+          </a:prstGeom>
+        </p:spPr>
+      </p:pic>
+      <p:pic>
+        <p:nvPicPr>
+          <p:cNvPr id="9" name="그림 8">
+            <a:extLst>
+              <a:ext uri="{FF2B5EF4-FFF2-40B4-BE49-F238E27FC236}">
+                <a16:creationId xmlns:a16="http://schemas.microsoft.com/office/drawing/2014/main" id="{FDEFECF6-08F8-5ED7-463A-6FBCB52A9874}"/>
+              </a:ext>
+            </a:extLst>
+          </p:cNvPr>
+          <p:cNvPicPr>
+            <a:picLocks noChangeAspect="1"/>
+          </p:cNvPicPr>
+          <p:nvPr/>
+        </p:nvPicPr>
+        <p:blipFill>
+          <a:blip r:embed="rId3"/>
+          <a:stretch>
+            <a:fillRect/>
+          </a:stretch>
+        </p:blipFill>
+        <p:spPr>
+          <a:xfrm>
+            <a:off x="6904227" y="4506686"/>
+            <a:ext cx="4346860" cy="1481364"/>
+          </a:xfrm>
+          <a:prstGeom prst="rect">
+            <a:avLst/>
+          </a:prstGeom>
+        </p:spPr>
+      </p:pic>
+      <p:sp>
+        <p:nvSpPr>
+          <p:cNvPr id="10" name="타원 9">
+            <a:extLst>
+              <a:ext uri="{FF2B5EF4-FFF2-40B4-BE49-F238E27FC236}">
+                <a16:creationId xmlns:a16="http://schemas.microsoft.com/office/drawing/2014/main" id="{34D7D550-0294-CE9A-758A-1E36F1F6BD1B}"/>
+              </a:ext>
+            </a:extLst>
+          </p:cNvPr>
+          <p:cNvSpPr/>
+          <p:nvPr/>
+        </p:nvSpPr>
+        <p:spPr>
+          <a:xfrm>
+            <a:off x="8842876" y="5102743"/>
+            <a:ext cx="2155371" cy="289249"/>
+          </a:xfrm>
+          <a:prstGeom prst="ellipse">
+            <a:avLst/>
+          </a:prstGeom>
+          <a:noFill/>
+          <a:ln w="38100">
+            <a:solidFill>
+              <a:srgbClr val="FF0000"/>
+            </a:solidFill>
+          </a:ln>
+        </p:spPr>
+        <p:style>
+          <a:lnRef idx="2">
+            <a:schemeClr val="accent1">
+              <a:shade val="50000"/>
+            </a:schemeClr>
+          </a:lnRef>
+          <a:fillRef idx="1">
+            <a:schemeClr val="accent1"/>
+          </a:fillRef>
+          <a:effectRef idx="0">
+            <a:schemeClr val="accent1"/>
+          </a:effectRef>
+          <a:fontRef idx="minor">
+            <a:schemeClr val="lt1"/>
+          </a:fontRef>
+        </p:style>
+        <p:txBody>
+          <a:bodyPr rtlCol="0" anchor="ctr"/>
+          <a:lstStyle/>
+          <a:p>
+            <a:pPr algn="ctr"/>
+            <a:endParaRPr lang="ko-KR" altLang="en-US"/>
+          </a:p>
+        </p:txBody>
+      </p:sp>
+      <p:sp>
+        <p:nvSpPr>
+          <p:cNvPr id="11" name="TextBox 10">
+            <a:extLst>
+              <a:ext uri="{FF2B5EF4-FFF2-40B4-BE49-F238E27FC236}">
+                <a16:creationId xmlns:a16="http://schemas.microsoft.com/office/drawing/2014/main" id="{25056B0C-E518-4F85-493A-8435945F5A0B}"/>
+              </a:ext>
+            </a:extLst>
+          </p:cNvPr>
+          <p:cNvSpPr txBox="1"/>
+          <p:nvPr/>
+        </p:nvSpPr>
+        <p:spPr>
+          <a:xfrm>
+            <a:off x="8842876" y="3703782"/>
+            <a:ext cx="1733167" cy="646331"/>
+          </a:xfrm>
+          <a:prstGeom prst="rect">
+            <a:avLst/>
+          </a:prstGeom>
+          <a:noFill/>
+        </p:spPr>
+        <p:txBody>
+          <a:bodyPr wrap="none" rtlCol="0">
+            <a:spAutoFit/>
+          </a:bodyPr>
+          <a:lstStyle/>
+          <a:p>
+            <a:r>
+              <a:rPr lang="ko-KR" altLang="en-US" dirty="0"/>
+              <a:t>직접 연결 불가</a:t>
+            </a:r>
+            <a:endParaRPr lang="en-US" altLang="ko-KR" dirty="0"/>
+          </a:p>
+          <a:p>
+            <a:r>
+              <a:rPr lang="en-US" altLang="ko-KR"/>
+              <a:t>Chaining </a:t>
+            </a:r>
+            <a:r>
+              <a:rPr lang="ko-KR" altLang="en-US"/>
+              <a:t>불가</a:t>
+            </a:r>
+          </a:p>
+        </p:txBody>
+      </p:sp>
+      <p:cxnSp>
+        <p:nvCxnSpPr>
+          <p:cNvPr id="13" name="직선 화살표 연결선 12">
+            <a:extLst>
+              <a:ext uri="{FF2B5EF4-FFF2-40B4-BE49-F238E27FC236}">
+                <a16:creationId xmlns:a16="http://schemas.microsoft.com/office/drawing/2014/main" id="{228EBA25-6FD1-86C8-222C-806E56DDC83C}"/>
+              </a:ext>
+            </a:extLst>
+          </p:cNvPr>
+          <p:cNvCxnSpPr>
+            <a:stCxn id="11" idx="2"/>
+          </p:cNvCxnSpPr>
+          <p:nvPr/>
+        </p:nvCxnSpPr>
+        <p:spPr>
+          <a:xfrm>
+            <a:off x="9709460" y="4350113"/>
+            <a:ext cx="211101" cy="752630"/>
+          </a:xfrm>
+          <a:prstGeom prst="straightConnector1">
+            <a:avLst/>
+          </a:prstGeom>
+          <a:ln>
+            <a:tailEnd type="triangle"/>
+          </a:ln>
+        </p:spPr>
+        <p:style>
+          <a:lnRef idx="1">
+            <a:schemeClr val="accent1"/>
+          </a:lnRef>
+          <a:fillRef idx="0">
+            <a:schemeClr val="accent1"/>
+          </a:fillRef>
+          <a:effectRef idx="0">
+            <a:schemeClr val="accent1"/>
+          </a:effectRef>
+          <a:fontRef idx="minor">
+            <a:schemeClr val="tx1"/>
+          </a:fontRef>
+        </p:style>
+      </p:cxnSp>
+    </p:spTree>
+    <p:extLst>
+      <p:ext uri="{BB962C8B-B14F-4D97-AF65-F5344CB8AC3E}">
+        <p14:creationId xmlns:p14="http://schemas.microsoft.com/office/powerpoint/2010/main" val="584268993"/>
       </p:ext>
     </p:extLst>
   </p:cSld>

</xml_diff>

<commit_message>
- XGI PLC : Xml return type 수정 중: CoordinatedRungXml -> CoordinatedXmlElement
</commit_message>
<xml_diff>
--- a/DsDotNet/src/PLC/PLC.CodeGen.LSXGI/Documents/XgiLadder.pptx
+++ b/DsDotNet/src/PLC/PLC.CodeGen.LSXGI/Documents/XgiLadder.pptx
@@ -13,6 +13,7 @@
     <p:sldId id="275" r:id="rId7"/>
     <p:sldId id="276" r:id="rId8"/>
     <p:sldId id="274" r:id="rId9"/>
+    <p:sldId id="277" r:id="rId10"/>
   </p:sldIdLst>
   <p:sldSz cx="12192000" cy="6858000"/>
   <p:notesSz cx="6858000" cy="9144000"/>
@@ -268,7 +269,7 @@
               <a:rPr lang="ko-KR" altLang="en-US" smtClean="0"/>
               <a:t>2023-01-09</a:t>
             </a:fld>
-            <a:endParaRPr lang="ko-KR" altLang="en-US"/>
+            <a:endParaRPr lang="ko-KR" altLang="en-US" dirty="0"/>
           </a:p>
         </p:txBody>
       </p:sp>
@@ -293,7 +294,7 @@
           <a:bodyPr/>
           <a:lstStyle/>
           <a:p>
-            <a:endParaRPr lang="ko-KR" altLang="en-US"/>
+            <a:endParaRPr lang="ko-KR" altLang="en-US" dirty="0"/>
           </a:p>
         </p:txBody>
       </p:sp>
@@ -322,7 +323,7 @@
               <a:rPr lang="ko-KR" altLang="en-US" smtClean="0"/>
               <a:t>‹#›</a:t>
             </a:fld>
-            <a:endParaRPr lang="ko-KR" altLang="en-US"/>
+            <a:endParaRPr lang="ko-KR" altLang="en-US" dirty="0"/>
           </a:p>
         </p:txBody>
       </p:sp>
@@ -466,7 +467,7 @@
               <a:rPr lang="ko-KR" altLang="en-US" smtClean="0"/>
               <a:t>2023-01-09</a:t>
             </a:fld>
-            <a:endParaRPr lang="ko-KR" altLang="en-US"/>
+            <a:endParaRPr lang="ko-KR" altLang="en-US" dirty="0"/>
           </a:p>
         </p:txBody>
       </p:sp>
@@ -491,7 +492,7 @@
           <a:bodyPr/>
           <a:lstStyle/>
           <a:p>
-            <a:endParaRPr lang="ko-KR" altLang="en-US"/>
+            <a:endParaRPr lang="ko-KR" altLang="en-US" dirty="0"/>
           </a:p>
         </p:txBody>
       </p:sp>
@@ -520,7 +521,7 @@
               <a:rPr lang="ko-KR" altLang="en-US" smtClean="0"/>
               <a:t>‹#›</a:t>
             </a:fld>
-            <a:endParaRPr lang="ko-KR" altLang="en-US"/>
+            <a:endParaRPr lang="ko-KR" altLang="en-US" dirty="0"/>
           </a:p>
         </p:txBody>
       </p:sp>
@@ -674,7 +675,7 @@
               <a:rPr lang="ko-KR" altLang="en-US" smtClean="0"/>
               <a:t>2023-01-09</a:t>
             </a:fld>
-            <a:endParaRPr lang="ko-KR" altLang="en-US"/>
+            <a:endParaRPr lang="ko-KR" altLang="en-US" dirty="0"/>
           </a:p>
         </p:txBody>
       </p:sp>
@@ -699,7 +700,7 @@
           <a:bodyPr/>
           <a:lstStyle/>
           <a:p>
-            <a:endParaRPr lang="ko-KR" altLang="en-US"/>
+            <a:endParaRPr lang="ko-KR" altLang="en-US" dirty="0"/>
           </a:p>
         </p:txBody>
       </p:sp>
@@ -728,7 +729,7 @@
               <a:rPr lang="ko-KR" altLang="en-US" smtClean="0"/>
               <a:t>‹#›</a:t>
             </a:fld>
-            <a:endParaRPr lang="ko-KR" altLang="en-US"/>
+            <a:endParaRPr lang="ko-KR" altLang="en-US" dirty="0"/>
           </a:p>
         </p:txBody>
       </p:sp>
@@ -872,7 +873,7 @@
               <a:rPr lang="ko-KR" altLang="en-US" smtClean="0"/>
               <a:t>2023-01-09</a:t>
             </a:fld>
-            <a:endParaRPr lang="ko-KR" altLang="en-US"/>
+            <a:endParaRPr lang="ko-KR" altLang="en-US" dirty="0"/>
           </a:p>
         </p:txBody>
       </p:sp>
@@ -897,7 +898,7 @@
           <a:bodyPr/>
           <a:lstStyle/>
           <a:p>
-            <a:endParaRPr lang="ko-KR" altLang="en-US"/>
+            <a:endParaRPr lang="ko-KR" altLang="en-US" dirty="0"/>
           </a:p>
         </p:txBody>
       </p:sp>
@@ -926,7 +927,7 @@
               <a:rPr lang="ko-KR" altLang="en-US" smtClean="0"/>
               <a:t>‹#›</a:t>
             </a:fld>
-            <a:endParaRPr lang="ko-KR" altLang="en-US"/>
+            <a:endParaRPr lang="ko-KR" altLang="en-US" dirty="0"/>
           </a:p>
         </p:txBody>
       </p:sp>
@@ -1147,7 +1148,7 @@
               <a:rPr lang="ko-KR" altLang="en-US" smtClean="0"/>
               <a:t>2023-01-09</a:t>
             </a:fld>
-            <a:endParaRPr lang="ko-KR" altLang="en-US"/>
+            <a:endParaRPr lang="ko-KR" altLang="en-US" dirty="0"/>
           </a:p>
         </p:txBody>
       </p:sp>
@@ -1172,7 +1173,7 @@
           <a:bodyPr/>
           <a:lstStyle/>
           <a:p>
-            <a:endParaRPr lang="ko-KR" altLang="en-US"/>
+            <a:endParaRPr lang="ko-KR" altLang="en-US" dirty="0"/>
           </a:p>
         </p:txBody>
       </p:sp>
@@ -1201,7 +1202,7 @@
               <a:rPr lang="ko-KR" altLang="en-US" smtClean="0"/>
               <a:t>‹#›</a:t>
             </a:fld>
-            <a:endParaRPr lang="ko-KR" altLang="en-US"/>
+            <a:endParaRPr lang="ko-KR" altLang="en-US" dirty="0"/>
           </a:p>
         </p:txBody>
       </p:sp>
@@ -1412,7 +1413,7 @@
               <a:rPr lang="ko-KR" altLang="en-US" smtClean="0"/>
               <a:t>2023-01-09</a:t>
             </a:fld>
-            <a:endParaRPr lang="ko-KR" altLang="en-US"/>
+            <a:endParaRPr lang="ko-KR" altLang="en-US" dirty="0"/>
           </a:p>
         </p:txBody>
       </p:sp>
@@ -1437,7 +1438,7 @@
           <a:bodyPr/>
           <a:lstStyle/>
           <a:p>
-            <a:endParaRPr lang="ko-KR" altLang="en-US"/>
+            <a:endParaRPr lang="ko-KR" altLang="en-US" dirty="0"/>
           </a:p>
         </p:txBody>
       </p:sp>
@@ -1466,7 +1467,7 @@
               <a:rPr lang="ko-KR" altLang="en-US" smtClean="0"/>
               <a:t>‹#›</a:t>
             </a:fld>
-            <a:endParaRPr lang="ko-KR" altLang="en-US"/>
+            <a:endParaRPr lang="ko-KR" altLang="en-US" dirty="0"/>
           </a:p>
         </p:txBody>
       </p:sp>
@@ -1824,7 +1825,7 @@
               <a:rPr lang="ko-KR" altLang="en-US" smtClean="0"/>
               <a:t>2023-01-09</a:t>
             </a:fld>
-            <a:endParaRPr lang="ko-KR" altLang="en-US"/>
+            <a:endParaRPr lang="ko-KR" altLang="en-US" dirty="0"/>
           </a:p>
         </p:txBody>
       </p:sp>
@@ -1849,7 +1850,7 @@
           <a:bodyPr/>
           <a:lstStyle/>
           <a:p>
-            <a:endParaRPr lang="ko-KR" altLang="en-US"/>
+            <a:endParaRPr lang="ko-KR" altLang="en-US" dirty="0"/>
           </a:p>
         </p:txBody>
       </p:sp>
@@ -1878,7 +1879,7 @@
               <a:rPr lang="ko-KR" altLang="en-US" smtClean="0"/>
               <a:t>‹#›</a:t>
             </a:fld>
-            <a:endParaRPr lang="ko-KR" altLang="en-US"/>
+            <a:endParaRPr lang="ko-KR" altLang="en-US" dirty="0"/>
           </a:p>
         </p:txBody>
       </p:sp>
@@ -1965,7 +1966,7 @@
               <a:rPr lang="ko-KR" altLang="en-US" smtClean="0"/>
               <a:t>2023-01-09</a:t>
             </a:fld>
-            <a:endParaRPr lang="ko-KR" altLang="en-US"/>
+            <a:endParaRPr lang="ko-KR" altLang="en-US" dirty="0"/>
           </a:p>
         </p:txBody>
       </p:sp>
@@ -1990,7 +1991,7 @@
           <a:bodyPr/>
           <a:lstStyle/>
           <a:p>
-            <a:endParaRPr lang="ko-KR" altLang="en-US"/>
+            <a:endParaRPr lang="ko-KR" altLang="en-US" dirty="0"/>
           </a:p>
         </p:txBody>
       </p:sp>
@@ -2019,7 +2020,7 @@
               <a:rPr lang="ko-KR" altLang="en-US" smtClean="0"/>
               <a:t>‹#›</a:t>
             </a:fld>
-            <a:endParaRPr lang="ko-KR" altLang="en-US"/>
+            <a:endParaRPr lang="ko-KR" altLang="en-US" dirty="0"/>
           </a:p>
         </p:txBody>
       </p:sp>
@@ -2078,7 +2079,7 @@
               <a:rPr lang="ko-KR" altLang="en-US" smtClean="0"/>
               <a:t>2023-01-09</a:t>
             </a:fld>
-            <a:endParaRPr lang="ko-KR" altLang="en-US"/>
+            <a:endParaRPr lang="ko-KR" altLang="en-US" dirty="0"/>
           </a:p>
         </p:txBody>
       </p:sp>
@@ -2103,7 +2104,7 @@
           <a:bodyPr/>
           <a:lstStyle/>
           <a:p>
-            <a:endParaRPr lang="ko-KR" altLang="en-US"/>
+            <a:endParaRPr lang="ko-KR" altLang="en-US" dirty="0"/>
           </a:p>
         </p:txBody>
       </p:sp>
@@ -2132,7 +2133,7 @@
               <a:rPr lang="ko-KR" altLang="en-US" smtClean="0"/>
               <a:t>‹#›</a:t>
             </a:fld>
-            <a:endParaRPr lang="ko-KR" altLang="en-US"/>
+            <a:endParaRPr lang="ko-KR" altLang="en-US" dirty="0"/>
           </a:p>
         </p:txBody>
       </p:sp>
@@ -2389,7 +2390,7 @@
               <a:rPr lang="ko-KR" altLang="en-US" smtClean="0"/>
               <a:t>2023-01-09</a:t>
             </a:fld>
-            <a:endParaRPr lang="ko-KR" altLang="en-US"/>
+            <a:endParaRPr lang="ko-KR" altLang="en-US" dirty="0"/>
           </a:p>
         </p:txBody>
       </p:sp>
@@ -2414,7 +2415,7 @@
           <a:bodyPr/>
           <a:lstStyle/>
           <a:p>
-            <a:endParaRPr lang="ko-KR" altLang="en-US"/>
+            <a:endParaRPr lang="ko-KR" altLang="en-US" dirty="0"/>
           </a:p>
         </p:txBody>
       </p:sp>
@@ -2443,7 +2444,7 @@
               <a:rPr lang="ko-KR" altLang="en-US" smtClean="0"/>
               <a:t>‹#›</a:t>
             </a:fld>
-            <a:endParaRPr lang="ko-KR" altLang="en-US"/>
+            <a:endParaRPr lang="ko-KR" altLang="en-US" dirty="0"/>
           </a:p>
         </p:txBody>
       </p:sp>
@@ -2577,7 +2578,7 @@
             </a:lvl9pPr>
           </a:lstStyle>
           <a:p>
-            <a:endParaRPr lang="ko-KR" altLang="en-US"/>
+            <a:endParaRPr lang="ko-KR" altLang="en-US" dirty="0"/>
           </a:p>
         </p:txBody>
       </p:sp>
@@ -2677,7 +2678,7 @@
               <a:rPr lang="ko-KR" altLang="en-US" smtClean="0"/>
               <a:t>2023-01-09</a:t>
             </a:fld>
-            <a:endParaRPr lang="ko-KR" altLang="en-US"/>
+            <a:endParaRPr lang="ko-KR" altLang="en-US" dirty="0"/>
           </a:p>
         </p:txBody>
       </p:sp>
@@ -2702,7 +2703,7 @@
           <a:bodyPr/>
           <a:lstStyle/>
           <a:p>
-            <a:endParaRPr lang="ko-KR" altLang="en-US"/>
+            <a:endParaRPr lang="ko-KR" altLang="en-US" dirty="0"/>
           </a:p>
         </p:txBody>
       </p:sp>
@@ -2731,7 +2732,7 @@
               <a:rPr lang="ko-KR" altLang="en-US" smtClean="0"/>
               <a:t>‹#›</a:t>
             </a:fld>
-            <a:endParaRPr lang="ko-KR" altLang="en-US"/>
+            <a:endParaRPr lang="ko-KR" altLang="en-US" dirty="0"/>
           </a:p>
         </p:txBody>
       </p:sp>
@@ -2918,7 +2919,7 @@
               <a:rPr lang="ko-KR" altLang="en-US" smtClean="0"/>
               <a:t>2023-01-09</a:t>
             </a:fld>
-            <a:endParaRPr lang="ko-KR" altLang="en-US"/>
+            <a:endParaRPr lang="ko-KR" altLang="en-US" dirty="0"/>
           </a:p>
         </p:txBody>
       </p:sp>
@@ -2961,7 +2962,7 @@
             </a:lvl1pPr>
           </a:lstStyle>
           <a:p>
-            <a:endParaRPr lang="ko-KR" altLang="en-US"/>
+            <a:endParaRPr lang="ko-KR" altLang="en-US" dirty="0"/>
           </a:p>
         </p:txBody>
       </p:sp>
@@ -3008,7 +3009,7 @@
               <a:rPr lang="ko-KR" altLang="en-US" smtClean="0"/>
               <a:t>‹#›</a:t>
             </a:fld>
-            <a:endParaRPr lang="ko-KR" altLang="en-US"/>
+            <a:endParaRPr lang="ko-KR" altLang="en-US" dirty="0"/>
           </a:p>
         </p:txBody>
       </p:sp>
@@ -3399,7 +3400,7 @@
           <a:bodyPr/>
           <a:lstStyle/>
           <a:p>
-            <a:endParaRPr lang="ko-KR" altLang="en-US"/>
+            <a:endParaRPr lang="ko-KR" altLang="en-US" dirty="0"/>
           </a:p>
         </p:txBody>
       </p:sp>
@@ -3454,7 +3455,7 @@
           <a:bodyPr/>
           <a:lstStyle/>
           <a:p>
-            <a:endParaRPr lang="ko-KR" altLang="en-US"/>
+            <a:endParaRPr lang="ko-KR" altLang="en-US" dirty="0"/>
           </a:p>
         </p:txBody>
       </p:sp>
@@ -3863,7 +3864,7 @@
           <a:lstStyle/>
           <a:p>
             <a:pPr algn="ctr"/>
-            <a:endParaRPr lang="ko-KR" altLang="en-US">
+            <a:endParaRPr lang="ko-KR" altLang="en-US" dirty="0">
               <a:noFill/>
             </a:endParaRPr>
           </a:p>
@@ -3947,7 +3948,7 @@
           <a:lstStyle/>
           <a:p>
             <a:pPr algn="ctr"/>
-            <a:endParaRPr lang="ko-KR" altLang="en-US"/>
+            <a:endParaRPr lang="ko-KR" altLang="en-US" dirty="0"/>
           </a:p>
         </p:txBody>
       </p:sp>
@@ -4025,12 +4026,8 @@
           <a:lstStyle/>
           <a:p>
             <a:r>
-              <a:rPr lang="en-US" altLang="ko-KR" sz="1400" dirty="0" err="1"/>
-              <a:t>coord</a:t>
-            </a:r>
-            <a:r>
               <a:rPr lang="en-US" altLang="ko-KR" sz="1400" dirty="0"/>
-              <a:t> at (1, 7) = 7172</a:t>
+              <a:t>coord at (1, 7) = 7172</a:t>
             </a:r>
             <a:endParaRPr lang="ko-KR" altLang="en-US" sz="1400" dirty="0"/>
           </a:p>
@@ -4157,12 +4154,8 @@
               <a:t>에서 </a:t>
             </a:r>
             <a:r>
-              <a:rPr lang="en-US" altLang="ko-KR" sz="1050" dirty="0" err="1"/>
-              <a:t>Vline</a:t>
-            </a:r>
-            <a:r>
               <a:rPr lang="en-US" altLang="ko-KR" sz="1050" dirty="0"/>
-              <a:t> </a:t>
+              <a:t>Vline </a:t>
             </a:r>
             <a:r>
               <a:rPr lang="ko-KR" altLang="en-US" sz="1050" dirty="0"/>
@@ -4181,15 +4174,7 @@
             </a:r>
             <a:r>
               <a:rPr lang="en-US" altLang="ko-KR" sz="1050" dirty="0"/>
-              <a:t>: </a:t>
-            </a:r>
-            <a:r>
-              <a:rPr lang="en-US" altLang="ko-KR" sz="1050" dirty="0" err="1"/>
-              <a:t>coord</a:t>
-            </a:r>
-            <a:r>
-              <a:rPr lang="en-US" altLang="ko-KR" sz="1050" dirty="0"/>
-              <a:t> (0, 7) + 2 = 7171</a:t>
+              <a:t>: coord (0, 7) + 2 = 7171</a:t>
             </a:r>
           </a:p>
           <a:p>
@@ -4221,27 +4206,7 @@
                   </a:schemeClr>
                 </a:solidFill>
               </a:rPr>
-              <a:t>: </a:t>
-            </a:r>
-            <a:r>
-              <a:rPr lang="en-US" altLang="ko-KR" sz="1050" dirty="0" err="1">
-                <a:solidFill>
-                  <a:schemeClr val="bg1">
-                    <a:lumMod val="65000"/>
-                  </a:schemeClr>
-                </a:solidFill>
-              </a:rPr>
-              <a:t>coord</a:t>
-            </a:r>
-            <a:r>
-              <a:rPr lang="en-US" altLang="ko-KR" sz="1050" dirty="0">
-                <a:solidFill>
-                  <a:schemeClr val="bg1">
-                    <a:lumMod val="65000"/>
-                  </a:schemeClr>
-                </a:solidFill>
-              </a:rPr>
-              <a:t> (1, 7) – 1 = 7171</a:t>
+              <a:t>: coord (1, 7) – 1 = 7171</a:t>
             </a:r>
             <a:endParaRPr lang="ko-KR" altLang="en-US" sz="1050" dirty="0">
               <a:solidFill>
@@ -4282,12 +4247,8 @@
           <a:lstStyle/>
           <a:p>
             <a:r>
-              <a:rPr lang="en-US" altLang="ko-KR" dirty="0" err="1"/>
-              <a:t>vLine</a:t>
-            </a:r>
-            <a:r>
               <a:rPr lang="en-US" altLang="ko-KR" dirty="0"/>
-              <a:t> </a:t>
+              <a:t>vLine </a:t>
             </a:r>
             <a:r>
               <a:rPr lang="ko-KR" altLang="en-US" dirty="0"/>
@@ -4433,12 +4394,8 @@
               <a:t>에서 </a:t>
             </a:r>
             <a:r>
-              <a:rPr lang="en-US" altLang="ko-KR" sz="1050" dirty="0" err="1"/>
-              <a:t>Vline</a:t>
-            </a:r>
-            <a:r>
               <a:rPr lang="en-US" altLang="ko-KR" sz="1050" dirty="0"/>
-              <a:t> </a:t>
+              <a:t>Vline </a:t>
             </a:r>
             <a:r>
               <a:rPr lang="ko-KR" altLang="en-US" sz="1050" dirty="0"/>
@@ -4457,15 +4414,7 @@
             </a:r>
             <a:r>
               <a:rPr lang="en-US" altLang="ko-KR" sz="1050" dirty="0"/>
-              <a:t>: </a:t>
-            </a:r>
-            <a:r>
-              <a:rPr lang="en-US" altLang="ko-KR" sz="1050" dirty="0" err="1"/>
-              <a:t>coord</a:t>
-            </a:r>
-            <a:r>
-              <a:rPr lang="en-US" altLang="ko-KR" sz="1050" dirty="0"/>
-              <a:t> (1, 7) + 2 = 7174</a:t>
+              <a:t>: coord (1, 7) + 2 = 7174</a:t>
             </a:r>
           </a:p>
           <a:p>
@@ -4497,27 +4446,7 @@
                   </a:schemeClr>
                 </a:solidFill>
               </a:rPr>
-              <a:t>: </a:t>
-            </a:r>
-            <a:r>
-              <a:rPr lang="en-US" altLang="ko-KR" sz="1050" dirty="0" err="1">
-                <a:solidFill>
-                  <a:schemeClr val="bg1">
-                    <a:lumMod val="65000"/>
-                  </a:schemeClr>
-                </a:solidFill>
-              </a:rPr>
-              <a:t>coord</a:t>
-            </a:r>
-            <a:r>
-              <a:rPr lang="en-US" altLang="ko-KR" sz="1050" dirty="0">
-                <a:solidFill>
-                  <a:schemeClr val="bg1">
-                    <a:lumMod val="65000"/>
-                  </a:schemeClr>
-                </a:solidFill>
-              </a:rPr>
-              <a:t> (2, 7) – 1 = 7174</a:t>
+              <a:t>: coord (2, 7) – 1 = 7174</a:t>
             </a:r>
             <a:endParaRPr lang="ko-KR" altLang="en-US" sz="1050" dirty="0">
               <a:solidFill>
@@ -4650,19 +4579,14 @@
               <a:t>에서의 </a:t>
             </a:r>
             <a:r>
-              <a:rPr lang="en-US" altLang="ko-KR" sz="1050" dirty="0" err="1"/>
+              <a:rPr lang="en-US" altLang="ko-KR" sz="1050" dirty="0"/>
               <a:t>hLine</a:t>
             </a:r>
-            <a:endParaRPr lang="en-US" altLang="ko-KR" sz="1050" dirty="0"/>
-          </a:p>
-          <a:p>
-            <a:r>
-              <a:rPr lang="en-US" altLang="ko-KR" sz="1050" dirty="0" err="1"/>
-              <a:t>coord</a:t>
-            </a:r>
+          </a:p>
+          <a:p>
             <a:r>
               <a:rPr lang="en-US" altLang="ko-KR" sz="1050" dirty="0"/>
-              <a:t> (1, 8) = 8196 </a:t>
+              <a:t>coord (1, 8) = 8196 </a:t>
             </a:r>
           </a:p>
         </p:txBody>
@@ -4732,13 +4656,8 @@
             </a:r>
             <a:r>
               <a:rPr lang="ko-KR" altLang="en-US" dirty="0"/>
-              <a:t> </a:t>
-            </a:r>
-            <a:r>
-              <a:rPr lang="ko-KR" altLang="en-US" dirty="0" err="1"/>
-              <a:t>다릿발</a:t>
-            </a:r>
-            <a:endParaRPr lang="ko-KR" altLang="en-US" dirty="0"/>
+              <a:t> 다릿발</a:t>
+            </a:r>
           </a:p>
         </p:txBody>
       </p:sp>
@@ -4971,7 +4890,7 @@
           <a:lstStyle/>
           <a:p>
             <a:pPr algn="ctr"/>
-            <a:endParaRPr lang="ko-KR" altLang="en-US"/>
+            <a:endParaRPr lang="ko-KR" altLang="en-US" dirty="0"/>
           </a:p>
         </p:txBody>
       </p:sp>
@@ -5105,7 +5024,7 @@
           <a:bodyPr/>
           <a:lstStyle/>
           <a:p>
-            <a:endParaRPr lang="ko-KR" altLang="en-US"/>
+            <a:endParaRPr lang="ko-KR" altLang="en-US" dirty="0"/>
           </a:p>
         </p:txBody>
       </p:sp>
@@ -5225,7 +5144,7 @@
           <a:bodyPr/>
           <a:lstStyle/>
           <a:p>
-            <a:endParaRPr lang="ko-KR" altLang="en-US"/>
+            <a:endParaRPr lang="ko-KR" altLang="en-US" dirty="0"/>
           </a:p>
         </p:txBody>
       </p:sp>
@@ -5337,7 +5256,7 @@
           <a:lstStyle/>
           <a:p>
             <a:pPr algn="ctr"/>
-            <a:endParaRPr lang="ko-KR" altLang="en-US"/>
+            <a:endParaRPr lang="ko-KR" altLang="en-US" dirty="0"/>
           </a:p>
         </p:txBody>
       </p:sp>
@@ -5579,7 +5498,7 @@
               <a:t> </a:t>
             </a:r>
             <a:r>
-              <a:rPr lang="en-US" altLang="ko-KR" sz="1200" b="0" dirty="0" err="1">
+              <a:rPr lang="en-US" altLang="ko-KR" sz="1200" b="0" dirty="0">
                 <a:solidFill>
                   <a:srgbClr val="9CDCFE"/>
                 </a:solidFill>
@@ -5668,7 +5587,7 @@
               <a:t> </a:t>
             </a:r>
             <a:r>
-              <a:rPr lang="en-US" altLang="ko-KR" sz="1200" b="0" dirty="0" err="1">
+              <a:rPr lang="en-US" altLang="ko-KR" sz="1200" b="0" dirty="0">
                 <a:solidFill>
                   <a:srgbClr val="9CDCFE"/>
                 </a:solidFill>
@@ -5834,7 +5753,7 @@
               <a:t> </a:t>
             </a:r>
             <a:r>
-              <a:rPr lang="en-US" altLang="ko-KR" sz="1200" b="0" dirty="0" err="1">
+              <a:rPr lang="en-US" altLang="ko-KR" sz="1200" b="0" dirty="0">
                 <a:solidFill>
                   <a:srgbClr val="9CDCFE"/>
                 </a:solidFill>
@@ -5983,7 +5902,7 @@
               <a:t> </a:t>
             </a:r>
             <a:r>
-              <a:rPr lang="en-US" altLang="ko-KR" sz="1200" b="0" dirty="0" err="1">
+              <a:rPr lang="en-US" altLang="ko-KR" sz="1200" b="0" dirty="0">
                 <a:solidFill>
                   <a:srgbClr val="9CDCFE"/>
                 </a:solidFill>
@@ -6149,7 +6068,7 @@
               <a:t> </a:t>
             </a:r>
             <a:r>
-              <a:rPr lang="en-US" altLang="ko-KR" sz="1200" b="0" dirty="0" err="1">
+              <a:rPr lang="en-US" altLang="ko-KR" sz="1200" b="0" dirty="0">
                 <a:solidFill>
                   <a:srgbClr val="9CDCFE"/>
                 </a:solidFill>
@@ -6298,7 +6217,7 @@
               <a:t> </a:t>
             </a:r>
             <a:r>
-              <a:rPr lang="en-US" altLang="ko-KR" sz="1200" b="0" dirty="0" err="1">
+              <a:rPr lang="en-US" altLang="ko-KR" sz="1200" b="0" dirty="0">
                 <a:solidFill>
                   <a:srgbClr val="9CDCFE"/>
                 </a:solidFill>
@@ -6487,7 +6406,7 @@
               <a:t> </a:t>
             </a:r>
             <a:r>
-              <a:rPr lang="en-US" altLang="ko-KR" sz="1200" b="0" dirty="0" err="1">
+              <a:rPr lang="en-US" altLang="ko-KR" sz="1200" b="0" dirty="0">
                 <a:solidFill>
                   <a:srgbClr val="9CDCFE"/>
                 </a:solidFill>
@@ -6653,7 +6572,7 @@
               <a:t> </a:t>
             </a:r>
             <a:r>
-              <a:rPr lang="en-US" altLang="ko-KR" sz="1200" b="0" dirty="0" err="1">
+              <a:rPr lang="en-US" altLang="ko-KR" sz="1200" b="0" dirty="0">
                 <a:solidFill>
                   <a:srgbClr val="9CDCFE"/>
                 </a:solidFill>
@@ -6819,7 +6738,7 @@
               <a:t> </a:t>
             </a:r>
             <a:r>
-              <a:rPr lang="en-US" altLang="ko-KR" sz="1200" b="0" dirty="0" err="1">
+              <a:rPr lang="en-US" altLang="ko-KR" sz="1200" b="0" dirty="0">
                 <a:solidFill>
                   <a:srgbClr val="9CDCFE"/>
                 </a:solidFill>
@@ -7116,12 +7035,8 @@
           <a:lstStyle/>
           <a:p>
             <a:r>
-              <a:rPr lang="en-US" altLang="ko-KR" dirty="0" err="1"/>
-              <a:t>BinaryEncoded</a:t>
-            </a:r>
-            <a:r>
               <a:rPr lang="en-US" altLang="ko-KR" dirty="0"/>
-              <a:t> = 1</a:t>
+              <a:t>BinaryEncoded = 1</a:t>
             </a:r>
             <a:endParaRPr lang="ko-KR" altLang="en-US" dirty="0"/>
           </a:p>
@@ -7225,7 +7140,7 @@
             <a:lstStyle/>
             <a:p>
               <a:pPr algn="ctr"/>
-              <a:endParaRPr lang="ko-KR" altLang="en-US"/>
+              <a:endParaRPr lang="ko-KR" altLang="en-US" dirty="0"/>
             </a:p>
           </p:txBody>
         </p:sp>
@@ -7302,15 +7217,7 @@
             </a:r>
             <a:r>
               <a:rPr lang="en-US" altLang="ko-KR" dirty="0"/>
-              <a:t>. (save as </a:t>
-            </a:r>
-            <a:r>
-              <a:rPr lang="en-US" altLang="ko-KR" dirty="0" err="1"/>
-              <a:t>earliear</a:t>
-            </a:r>
-            <a:r>
-              <a:rPr lang="en-US" altLang="ko-KR" dirty="0"/>
-              <a:t> version..</a:t>
+              <a:t>. (save as earliear version..</a:t>
             </a:r>
             <a:endParaRPr lang="ko-KR" altLang="en-US" dirty="0"/>
           </a:p>
@@ -7455,7 +7362,7 @@
               <a:t> </a:t>
             </a:r>
             <a:r>
-              <a:rPr lang="en-US" altLang="ko-KR" sz="1200" b="0" dirty="0" err="1">
+              <a:rPr lang="en-US" altLang="ko-KR" sz="1200" b="0" dirty="0">
                 <a:solidFill>
                   <a:srgbClr val="9CDCFE"/>
                 </a:solidFill>
@@ -7535,7 +7442,7 @@
               <a:t> </a:t>
             </a:r>
             <a:r>
-              <a:rPr lang="en-US" altLang="ko-KR" sz="1200" b="0" dirty="0" err="1">
+              <a:rPr lang="en-US" altLang="ko-KR" sz="1200" b="0" dirty="0">
                 <a:solidFill>
                   <a:srgbClr val="9CDCFE"/>
                 </a:solidFill>
@@ -7615,7 +7522,7 @@
               <a:t> </a:t>
             </a:r>
             <a:r>
-              <a:rPr lang="en-US" altLang="ko-KR" sz="1200" b="0" dirty="0" err="1">
+              <a:rPr lang="en-US" altLang="ko-KR" sz="1200" b="0" dirty="0">
                 <a:solidFill>
                   <a:srgbClr val="9CDCFE"/>
                 </a:solidFill>
@@ -7655,7 +7562,7 @@
               <a:t> </a:t>
             </a:r>
             <a:r>
-              <a:rPr lang="en-US" altLang="ko-KR" sz="1200" b="0" dirty="0" err="1">
+              <a:rPr lang="en-US" altLang="ko-KR" sz="1200" b="0" dirty="0">
                 <a:solidFill>
                   <a:srgbClr val="9CDCFE"/>
                 </a:solidFill>
@@ -7695,7 +7602,7 @@
               <a:t> </a:t>
             </a:r>
             <a:r>
-              <a:rPr lang="en-US" altLang="ko-KR" sz="1200" b="0" dirty="0" err="1">
+              <a:rPr lang="en-US" altLang="ko-KR" sz="1200" b="0" dirty="0">
                 <a:solidFill>
                   <a:srgbClr val="9CDCFE"/>
                 </a:solidFill>
@@ -7735,7 +7642,7 @@
               <a:t> </a:t>
             </a:r>
             <a:r>
-              <a:rPr lang="en-US" altLang="ko-KR" sz="1200" b="0" dirty="0" err="1">
+              <a:rPr lang="en-US" altLang="ko-KR" sz="1200" b="0" dirty="0">
                 <a:solidFill>
                   <a:srgbClr val="9CDCFE"/>
                 </a:solidFill>
@@ -7775,7 +7682,7 @@
               <a:t>&gt;</a:t>
             </a:r>
             <a:r>
-              <a:rPr lang="en-US" altLang="ko-KR" sz="1200" b="0" dirty="0" err="1">
+              <a:rPr lang="en-US" altLang="ko-KR" sz="1200" b="0" dirty="0">
                 <a:solidFill>
                   <a:srgbClr val="D4D4D4"/>
                 </a:solidFill>
@@ -7844,7 +7751,7 @@
               <a:t>&lt;</a:t>
             </a:r>
             <a:r>
-              <a:rPr lang="en-US" altLang="ko-KR" sz="1200" b="0" dirty="0" err="1">
+              <a:rPr lang="en-US" altLang="ko-KR" sz="1200" b="0" dirty="0">
                 <a:solidFill>
                   <a:srgbClr val="569CD6"/>
                 </a:solidFill>
@@ -7864,7 +7771,7 @@
               <a:t> </a:t>
             </a:r>
             <a:r>
-              <a:rPr lang="en-US" altLang="ko-KR" sz="1200" b="1" dirty="0" err="1">
+              <a:rPr lang="en-US" altLang="ko-KR" sz="1200" b="1" dirty="0">
                 <a:effectLst/>
                 <a:latin typeface="Consolas" panose="020B0609020204030204" pitchFamily="49" charset="0"/>
               </a:rPr>
@@ -7930,7 +7837,7 @@
               <a:t>&lt;</a:t>
             </a:r>
             <a:r>
-              <a:rPr lang="en-US" altLang="ko-KR" sz="1200" b="0" dirty="0" err="1">
+              <a:rPr lang="en-US" altLang="ko-KR" sz="1200" b="0" dirty="0">
                 <a:solidFill>
                   <a:srgbClr val="569CD6"/>
                 </a:solidFill>
@@ -7990,7 +7897,7 @@
               <a:t> </a:t>
             </a:r>
             <a:r>
-              <a:rPr lang="en-US" altLang="ko-KR" sz="1200" b="0" dirty="0" err="1">
+              <a:rPr lang="en-US" altLang="ko-KR" sz="1200" b="0" dirty="0">
                 <a:solidFill>
                   <a:srgbClr val="9CDCFE"/>
                 </a:solidFill>
@@ -8070,7 +7977,7 @@
               <a:t> </a:t>
             </a:r>
             <a:r>
-              <a:rPr lang="en-US" altLang="ko-KR" sz="1200" b="0" dirty="0" err="1">
+              <a:rPr lang="en-US" altLang="ko-KR" sz="1200" b="0" dirty="0">
                 <a:solidFill>
                   <a:srgbClr val="9CDCFE"/>
                 </a:solidFill>
@@ -8110,7 +8017,7 @@
               <a:t> </a:t>
             </a:r>
             <a:r>
-              <a:rPr lang="en-US" altLang="ko-KR" sz="1200" b="0" dirty="0" err="1">
+              <a:rPr lang="en-US" altLang="ko-KR" sz="1200" b="0" dirty="0">
                 <a:solidFill>
                   <a:srgbClr val="9CDCFE"/>
                 </a:solidFill>
@@ -8137,27 +8044,7 @@
                 <a:effectLst/>
                 <a:latin typeface="Consolas" panose="020B0609020204030204" pitchFamily="49" charset="0"/>
               </a:rPr>
-              <a:t>"</a:t>
-            </a:r>
-            <a:r>
-              <a:rPr lang="en-US" altLang="ko-KR" sz="1200" b="0" dirty="0" err="1">
-                <a:solidFill>
-                  <a:srgbClr val="CE9178"/>
-                </a:solidFill>
-                <a:effectLst/>
-                <a:latin typeface="Consolas" panose="020B0609020204030204" pitchFamily="49" charset="0"/>
-              </a:rPr>
-              <a:t>urn:schemas-microsoft-com:datatypes</a:t>
-            </a:r>
-            <a:r>
-              <a:rPr lang="en-US" altLang="ko-KR" sz="1200" b="0" dirty="0">
-                <a:solidFill>
-                  <a:srgbClr val="CE9178"/>
-                </a:solidFill>
-                <a:effectLst/>
-                <a:latin typeface="Consolas" panose="020B0609020204030204" pitchFamily="49" charset="0"/>
-              </a:rPr>
-              <a:t>"</a:t>
+              <a:t>"urn:schemas-microsoft-com:datatypes"</a:t>
             </a:r>
             <a:r>
               <a:rPr lang="en-US" altLang="ko-KR" sz="1200" b="0" dirty="0">
@@ -8170,15 +8057,17 @@
               <a:t>&gt;</a:t>
             </a:r>
             <a:r>
-              <a:rPr lang="en-US" altLang="ko-KR" sz="1200" b="0" dirty="0" err="1">
+              <a:rPr lang="en-US" altLang="ko-KR" sz="1200" b="0" dirty="0">
                 <a:solidFill>
                   <a:srgbClr val="D4D4D4"/>
                 </a:solidFill>
                 <a:effectLst/>
                 <a:latin typeface="Consolas" panose="020B0609020204030204" pitchFamily="49" charset="0"/>
               </a:rPr>
-              <a:t>QlpoOTFBWSZTWRYzCUEAAAHXgP</a:t>
-            </a:r>
+              <a:t>QlpoOTFBWSZTWRYzCUEAAAHXgP/xQCAIAAAJPACGAAABsACtQSJNU9pI9QMh6gUAAAZMgSak</a:t>
+            </a:r>
+          </a:p>
+          <a:p>
             <a:r>
               <a:rPr lang="en-US" altLang="ko-KR" sz="1200" b="0" dirty="0">
                 <a:solidFill>
@@ -8187,7 +8076,7 @@
                 <a:effectLst/>
                 <a:latin typeface="Consolas" panose="020B0609020204030204" pitchFamily="49" charset="0"/>
               </a:rPr>
-              <a:t>/xQCAIAAAJPACGAAABsACtQSJNU9pI9QMh6gUAAAZMgSak</a:t>
+              <a:t>mhGINNA2zUKzCPPEUprbGb+B1es43d0EtBFnBLy+9/JjvnvkaKgChFIsPTwho/EhTIKgbKaN</a:t>
             </a:r>
           </a:p>
           <a:p>
@@ -8199,37 +8088,37 @@
                 <a:effectLst/>
                 <a:latin typeface="Consolas" panose="020B0609020204030204" pitchFamily="49" charset="0"/>
               </a:rPr>
-              <a:t>mhGINNA2zUKzCPPEUprbGb+B1es43d0EtBFnBLy+9/</a:t>
-            </a:r>
-            <a:r>
-              <a:rPr lang="en-US" altLang="ko-KR" sz="1200" b="0" dirty="0" err="1">
-                <a:solidFill>
-                  <a:srgbClr val="D4D4D4"/>
-                </a:solidFill>
-                <a:effectLst/>
-                <a:latin typeface="Consolas" panose="020B0609020204030204" pitchFamily="49" charset="0"/>
-              </a:rPr>
-              <a:t>JjvnvkaKgChFIsPTwho</a:t>
-            </a:r>
-            <a:r>
-              <a:rPr lang="en-US" altLang="ko-KR" sz="1200" b="0" dirty="0">
-                <a:solidFill>
-                  <a:srgbClr val="D4D4D4"/>
-                </a:solidFill>
-                <a:effectLst/>
-                <a:latin typeface="Consolas" panose="020B0609020204030204" pitchFamily="49" charset="0"/>
-              </a:rPr>
-              <a:t>/</a:t>
-            </a:r>
-            <a:r>
-              <a:rPr lang="en-US" altLang="ko-KR" sz="1200" b="0" dirty="0" err="1">
-                <a:solidFill>
-                  <a:srgbClr val="D4D4D4"/>
-                </a:solidFill>
-                <a:effectLst/>
-                <a:latin typeface="Consolas" panose="020B0609020204030204" pitchFamily="49" charset="0"/>
-              </a:rPr>
-              <a:t>EhTIKgbKaN</a:t>
+              <a:t>a1qUL80waIiK9uCWTblM44nckl0MgZKYU3KLWhiHFGEO/8FsUl1B5F3JFOFCQFjMJQQ=</a:t>
+            </a:r>
+            <a:r>
+              <a:rPr lang="en-US" altLang="ko-KR" sz="1200" b="0" dirty="0">
+                <a:solidFill>
+                  <a:srgbClr val="808080"/>
+                </a:solidFill>
+                <a:effectLst/>
+                <a:latin typeface="Consolas" panose="020B0609020204030204" pitchFamily="49" charset="0"/>
+              </a:rPr>
+              <a:t>&lt;/</a:t>
+            </a:r>
+            <a:r>
+              <a:rPr lang="en-US" altLang="ko-KR" sz="1200" b="0" dirty="0">
+                <a:solidFill>
+                  <a:srgbClr val="569CD6"/>
+                </a:solidFill>
+                <a:effectLst/>
+                <a:latin typeface="Consolas" panose="020B0609020204030204" pitchFamily="49" charset="0"/>
+              </a:rPr>
+              <a:t>ProgramData</a:t>
+            </a:r>
+            <a:r>
+              <a:rPr lang="en-US" altLang="ko-KR" sz="1200" b="0" dirty="0">
+                <a:solidFill>
+                  <a:srgbClr val="808080"/>
+                </a:solidFill>
+                <a:effectLst/>
+                <a:latin typeface="Consolas" panose="020B0609020204030204" pitchFamily="49" charset="0"/>
+              </a:rPr>
+              <a:t>&gt;</a:t>
             </a:r>
             <a:endParaRPr lang="en-US" altLang="ko-KR" sz="1200" b="0" dirty="0">
               <a:solidFill>
@@ -8248,7 +8137,7 @@
                 <a:effectLst/>
                 <a:latin typeface="Consolas" panose="020B0609020204030204" pitchFamily="49" charset="0"/>
               </a:rPr>
-              <a:t>a1qUL80waIiK9uCWTblM44nckl0MgZKYU3KLWhiHFGEO/8FsUl1B5F3JFOFCQFjMJQQ=</a:t>
+              <a:t>            </a:t>
             </a:r>
             <a:r>
               <a:rPr lang="en-US" altLang="ko-KR" sz="1200" b="0" dirty="0">
@@ -8258,17 +8147,189 @@
                 <a:effectLst/>
                 <a:latin typeface="Consolas" panose="020B0609020204030204" pitchFamily="49" charset="0"/>
               </a:rPr>
+              <a:t>&lt;</a:t>
+            </a:r>
+            <a:r>
+              <a:rPr lang="en-US" altLang="ko-KR" sz="1200" b="0" dirty="0">
+                <a:solidFill>
+                  <a:srgbClr val="569CD6"/>
+                </a:solidFill>
+                <a:effectLst/>
+                <a:latin typeface="Consolas" panose="020B0609020204030204" pitchFamily="49" charset="0"/>
+              </a:rPr>
+              <a:t>OnlineUploadData</a:t>
+            </a:r>
+            <a:r>
+              <a:rPr lang="en-US" altLang="ko-KR" sz="1200" b="0" dirty="0">
+                <a:solidFill>
+                  <a:srgbClr val="D4D4D4"/>
+                </a:solidFill>
+                <a:effectLst/>
+                <a:latin typeface="Consolas" panose="020B0609020204030204" pitchFamily="49" charset="0"/>
+              </a:rPr>
+              <a:t> </a:t>
+            </a:r>
+            <a:r>
+              <a:rPr lang="en-US" altLang="ko-KR" sz="1200" b="0" dirty="0">
+                <a:solidFill>
+                  <a:srgbClr val="9CDCFE"/>
+                </a:solidFill>
+                <a:effectLst/>
+                <a:latin typeface="Consolas" panose="020B0609020204030204" pitchFamily="49" charset="0"/>
+              </a:rPr>
+              <a:t>Compressed</a:t>
+            </a:r>
+            <a:r>
+              <a:rPr lang="en-US" altLang="ko-KR" sz="1200" b="0" dirty="0">
+                <a:solidFill>
+                  <a:srgbClr val="D4D4D4"/>
+                </a:solidFill>
+                <a:effectLst/>
+                <a:latin typeface="Consolas" panose="020B0609020204030204" pitchFamily="49" charset="0"/>
+              </a:rPr>
+              <a:t>=</a:t>
+            </a:r>
+            <a:r>
+              <a:rPr lang="en-US" altLang="ko-KR" sz="1200" b="0" dirty="0">
+                <a:solidFill>
+                  <a:srgbClr val="CE9178"/>
+                </a:solidFill>
+                <a:effectLst/>
+                <a:latin typeface="Consolas" panose="020B0609020204030204" pitchFamily="49" charset="0"/>
+              </a:rPr>
+              <a:t>"1"</a:t>
+            </a:r>
+            <a:r>
+              <a:rPr lang="en-US" altLang="ko-KR" sz="1200" b="0" dirty="0">
+                <a:solidFill>
+                  <a:srgbClr val="D4D4D4"/>
+                </a:solidFill>
+                <a:effectLst/>
+                <a:latin typeface="Consolas" panose="020B0609020204030204" pitchFamily="49" charset="0"/>
+              </a:rPr>
+              <a:t> </a:t>
+            </a:r>
+            <a:r>
+              <a:rPr lang="en-US" altLang="ko-KR" sz="1200" b="0" dirty="0">
+                <a:solidFill>
+                  <a:srgbClr val="9CDCFE"/>
+                </a:solidFill>
+                <a:effectLst/>
+                <a:latin typeface="Consolas" panose="020B0609020204030204" pitchFamily="49" charset="0"/>
+              </a:rPr>
+              <a:t>dt:dt</a:t>
+            </a:r>
+            <a:r>
+              <a:rPr lang="en-US" altLang="ko-KR" sz="1200" b="0" dirty="0">
+                <a:solidFill>
+                  <a:srgbClr val="D4D4D4"/>
+                </a:solidFill>
+                <a:effectLst/>
+                <a:latin typeface="Consolas" panose="020B0609020204030204" pitchFamily="49" charset="0"/>
+              </a:rPr>
+              <a:t>=</a:t>
+            </a:r>
+            <a:r>
+              <a:rPr lang="en-US" altLang="ko-KR" sz="1200" b="0" dirty="0">
+                <a:solidFill>
+                  <a:srgbClr val="CE9178"/>
+                </a:solidFill>
+                <a:effectLst/>
+                <a:latin typeface="Consolas" panose="020B0609020204030204" pitchFamily="49" charset="0"/>
+              </a:rPr>
+              <a:t>"bin.base64"</a:t>
+            </a:r>
+            <a:r>
+              <a:rPr lang="en-US" altLang="ko-KR" sz="1200" b="0" dirty="0">
+                <a:solidFill>
+                  <a:srgbClr val="D4D4D4"/>
+                </a:solidFill>
+                <a:effectLst/>
+                <a:latin typeface="Consolas" panose="020B0609020204030204" pitchFamily="49" charset="0"/>
+              </a:rPr>
+              <a:t> </a:t>
+            </a:r>
+            <a:r>
+              <a:rPr lang="en-US" altLang="ko-KR" sz="1200" b="0" dirty="0">
+                <a:solidFill>
+                  <a:srgbClr val="9CDCFE"/>
+                </a:solidFill>
+                <a:effectLst/>
+                <a:latin typeface="Consolas" panose="020B0609020204030204" pitchFamily="49" charset="0"/>
+              </a:rPr>
+              <a:t>xmlns:dt</a:t>
+            </a:r>
+            <a:r>
+              <a:rPr lang="en-US" altLang="ko-KR" sz="1200" b="0" dirty="0">
+                <a:solidFill>
+                  <a:srgbClr val="D4D4D4"/>
+                </a:solidFill>
+                <a:effectLst/>
+                <a:latin typeface="Consolas" panose="020B0609020204030204" pitchFamily="49" charset="0"/>
+              </a:rPr>
+              <a:t>=</a:t>
+            </a:r>
+            <a:r>
+              <a:rPr lang="en-US" altLang="ko-KR" sz="1200" b="0" dirty="0">
+                <a:solidFill>
+                  <a:srgbClr val="CE9178"/>
+                </a:solidFill>
+                <a:effectLst/>
+                <a:latin typeface="Consolas" panose="020B0609020204030204" pitchFamily="49" charset="0"/>
+              </a:rPr>
+              <a:t>"urn:schemas-microsoft-com:datatypes"</a:t>
+            </a:r>
+            <a:r>
+              <a:rPr lang="en-US" altLang="ko-KR" sz="1200" b="0" dirty="0">
+                <a:solidFill>
+                  <a:srgbClr val="808080"/>
+                </a:solidFill>
+                <a:effectLst/>
+                <a:latin typeface="Consolas" panose="020B0609020204030204" pitchFamily="49" charset="0"/>
+              </a:rPr>
+              <a:t>&gt;</a:t>
+            </a:r>
+            <a:r>
+              <a:rPr lang="en-US" altLang="ko-KR" sz="1200" b="0" dirty="0">
+                <a:solidFill>
+                  <a:srgbClr val="D4D4D4"/>
+                </a:solidFill>
+                <a:effectLst/>
+                <a:latin typeface="Consolas" panose="020B0609020204030204" pitchFamily="49" charset="0"/>
+              </a:rPr>
+              <a:t>QlpoOTFBWSZTWY5iHkIAAA3eAOAQQAEwAAYEEQAAAaAAMQAACvKMj1MnqSRSSVXekyB44y38</a:t>
+            </a:r>
+          </a:p>
+          <a:p>
+            <a:r>
+              <a:rPr lang="en-US" altLang="ko-KR" sz="1200" b="0" dirty="0">
+                <a:solidFill>
+                  <a:srgbClr val="D4D4D4"/>
+                </a:solidFill>
+                <a:effectLst/>
+                <a:latin typeface="Consolas" panose="020B0609020204030204" pitchFamily="49" charset="0"/>
+              </a:rPr>
+              <a:t>XckU4UJCOYh5CA==</a:t>
+            </a:r>
+            <a:r>
+              <a:rPr lang="en-US" altLang="ko-KR" sz="1200" b="0" dirty="0">
+                <a:solidFill>
+                  <a:srgbClr val="808080"/>
+                </a:solidFill>
+                <a:effectLst/>
+                <a:latin typeface="Consolas" panose="020B0609020204030204" pitchFamily="49" charset="0"/>
+              </a:rPr>
               <a:t>&lt;/</a:t>
             </a:r>
             <a:r>
-              <a:rPr lang="en-US" altLang="ko-KR" sz="1200" b="0" dirty="0" err="1">
+              <a:rPr lang="en-US" altLang="ko-KR" sz="1200" b="0" dirty="0">
                 <a:solidFill>
                   <a:srgbClr val="569CD6"/>
                 </a:solidFill>
                 <a:effectLst/>
                 <a:latin typeface="Consolas" panose="020B0609020204030204" pitchFamily="49" charset="0"/>
               </a:rPr>
-              <a:t>ProgramData</a:t>
+              <a:t>OnlineUploadData</a:t>
             </a:r>
             <a:r>
               <a:rPr lang="en-US" altLang="ko-KR" sz="1200" b="0" dirty="0">
@@ -8297,7 +8358,7 @@
                 <a:effectLst/>
                 <a:latin typeface="Consolas" panose="020B0609020204030204" pitchFamily="49" charset="0"/>
               </a:rPr>
-              <a:t>            </a:t>
+              <a:t>        </a:t>
             </a:r>
             <a:r>
               <a:rPr lang="en-US" altLang="ko-KR" sz="1200" b="0" dirty="0">
@@ -8307,251 +8368,10 @@
                 <a:effectLst/>
                 <a:latin typeface="Consolas" panose="020B0609020204030204" pitchFamily="49" charset="0"/>
               </a:rPr>
-              <a:t>&lt;</a:t>
-            </a:r>
-            <a:r>
-              <a:rPr lang="en-US" altLang="ko-KR" sz="1200" b="0" dirty="0" err="1">
-                <a:solidFill>
-                  <a:srgbClr val="569CD6"/>
-                </a:solidFill>
-                <a:effectLst/>
-                <a:latin typeface="Consolas" panose="020B0609020204030204" pitchFamily="49" charset="0"/>
-              </a:rPr>
-              <a:t>OnlineUploadData</a:t>
-            </a:r>
-            <a:r>
-              <a:rPr lang="en-US" altLang="ko-KR" sz="1200" b="0" dirty="0">
-                <a:solidFill>
-                  <a:srgbClr val="D4D4D4"/>
-                </a:solidFill>
-                <a:effectLst/>
-                <a:latin typeface="Consolas" panose="020B0609020204030204" pitchFamily="49" charset="0"/>
-              </a:rPr>
-              <a:t> </a:t>
-            </a:r>
-            <a:r>
-              <a:rPr lang="en-US" altLang="ko-KR" sz="1200" b="0" dirty="0">
-                <a:solidFill>
-                  <a:srgbClr val="9CDCFE"/>
-                </a:solidFill>
-                <a:effectLst/>
-                <a:latin typeface="Consolas" panose="020B0609020204030204" pitchFamily="49" charset="0"/>
-              </a:rPr>
-              <a:t>Compressed</a:t>
-            </a:r>
-            <a:r>
-              <a:rPr lang="en-US" altLang="ko-KR" sz="1200" b="0" dirty="0">
-                <a:solidFill>
-                  <a:srgbClr val="D4D4D4"/>
-                </a:solidFill>
-                <a:effectLst/>
-                <a:latin typeface="Consolas" panose="020B0609020204030204" pitchFamily="49" charset="0"/>
-              </a:rPr>
-              <a:t>=</a:t>
-            </a:r>
-            <a:r>
-              <a:rPr lang="en-US" altLang="ko-KR" sz="1200" b="0" dirty="0">
-                <a:solidFill>
-                  <a:srgbClr val="CE9178"/>
-                </a:solidFill>
-                <a:effectLst/>
-                <a:latin typeface="Consolas" panose="020B0609020204030204" pitchFamily="49" charset="0"/>
-              </a:rPr>
-              <a:t>"1"</a:t>
-            </a:r>
-            <a:r>
-              <a:rPr lang="en-US" altLang="ko-KR" sz="1200" b="0" dirty="0">
-                <a:solidFill>
-                  <a:srgbClr val="D4D4D4"/>
-                </a:solidFill>
-                <a:effectLst/>
-                <a:latin typeface="Consolas" panose="020B0609020204030204" pitchFamily="49" charset="0"/>
-              </a:rPr>
-              <a:t> </a:t>
-            </a:r>
-            <a:r>
-              <a:rPr lang="en-US" altLang="ko-KR" sz="1200" b="0" dirty="0" err="1">
-                <a:solidFill>
-                  <a:srgbClr val="9CDCFE"/>
-                </a:solidFill>
-                <a:effectLst/>
-                <a:latin typeface="Consolas" panose="020B0609020204030204" pitchFamily="49" charset="0"/>
-              </a:rPr>
-              <a:t>dt:dt</a:t>
-            </a:r>
-            <a:r>
-              <a:rPr lang="en-US" altLang="ko-KR" sz="1200" b="0" dirty="0">
-                <a:solidFill>
-                  <a:srgbClr val="D4D4D4"/>
-                </a:solidFill>
-                <a:effectLst/>
-                <a:latin typeface="Consolas" panose="020B0609020204030204" pitchFamily="49" charset="0"/>
-              </a:rPr>
-              <a:t>=</a:t>
-            </a:r>
-            <a:r>
-              <a:rPr lang="en-US" altLang="ko-KR" sz="1200" b="0" dirty="0">
-                <a:solidFill>
-                  <a:srgbClr val="CE9178"/>
-                </a:solidFill>
-                <a:effectLst/>
-                <a:latin typeface="Consolas" panose="020B0609020204030204" pitchFamily="49" charset="0"/>
-              </a:rPr>
-              <a:t>"bin.base64"</a:t>
-            </a:r>
-            <a:r>
-              <a:rPr lang="en-US" altLang="ko-KR" sz="1200" b="0" dirty="0">
-                <a:solidFill>
-                  <a:srgbClr val="D4D4D4"/>
-                </a:solidFill>
-                <a:effectLst/>
-                <a:latin typeface="Consolas" panose="020B0609020204030204" pitchFamily="49" charset="0"/>
-              </a:rPr>
-              <a:t> </a:t>
-            </a:r>
-            <a:r>
-              <a:rPr lang="en-US" altLang="ko-KR" sz="1200" b="0" dirty="0" err="1">
-                <a:solidFill>
-                  <a:srgbClr val="9CDCFE"/>
-                </a:solidFill>
-                <a:effectLst/>
-                <a:latin typeface="Consolas" panose="020B0609020204030204" pitchFamily="49" charset="0"/>
-              </a:rPr>
-              <a:t>xmlns:dt</a:t>
-            </a:r>
-            <a:r>
-              <a:rPr lang="en-US" altLang="ko-KR" sz="1200" b="0" dirty="0">
-                <a:solidFill>
-                  <a:srgbClr val="D4D4D4"/>
-                </a:solidFill>
-                <a:effectLst/>
-                <a:latin typeface="Consolas" panose="020B0609020204030204" pitchFamily="49" charset="0"/>
-              </a:rPr>
-              <a:t>=</a:t>
-            </a:r>
-            <a:r>
-              <a:rPr lang="en-US" altLang="ko-KR" sz="1200" b="0" dirty="0">
-                <a:solidFill>
-                  <a:srgbClr val="CE9178"/>
-                </a:solidFill>
-                <a:effectLst/>
-                <a:latin typeface="Consolas" panose="020B0609020204030204" pitchFamily="49" charset="0"/>
-              </a:rPr>
-              <a:t>"</a:t>
-            </a:r>
-            <a:r>
-              <a:rPr lang="en-US" altLang="ko-KR" sz="1200" b="0" dirty="0" err="1">
-                <a:solidFill>
-                  <a:srgbClr val="CE9178"/>
-                </a:solidFill>
-                <a:effectLst/>
-                <a:latin typeface="Consolas" panose="020B0609020204030204" pitchFamily="49" charset="0"/>
-              </a:rPr>
-              <a:t>urn:schemas-microsoft-com:datatypes</a:t>
-            </a:r>
-            <a:r>
-              <a:rPr lang="en-US" altLang="ko-KR" sz="1200" b="0" dirty="0">
-                <a:solidFill>
-                  <a:srgbClr val="CE9178"/>
-                </a:solidFill>
-                <a:effectLst/>
-                <a:latin typeface="Consolas" panose="020B0609020204030204" pitchFamily="49" charset="0"/>
-              </a:rPr>
-              <a:t>"</a:t>
-            </a:r>
-            <a:r>
-              <a:rPr lang="en-US" altLang="ko-KR" sz="1200" b="0" dirty="0">
-                <a:solidFill>
-                  <a:srgbClr val="808080"/>
-                </a:solidFill>
-                <a:effectLst/>
-                <a:latin typeface="Consolas" panose="020B0609020204030204" pitchFamily="49" charset="0"/>
-              </a:rPr>
-              <a:t>&gt;</a:t>
-            </a:r>
-            <a:r>
-              <a:rPr lang="en-US" altLang="ko-KR" sz="1200" b="0" dirty="0">
-                <a:solidFill>
-                  <a:srgbClr val="D4D4D4"/>
-                </a:solidFill>
-                <a:effectLst/>
-                <a:latin typeface="Consolas" panose="020B0609020204030204" pitchFamily="49" charset="0"/>
-              </a:rPr>
-              <a:t>QlpoOTFBWSZTWY5iHkIAAA3eAOAQQAEwAAYEEQAAAaAAMQAACvKMj1MnqSRSSVXekyB44y38</a:t>
-            </a:r>
-          </a:p>
-          <a:p>
-            <a:r>
-              <a:rPr lang="en-US" altLang="ko-KR" sz="1200" b="0" dirty="0">
-                <a:solidFill>
-                  <a:srgbClr val="D4D4D4"/>
-                </a:solidFill>
-                <a:effectLst/>
-                <a:latin typeface="Consolas" panose="020B0609020204030204" pitchFamily="49" charset="0"/>
-              </a:rPr>
-              <a:t>XckU4UJCOYh5CA==</a:t>
-            </a:r>
-            <a:r>
-              <a:rPr lang="en-US" altLang="ko-KR" sz="1200" b="0" dirty="0">
-                <a:solidFill>
-                  <a:srgbClr val="808080"/>
-                </a:solidFill>
-                <a:effectLst/>
-                <a:latin typeface="Consolas" panose="020B0609020204030204" pitchFamily="49" charset="0"/>
-              </a:rPr>
               <a:t>&lt;/</a:t>
             </a:r>
             <a:r>
-              <a:rPr lang="en-US" altLang="ko-KR" sz="1200" b="0" dirty="0" err="1">
-                <a:solidFill>
-                  <a:srgbClr val="569CD6"/>
-                </a:solidFill>
-                <a:effectLst/>
-                <a:latin typeface="Consolas" panose="020B0609020204030204" pitchFamily="49" charset="0"/>
-              </a:rPr>
-              <a:t>OnlineUploadData</a:t>
-            </a:r>
-            <a:r>
-              <a:rPr lang="en-US" altLang="ko-KR" sz="1200" b="0" dirty="0">
-                <a:solidFill>
-                  <a:srgbClr val="808080"/>
-                </a:solidFill>
-                <a:effectLst/>
-                <a:latin typeface="Consolas" panose="020B0609020204030204" pitchFamily="49" charset="0"/>
-              </a:rPr>
-              <a:t>&gt;</a:t>
-            </a:r>
-            <a:endParaRPr lang="en-US" altLang="ko-KR" sz="1200" b="0" dirty="0">
-              <a:solidFill>
-                <a:srgbClr val="D4D4D4"/>
-              </a:solidFill>
-              <a:effectLst/>
-              <a:latin typeface="Consolas" panose="020B0609020204030204" pitchFamily="49" charset="0"/>
-            </a:endParaRPr>
-          </a:p>
-          <a:p>
-            <a:r>
-              <a:rPr lang="en-US" altLang="ko-KR" sz="1200" b="0" dirty="0">
-                <a:solidFill>
-                  <a:srgbClr val="D4D4D4"/>
-                </a:solidFill>
-                <a:effectLst/>
-                <a:latin typeface="Consolas" panose="020B0609020204030204" pitchFamily="49" charset="0"/>
-              </a:rPr>
-              <a:t>        </a:t>
-            </a:r>
-            <a:r>
-              <a:rPr lang="en-US" altLang="ko-KR" sz="1200" b="0" dirty="0">
-                <a:solidFill>
-                  <a:srgbClr val="808080"/>
-                </a:solidFill>
-                <a:effectLst/>
-                <a:latin typeface="Consolas" panose="020B0609020204030204" pitchFamily="49" charset="0"/>
-              </a:rPr>
-              <a:t>&lt;/</a:t>
-            </a:r>
-            <a:r>
-              <a:rPr lang="en-US" altLang="ko-KR" sz="1200" b="0" dirty="0" err="1">
+              <a:rPr lang="en-US" altLang="ko-KR" sz="1200" b="0" dirty="0">
                 <a:solidFill>
                   <a:srgbClr val="569CD6"/>
                 </a:solidFill>
@@ -8673,8 +8493,8 @@
         </p:nvSpPr>
         <p:spPr>
           <a:xfrm>
-            <a:off x="5394036" y="3059668"/>
-            <a:ext cx="2069797" cy="369332"/>
+            <a:off x="2458871" y="4001793"/>
+            <a:ext cx="4403770" cy="276999"/>
           </a:xfrm>
           <a:prstGeom prst="rect">
             <a:avLst/>
@@ -8688,7 +8508,7 @@
           <a:lstStyle/>
           <a:p>
             <a:r>
-              <a:rPr lang="en-US" altLang="ko-KR" sz="1800" dirty="0" err="1">
+              <a:rPr lang="en-US" altLang="ko-KR" sz="1200" dirty="0">
                 <a:solidFill>
                   <a:srgbClr val="000000"/>
                 </a:solidFill>
@@ -8697,7 +8517,7 @@
               <a:t>drawCmd</a:t>
             </a:r>
             <a:r>
-              <a:rPr lang="en-US" altLang="ko-KR" sz="1800" dirty="0" err="1">
+              <a:rPr lang="en-US" altLang="ko-KR" sz="1200" dirty="0">
                 <a:solidFill>
                   <a:schemeClr val="bg1">
                     <a:lumMod val="85000"/>
@@ -8705,13 +8525,29 @@
                 </a:solidFill>
                 <a:latin typeface="Cascadia Mono" panose="020B0609020000020004" pitchFamily="49" charset="0"/>
               </a:rPr>
-              <a:t>Counter</a:t>
-            </a:r>
-            <a:endParaRPr lang="ko-KR" altLang="en-US" dirty="0">
+              <a:t>Counter: </a:t>
+            </a:r>
+            <a:r>
+              <a:rPr lang="en-US" altLang="ko-KR" sz="1200" dirty="0">
+                <a:solidFill>
+                  <a:srgbClr val="000000"/>
+                </a:solidFill>
+                <a:latin typeface="Cascadia Mono" panose="020B0609020000020004" pitchFamily="49" charset="0"/>
+              </a:rPr>
+              <a:t>: </a:t>
+            </a:r>
+            <a:r>
+              <a:rPr lang="en-US" altLang="ko-KR" sz="1200" dirty="0">
+                <a:solidFill>
+                  <a:srgbClr val="00B050"/>
+                </a:solidFill>
+                <a:latin typeface="Cascadia Mono" panose="020B0609020000020004" pitchFamily="49" charset="0"/>
+              </a:rPr>
+              <a:t>CoordinatedRungXmlsForCommand</a:t>
+            </a:r>
+            <a:endParaRPr lang="ko-KR" altLang="en-US" sz="1200" dirty="0">
               <a:solidFill>
-                <a:schemeClr val="bg1">
-                  <a:lumMod val="85000"/>
-                </a:schemeClr>
+                <a:srgbClr val="00B050"/>
               </a:solidFill>
             </a:endParaRPr>
           </a:p>
@@ -8731,8 +8567,8 @@
         </p:nvSpPr>
         <p:spPr>
           <a:xfrm>
-            <a:off x="4561115" y="2521527"/>
-            <a:ext cx="1665841" cy="369332"/>
+            <a:off x="2122338" y="3609642"/>
+            <a:ext cx="3506088" cy="276999"/>
           </a:xfrm>
           <a:prstGeom prst="rect">
             <a:avLst/>
@@ -8746,15 +8582,28 @@
           <a:lstStyle/>
           <a:p>
             <a:r>
-              <a:rPr lang="en-US" altLang="ko-KR" sz="1800" dirty="0" err="1">
+              <a:rPr lang="en-US" altLang="ko-KR" sz="1200" dirty="0">
                 <a:solidFill>
                   <a:srgbClr val="000000"/>
                 </a:solidFill>
                 <a:latin typeface="Cascadia Mono" panose="020B0609020000020004" pitchFamily="49" charset="0"/>
               </a:rPr>
-              <a:t>drawCommand</a:t>
-            </a:r>
-            <a:endParaRPr lang="ko-KR" altLang="en-US" dirty="0"/>
+              <a:t>drawCommand: </a:t>
+            </a:r>
+            <a:r>
+              <a:rPr lang="en-US" altLang="ko-KR" sz="1200" dirty="0">
+                <a:solidFill>
+                  <a:srgbClr val="00B050"/>
+                </a:solidFill>
+                <a:latin typeface="Cascadia Mono" panose="020B0609020000020004" pitchFamily="49" charset="0"/>
+              </a:rPr>
+              <a:t>int*[CoordinatedRungXml]</a:t>
+            </a:r>
+            <a:endParaRPr lang="ko-KR" altLang="en-US" sz="1200" dirty="0">
+              <a:solidFill>
+                <a:srgbClr val="00B050"/>
+              </a:solidFill>
+            </a:endParaRPr>
           </a:p>
         </p:txBody>
       </p:sp>
@@ -8772,8 +8621,8 @@
         </p:nvSpPr>
         <p:spPr>
           <a:xfrm>
-            <a:off x="3837840" y="2082799"/>
-            <a:ext cx="723275" cy="369332"/>
+            <a:off x="1776278" y="2522246"/>
+            <a:ext cx="2339102" cy="276999"/>
           </a:xfrm>
           <a:prstGeom prst="rect">
             <a:avLst/>
@@ -8787,15 +8636,28 @@
           <a:lstStyle/>
           <a:p>
             <a:r>
-              <a:rPr lang="en-US" altLang="ko-KR" sz="1800" dirty="0">
+              <a:rPr lang="en-US" altLang="ko-KR" sz="1200" dirty="0">
                 <a:solidFill>
                   <a:srgbClr val="000000"/>
                 </a:solidFill>
                 <a:latin typeface="Cascadia Mono" panose="020B0609020000020004" pitchFamily="49" charset="0"/>
               </a:rPr>
-              <a:t>rung</a:t>
-            </a:r>
-            <a:endParaRPr lang="ko-KR" altLang="en-US" dirty="0"/>
+              <a:t>rung: </a:t>
+            </a:r>
+            <a:r>
+              <a:rPr lang="en-US" altLang="ko-KR" sz="1200" dirty="0">
+                <a:solidFill>
+                  <a:srgbClr val="00B050"/>
+                </a:solidFill>
+                <a:latin typeface="Cascadia Mono" panose="020B0609020000020004" pitchFamily="49" charset="0"/>
+              </a:rPr>
+              <a:t>CoordinatedRungXml</a:t>
+            </a:r>
+            <a:endParaRPr lang="ko-KR" altLang="en-US" sz="1200" dirty="0">
+              <a:solidFill>
+                <a:srgbClr val="00B050"/>
+              </a:solidFill>
+            </a:endParaRPr>
           </a:p>
         </p:txBody>
       </p:sp>
@@ -8813,8 +8675,8 @@
         </p:nvSpPr>
         <p:spPr>
           <a:xfrm>
-            <a:off x="3114565" y="1644071"/>
-            <a:ext cx="1127232" cy="369332"/>
+            <a:off x="1505863" y="2146710"/>
+            <a:ext cx="2608406" cy="276999"/>
           </a:xfrm>
           <a:prstGeom prst="rect">
             <a:avLst/>
@@ -8828,15 +8690,28 @@
           <a:lstStyle/>
           <a:p>
             <a:r>
-              <a:rPr lang="en-US" altLang="ko-KR" sz="1800" dirty="0" err="1">
+              <a:rPr lang="en-US" altLang="ko-KR" sz="1200" dirty="0">
                 <a:solidFill>
                   <a:srgbClr val="000000"/>
                 </a:solidFill>
                 <a:latin typeface="Cascadia Mono" panose="020B0609020000020004" pitchFamily="49" charset="0"/>
               </a:rPr>
-              <a:t>xmlRung</a:t>
-            </a:r>
-            <a:endParaRPr lang="ko-KR" altLang="en-US" dirty="0"/>
+              <a:t>xmlRung: </a:t>
+            </a:r>
+            <a:r>
+              <a:rPr lang="en-US" altLang="ko-KR" sz="1200" dirty="0">
+                <a:solidFill>
+                  <a:srgbClr val="00B050"/>
+                </a:solidFill>
+                <a:latin typeface="Cascadia Mono" panose="020B0609020000020004" pitchFamily="49" charset="0"/>
+              </a:rPr>
+              <a:t>RungGenerationInfo</a:t>
+            </a:r>
+            <a:endParaRPr lang="ko-KR" altLang="en-US" sz="1200" dirty="0">
+              <a:solidFill>
+                <a:srgbClr val="00B050"/>
+              </a:solidFill>
+            </a:endParaRPr>
           </a:p>
         </p:txBody>
       </p:sp>
@@ -8854,7 +8729,954 @@
         </p:nvSpPr>
         <p:spPr>
           <a:xfrm>
-            <a:off x="2269438" y="1205343"/>
+            <a:off x="1155915" y="1800315"/>
+            <a:ext cx="1351652" cy="276999"/>
+          </a:xfrm>
+          <a:prstGeom prst="rect">
+            <a:avLst/>
+          </a:prstGeom>
+          <a:noFill/>
+        </p:spPr>
+        <p:txBody>
+          <a:bodyPr wrap="none" rtlCol="0">
+            <a:spAutoFit/>
+          </a:bodyPr>
+          <a:lstStyle/>
+          <a:p>
+            <a:r>
+              <a:rPr lang="en-US" altLang="ko-KR" sz="1200" dirty="0">
+                <a:solidFill>
+                  <a:srgbClr val="000000"/>
+                </a:solidFill>
+                <a:latin typeface="Cascadia Mono" panose="020B0609020000020004" pitchFamily="49" charset="0"/>
+              </a:rPr>
+              <a:t>generateRungs</a:t>
+            </a:r>
+            <a:endParaRPr lang="ko-KR" altLang="en-US" sz="1200" dirty="0"/>
+          </a:p>
+        </p:txBody>
+      </p:sp>
+      <p:sp>
+        <p:nvSpPr>
+          <p:cNvPr id="11" name="TextBox 10">
+            <a:extLst>
+              <a:ext uri="{FF2B5EF4-FFF2-40B4-BE49-F238E27FC236}">
+                <a16:creationId xmlns:a16="http://schemas.microsoft.com/office/drawing/2014/main" id="{8E513A60-98D1-6A30-203C-DD47A80E7ADD}"/>
+              </a:ext>
+            </a:extLst>
+          </p:cNvPr>
+          <p:cNvSpPr txBox="1"/>
+          <p:nvPr/>
+        </p:nvSpPr>
+        <p:spPr>
+          <a:xfrm>
+            <a:off x="333747" y="867962"/>
+            <a:ext cx="1172116" cy="276999"/>
+          </a:xfrm>
+          <a:prstGeom prst="rect">
+            <a:avLst/>
+          </a:prstGeom>
+          <a:noFill/>
+        </p:spPr>
+        <p:txBody>
+          <a:bodyPr wrap="none" rtlCol="0">
+            <a:spAutoFit/>
+          </a:bodyPr>
+          <a:lstStyle/>
+          <a:p>
+            <a:r>
+              <a:rPr lang="en-US" altLang="ko-KR" sz="1200" dirty="0">
+                <a:solidFill>
+                  <a:srgbClr val="000000"/>
+                </a:solidFill>
+                <a:latin typeface="Cascadia Mono" panose="020B0609020000020004" pitchFamily="49" charset="0"/>
+              </a:rPr>
+              <a:t>generateXml</a:t>
+            </a:r>
+            <a:endParaRPr lang="ko-KR" altLang="en-US" sz="1200" dirty="0"/>
+          </a:p>
+        </p:txBody>
+      </p:sp>
+      <p:sp>
+        <p:nvSpPr>
+          <p:cNvPr id="12" name="TextBox 11">
+            <a:extLst>
+              <a:ext uri="{FF2B5EF4-FFF2-40B4-BE49-F238E27FC236}">
+                <a16:creationId xmlns:a16="http://schemas.microsoft.com/office/drawing/2014/main" id="{5F71AA54-8FAE-EAF9-2525-DD743F1FF737}"/>
+              </a:ext>
+            </a:extLst>
+          </p:cNvPr>
+          <p:cNvSpPr txBox="1"/>
+          <p:nvPr/>
+        </p:nvSpPr>
+        <p:spPr>
+          <a:xfrm>
+            <a:off x="654519" y="1361587"/>
+            <a:ext cx="2608406" cy="276999"/>
+          </a:xfrm>
+          <a:prstGeom prst="rect">
+            <a:avLst/>
+          </a:prstGeom>
+          <a:noFill/>
+        </p:spPr>
+        <p:txBody>
+          <a:bodyPr wrap="none" rtlCol="0">
+            <a:spAutoFit/>
+          </a:bodyPr>
+          <a:lstStyle/>
+          <a:p>
+            <a:r>
+              <a:rPr lang="en-US" altLang="ko-KR" sz="1200" dirty="0">
+                <a:solidFill>
+                  <a:srgbClr val="000000"/>
+                </a:solidFill>
+                <a:latin typeface="Cascadia Mono" panose="020B0609020000020004" pitchFamily="49" charset="0"/>
+              </a:rPr>
+              <a:t>generateXGIXmlFromStatement</a:t>
+            </a:r>
+            <a:endParaRPr lang="ko-KR" altLang="en-US" sz="1200" dirty="0"/>
+          </a:p>
+        </p:txBody>
+      </p:sp>
+      <p:sp>
+        <p:nvSpPr>
+          <p:cNvPr id="13" name="TextBox 12">
+            <a:extLst>
+              <a:ext uri="{FF2B5EF4-FFF2-40B4-BE49-F238E27FC236}">
+                <a16:creationId xmlns:a16="http://schemas.microsoft.com/office/drawing/2014/main" id="{7D9ABF0A-CDF9-77D6-D9E6-32908F04D038}"/>
+              </a:ext>
+            </a:extLst>
+          </p:cNvPr>
+          <p:cNvSpPr txBox="1"/>
+          <p:nvPr/>
+        </p:nvSpPr>
+        <p:spPr>
+          <a:xfrm>
+            <a:off x="2122337" y="4440149"/>
+            <a:ext cx="3236784" cy="276999"/>
+          </a:xfrm>
+          <a:prstGeom prst="rect">
+            <a:avLst/>
+          </a:prstGeom>
+          <a:noFill/>
+        </p:spPr>
+        <p:txBody>
+          <a:bodyPr wrap="none" rtlCol="0">
+            <a:spAutoFit/>
+          </a:bodyPr>
+          <a:lstStyle/>
+          <a:p>
+            <a:r>
+              <a:rPr lang="en-US" altLang="ko-KR" sz="1200" dirty="0">
+                <a:solidFill>
+                  <a:srgbClr val="000000"/>
+                </a:solidFill>
+                <a:latin typeface="Cascadia Mono" panose="020B0609020000020004" pitchFamily="49" charset="0"/>
+              </a:rPr>
+              <a:t>drawCoil: </a:t>
+            </a:r>
+            <a:r>
+              <a:rPr lang="en-US" altLang="ko-KR" sz="1200" dirty="0">
+                <a:solidFill>
+                  <a:srgbClr val="00B050"/>
+                </a:solidFill>
+                <a:latin typeface="Cascadia Mono" panose="020B0609020000020004" pitchFamily="49" charset="0"/>
+              </a:rPr>
+              <a:t>int*[CoordinatedRungXml]</a:t>
+            </a:r>
+            <a:endParaRPr lang="ko-KR" altLang="en-US" sz="1200" dirty="0">
+              <a:solidFill>
+                <a:srgbClr val="00B050"/>
+              </a:solidFill>
+            </a:endParaRPr>
+          </a:p>
+        </p:txBody>
+      </p:sp>
+      <p:sp>
+        <p:nvSpPr>
+          <p:cNvPr id="15" name="TextBox 14">
+            <a:extLst>
+              <a:ext uri="{FF2B5EF4-FFF2-40B4-BE49-F238E27FC236}">
+                <a16:creationId xmlns:a16="http://schemas.microsoft.com/office/drawing/2014/main" id="{5C49C227-BEDB-6C74-5C41-11E541ECCCDC}"/>
+              </a:ext>
+            </a:extLst>
+          </p:cNvPr>
+          <p:cNvSpPr txBox="1"/>
+          <p:nvPr/>
+        </p:nvSpPr>
+        <p:spPr>
+          <a:xfrm>
+            <a:off x="2122337" y="2960176"/>
+            <a:ext cx="2069797" cy="276999"/>
+          </a:xfrm>
+          <a:prstGeom prst="rect">
+            <a:avLst/>
+          </a:prstGeom>
+          <a:noFill/>
+        </p:spPr>
+        <p:txBody>
+          <a:bodyPr wrap="none" rtlCol="0">
+            <a:spAutoFit/>
+          </a:bodyPr>
+          <a:lstStyle/>
+          <a:p>
+            <a:r>
+              <a:rPr lang="en-US" altLang="ko-KR" sz="1200" dirty="0">
+                <a:solidFill>
+                  <a:srgbClr val="000000"/>
+                </a:solidFill>
+                <a:latin typeface="Cascadia Mono" panose="020B0609020000020004" pitchFamily="49" charset="0"/>
+              </a:rPr>
+              <a:t>rng: </a:t>
+            </a:r>
+            <a:r>
+              <a:rPr lang="en-US" altLang="ko-KR" sz="1200" dirty="0">
+                <a:solidFill>
+                  <a:srgbClr val="00B050"/>
+                </a:solidFill>
+                <a:latin typeface="Cascadia Mono" panose="020B0609020000020004" pitchFamily="49" charset="0"/>
+              </a:rPr>
+              <a:t>RungInfoWithScan</a:t>
+            </a:r>
+            <a:endParaRPr lang="ko-KR" altLang="en-US" sz="1200" dirty="0">
+              <a:solidFill>
+                <a:srgbClr val="00B050"/>
+              </a:solidFill>
+            </a:endParaRPr>
+          </a:p>
+        </p:txBody>
+      </p:sp>
+      <p:sp>
+        <p:nvSpPr>
+          <p:cNvPr id="17" name="TextBox 16">
+            <a:extLst>
+              <a:ext uri="{FF2B5EF4-FFF2-40B4-BE49-F238E27FC236}">
+                <a16:creationId xmlns:a16="http://schemas.microsoft.com/office/drawing/2014/main" id="{1D696EC7-38D6-F19D-3574-128D509B76BC}"/>
+              </a:ext>
+            </a:extLst>
+          </p:cNvPr>
+          <p:cNvSpPr txBox="1"/>
+          <p:nvPr/>
+        </p:nvSpPr>
+        <p:spPr>
+          <a:xfrm>
+            <a:off x="7162757" y="1006461"/>
+            <a:ext cx="5140744" cy="4339650"/>
+          </a:xfrm>
+          <a:prstGeom prst="rect">
+            <a:avLst/>
+          </a:prstGeom>
+          <a:noFill/>
+        </p:spPr>
+        <p:txBody>
+          <a:bodyPr wrap="square">
+            <a:spAutoFit/>
+          </a:bodyPr>
+          <a:lstStyle/>
+          <a:p>
+            <a:r>
+              <a:rPr lang="en-US" altLang="ko-KR" sz="1200" dirty="0">
+                <a:solidFill>
+                  <a:srgbClr val="0000FF"/>
+                </a:solidFill>
+                <a:latin typeface="Cascadia Mono" panose="020B0609020000020004" pitchFamily="49" charset="0"/>
+              </a:rPr>
+              <a:t>type</a:t>
+            </a:r>
+            <a:r>
+              <a:rPr lang="en-US" altLang="ko-KR" sz="1200" dirty="0">
+                <a:solidFill>
+                  <a:srgbClr val="000000"/>
+                </a:solidFill>
+                <a:latin typeface="Cascadia Mono" panose="020B0609020000020004" pitchFamily="49" charset="0"/>
+              </a:rPr>
+              <a:t> XmlOutput = string</a:t>
+            </a:r>
+          </a:p>
+          <a:p>
+            <a:r>
+              <a:rPr lang="en-US" altLang="ko-KR" sz="1200" dirty="0">
+                <a:solidFill>
+                  <a:srgbClr val="0000FF"/>
+                </a:solidFill>
+                <a:latin typeface="Cascadia Mono" panose="020B0609020000020004" pitchFamily="49" charset="0"/>
+              </a:rPr>
+              <a:t>type</a:t>
+            </a:r>
+            <a:r>
+              <a:rPr lang="en-US" altLang="ko-KR" sz="1200" dirty="0">
+                <a:solidFill>
+                  <a:srgbClr val="000000"/>
+                </a:solidFill>
+                <a:latin typeface="Cascadia Mono" panose="020B0609020000020004" pitchFamily="49" charset="0"/>
+              </a:rPr>
+              <a:t> EncodedXYCoordinate = int</a:t>
+            </a:r>
+          </a:p>
+          <a:p>
+            <a:r>
+              <a:rPr lang="en-US" altLang="ko-KR" sz="1200" dirty="0">
+                <a:solidFill>
+                  <a:srgbClr val="0000FF"/>
+                </a:solidFill>
+                <a:latin typeface="Cascadia Mono" panose="020B0609020000020004" pitchFamily="49" charset="0"/>
+              </a:rPr>
+              <a:t>type</a:t>
+            </a:r>
+            <a:r>
+              <a:rPr lang="en-US" altLang="ko-KR" sz="1200" dirty="0">
+                <a:solidFill>
+                  <a:srgbClr val="000000"/>
+                </a:solidFill>
+                <a:latin typeface="Cascadia Mono" panose="020B0609020000020004" pitchFamily="49" charset="0"/>
+              </a:rPr>
+              <a:t> CoordinatedRungXml = {</a:t>
+            </a:r>
+          </a:p>
+          <a:p>
+            <a:r>
+              <a:rPr lang="en-US" altLang="ko-KR" sz="1200" dirty="0">
+                <a:solidFill>
+                  <a:srgbClr val="000000"/>
+                </a:solidFill>
+                <a:latin typeface="Cascadia Mono" panose="020B0609020000020004" pitchFamily="49" charset="0"/>
+              </a:rPr>
+              <a:t>    Coordinate: EncodedXYCoordinate   </a:t>
+            </a:r>
+            <a:r>
+              <a:rPr lang="en-US" altLang="ko-KR" sz="1200" dirty="0">
+                <a:solidFill>
+                  <a:srgbClr val="008000"/>
+                </a:solidFill>
+                <a:latin typeface="Cascadia Mono" panose="020B0609020000020004" pitchFamily="49" charset="0"/>
+              </a:rPr>
+              <a:t>// int</a:t>
+            </a:r>
+            <a:endParaRPr lang="en-US" altLang="ko-KR" sz="1200" dirty="0">
+              <a:solidFill>
+                <a:srgbClr val="000000"/>
+              </a:solidFill>
+              <a:latin typeface="Cascadia Mono" panose="020B0609020000020004" pitchFamily="49" charset="0"/>
+            </a:endParaRPr>
+          </a:p>
+          <a:p>
+            <a:r>
+              <a:rPr lang="en-US" altLang="ko-KR" sz="1200" dirty="0">
+                <a:solidFill>
+                  <a:srgbClr val="000000"/>
+                </a:solidFill>
+                <a:latin typeface="Cascadia Mono" panose="020B0609020000020004" pitchFamily="49" charset="0"/>
+              </a:rPr>
+              <a:t>    Xml: XmlOutput                  </a:t>
+            </a:r>
+            <a:r>
+              <a:rPr lang="en-US" altLang="ko-KR" sz="1200" dirty="0">
+                <a:solidFill>
+                  <a:srgbClr val="008000"/>
+                </a:solidFill>
+                <a:latin typeface="Cascadia Mono" panose="020B0609020000020004" pitchFamily="49" charset="0"/>
+              </a:rPr>
+              <a:t>// string</a:t>
+            </a:r>
+            <a:endParaRPr lang="en-US" altLang="ko-KR" sz="1200" dirty="0">
+              <a:solidFill>
+                <a:srgbClr val="000000"/>
+              </a:solidFill>
+              <a:latin typeface="Cascadia Mono" panose="020B0609020000020004" pitchFamily="49" charset="0"/>
+            </a:endParaRPr>
+          </a:p>
+          <a:p>
+            <a:r>
+              <a:rPr lang="en-US" altLang="ko-KR" sz="1200" dirty="0">
+                <a:solidFill>
+                  <a:srgbClr val="000000"/>
+                </a:solidFill>
+                <a:latin typeface="Cascadia Mono" panose="020B0609020000020004" pitchFamily="49" charset="0"/>
+              </a:rPr>
+              <a:t>}</a:t>
+            </a:r>
+          </a:p>
+          <a:p>
+            <a:endParaRPr lang="ko-KR" altLang="en-US" sz="1200" dirty="0">
+              <a:solidFill>
+                <a:srgbClr val="000000"/>
+              </a:solidFill>
+              <a:latin typeface="Cascadia Mono" panose="020B0609020000020004" pitchFamily="49" charset="0"/>
+            </a:endParaRPr>
+          </a:p>
+          <a:p>
+            <a:r>
+              <a:rPr lang="en-US" altLang="ko-KR" sz="1200" dirty="0">
+                <a:solidFill>
+                  <a:srgbClr val="0000FF"/>
+                </a:solidFill>
+                <a:latin typeface="Cascadia Mono" panose="020B0609020000020004" pitchFamily="49" charset="0"/>
+              </a:rPr>
+              <a:t>type</a:t>
+            </a:r>
+            <a:r>
+              <a:rPr lang="en-US" altLang="ko-KR" sz="1200" dirty="0">
+                <a:solidFill>
+                  <a:srgbClr val="000000"/>
+                </a:solidFill>
+                <a:latin typeface="Cascadia Mono" panose="020B0609020000020004" pitchFamily="49" charset="0"/>
+              </a:rPr>
+              <a:t> CoordinatedRungXmlsForCommand = {</a:t>
+            </a:r>
+          </a:p>
+          <a:p>
+            <a:r>
+              <a:rPr lang="en-US" altLang="ko-KR" sz="1200" dirty="0">
+                <a:solidFill>
+                  <a:srgbClr val="000000"/>
+                </a:solidFill>
+                <a:latin typeface="Cascadia Mono" panose="020B0609020000020004" pitchFamily="49" charset="0"/>
+              </a:rPr>
+              <a:t>    SpanY: int</a:t>
+            </a:r>
+          </a:p>
+          <a:p>
+            <a:r>
+              <a:rPr lang="en-US" altLang="ko-KR" sz="1200" dirty="0">
+                <a:solidFill>
+                  <a:srgbClr val="000000"/>
+                </a:solidFill>
+                <a:latin typeface="Cascadia Mono" panose="020B0609020000020004" pitchFamily="49" charset="0"/>
+              </a:rPr>
+              <a:t>    PositionedRungXmls: CoordinatedRungXml list</a:t>
+            </a:r>
+          </a:p>
+          <a:p>
+            <a:r>
+              <a:rPr lang="en-US" altLang="ko-KR" sz="1200" dirty="0">
+                <a:solidFill>
+                  <a:srgbClr val="000000"/>
+                </a:solidFill>
+                <a:latin typeface="Cascadia Mono" panose="020B0609020000020004" pitchFamily="49" charset="0"/>
+              </a:rPr>
+              <a:t>}</a:t>
+            </a:r>
+          </a:p>
+          <a:p>
+            <a:endParaRPr lang="ko-KR" altLang="en-US" sz="1200" dirty="0">
+              <a:solidFill>
+                <a:srgbClr val="000000"/>
+              </a:solidFill>
+              <a:latin typeface="Cascadia Mono" panose="020B0609020000020004" pitchFamily="49" charset="0"/>
+            </a:endParaRPr>
+          </a:p>
+          <a:p>
+            <a:r>
+              <a:rPr lang="en-US" altLang="ko-KR" sz="1200" dirty="0">
+                <a:solidFill>
+                  <a:srgbClr val="0000FF"/>
+                </a:solidFill>
+                <a:latin typeface="Cascadia Mono" panose="020B0609020000020004" pitchFamily="49" charset="0"/>
+              </a:rPr>
+              <a:t>type</a:t>
+            </a:r>
+            <a:r>
+              <a:rPr lang="en-US" altLang="ko-KR" sz="1200" dirty="0">
+                <a:solidFill>
+                  <a:srgbClr val="000000"/>
+                </a:solidFill>
+                <a:latin typeface="Cascadia Mono" panose="020B0609020000020004" pitchFamily="49" charset="0"/>
+              </a:rPr>
+              <a:t> RungInfosWithSpan = {</a:t>
+            </a:r>
+          </a:p>
+          <a:p>
+            <a:r>
+              <a:rPr lang="en-US" altLang="ko-KR" sz="1200" dirty="0">
+                <a:solidFill>
+                  <a:srgbClr val="000000"/>
+                </a:solidFill>
+                <a:latin typeface="Cascadia Mono" panose="020B0609020000020004" pitchFamily="49" charset="0"/>
+              </a:rPr>
+              <a:t>    RungInfos:CoordinatedRungXml list</a:t>
+            </a:r>
+          </a:p>
+          <a:p>
+            <a:r>
+              <a:rPr lang="en-US" altLang="ko-KR" sz="1200" dirty="0">
+                <a:solidFill>
+                  <a:srgbClr val="000000"/>
+                </a:solidFill>
+                <a:latin typeface="Cascadia Mono" panose="020B0609020000020004" pitchFamily="49" charset="0"/>
+              </a:rPr>
+              <a:t>    X: int</a:t>
+            </a:r>
+          </a:p>
+          <a:p>
+            <a:r>
+              <a:rPr lang="en-US" altLang="ko-KR" sz="1200" dirty="0">
+                <a:solidFill>
+                  <a:srgbClr val="000000"/>
+                </a:solidFill>
+                <a:latin typeface="Cascadia Mono" panose="020B0609020000020004" pitchFamily="49" charset="0"/>
+              </a:rPr>
+              <a:t>    Y: int</a:t>
+            </a:r>
+          </a:p>
+          <a:p>
+            <a:r>
+              <a:rPr lang="en-US" altLang="ko-KR" sz="1200" dirty="0">
+                <a:solidFill>
+                  <a:srgbClr val="000000"/>
+                </a:solidFill>
+                <a:latin typeface="Cascadia Mono" panose="020B0609020000020004" pitchFamily="49" charset="0"/>
+              </a:rPr>
+              <a:t>    SpanX: int</a:t>
+            </a:r>
+          </a:p>
+          <a:p>
+            <a:r>
+              <a:rPr lang="en-US" altLang="ko-KR" sz="1200" dirty="0">
+                <a:solidFill>
+                  <a:srgbClr val="000000"/>
+                </a:solidFill>
+                <a:latin typeface="Cascadia Mono" panose="020B0609020000020004" pitchFamily="49" charset="0"/>
+              </a:rPr>
+              <a:t>    SpanY: int</a:t>
+            </a:r>
+          </a:p>
+          <a:p>
+            <a:r>
+              <a:rPr lang="en-US" altLang="ko-KR" sz="1200" dirty="0">
+                <a:solidFill>
+                  <a:srgbClr val="000000"/>
+                </a:solidFill>
+                <a:latin typeface="Cascadia Mono" panose="020B0609020000020004" pitchFamily="49" charset="0"/>
+              </a:rPr>
+              <a:t>}</a:t>
+            </a:r>
+          </a:p>
+          <a:p>
+            <a:endParaRPr lang="ko-KR" altLang="en-US" sz="1200" dirty="0">
+              <a:solidFill>
+                <a:srgbClr val="000000"/>
+              </a:solidFill>
+              <a:latin typeface="Cascadia Mono" panose="020B0609020000020004" pitchFamily="49" charset="0"/>
+            </a:endParaRPr>
+          </a:p>
+          <a:p>
+            <a:r>
+              <a:rPr lang="en-US" altLang="ko-KR" sz="1200" dirty="0">
+                <a:solidFill>
+                  <a:srgbClr val="0000FF"/>
+                </a:solidFill>
+                <a:latin typeface="Cascadia Mono" panose="020B0609020000020004" pitchFamily="49" charset="0"/>
+              </a:rPr>
+              <a:t>type</a:t>
+            </a:r>
+            <a:r>
+              <a:rPr lang="en-US" altLang="ko-KR" sz="1200" dirty="0">
+                <a:solidFill>
+                  <a:srgbClr val="000000"/>
+                </a:solidFill>
+                <a:latin typeface="Cascadia Mono" panose="020B0609020000020004" pitchFamily="49" charset="0"/>
+              </a:rPr>
+              <a:t> RungGenerationInfo = {</a:t>
+            </a:r>
+          </a:p>
+          <a:p>
+            <a:r>
+              <a:rPr lang="ko-KR" altLang="en-US" sz="1200" dirty="0">
+                <a:solidFill>
+                  <a:srgbClr val="000000"/>
+                </a:solidFill>
+                <a:latin typeface="Cascadia Mono" panose="020B0609020000020004" pitchFamily="49" charset="0"/>
+              </a:rPr>
+              <a:t>    </a:t>
+            </a:r>
+            <a:r>
+              <a:rPr lang="en-US" altLang="ko-KR" sz="1200" dirty="0">
+                <a:solidFill>
+                  <a:srgbClr val="000000"/>
+                </a:solidFill>
+                <a:latin typeface="Cascadia Mono" panose="020B0609020000020004" pitchFamily="49" charset="0"/>
+              </a:rPr>
+              <a:t>Xmls: XmlOutput list</a:t>
+            </a:r>
+            <a:endParaRPr lang="ko-KR" altLang="en-US" sz="1200" dirty="0">
+              <a:solidFill>
+                <a:srgbClr val="000000"/>
+              </a:solidFill>
+              <a:latin typeface="Cascadia Mono" panose="020B0609020000020004" pitchFamily="49" charset="0"/>
+            </a:endParaRPr>
+          </a:p>
+          <a:p>
+            <a:r>
+              <a:rPr lang="en-US" altLang="ko-KR" sz="1200" dirty="0">
+                <a:solidFill>
+                  <a:srgbClr val="000000"/>
+                </a:solidFill>
+                <a:latin typeface="Cascadia Mono" panose="020B0609020000020004" pitchFamily="49" charset="0"/>
+              </a:rPr>
+              <a:t>    Y: int }</a:t>
+            </a:r>
+            <a:endParaRPr lang="ko-KR" altLang="en-US" sz="1200" dirty="0"/>
+          </a:p>
+        </p:txBody>
+      </p:sp>
+      <p:sp>
+        <p:nvSpPr>
+          <p:cNvPr id="18" name="TextBox 17">
+            <a:extLst>
+              <a:ext uri="{FF2B5EF4-FFF2-40B4-BE49-F238E27FC236}">
+                <a16:creationId xmlns:a16="http://schemas.microsoft.com/office/drawing/2014/main" id="{3F67D27E-A06D-E49D-FB0E-4E94B16C6204}"/>
+              </a:ext>
+            </a:extLst>
+          </p:cNvPr>
+          <p:cNvSpPr txBox="1"/>
+          <p:nvPr/>
+        </p:nvSpPr>
+        <p:spPr>
+          <a:xfrm>
+            <a:off x="164297" y="126224"/>
+            <a:ext cx="3488455" cy="707886"/>
+          </a:xfrm>
+          <a:prstGeom prst="rect">
+            <a:avLst/>
+          </a:prstGeom>
+          <a:noFill/>
+        </p:spPr>
+        <p:txBody>
+          <a:bodyPr wrap="none" rtlCol="0">
+            <a:spAutoFit/>
+          </a:bodyPr>
+          <a:lstStyle/>
+          <a:p>
+            <a:r>
+              <a:rPr lang="en-US" altLang="ko-KR" sz="4000" dirty="0"/>
+              <a:t>OLD VERSION</a:t>
+            </a:r>
+            <a:endParaRPr lang="ko-KR" altLang="en-US" sz="4000" dirty="0"/>
+          </a:p>
+        </p:txBody>
+      </p:sp>
+    </p:spTree>
+    <p:extLst>
+      <p:ext uri="{BB962C8B-B14F-4D97-AF65-F5344CB8AC3E}">
+        <p14:creationId xmlns:p14="http://schemas.microsoft.com/office/powerpoint/2010/main" val="3683248096"/>
+      </p:ext>
+    </p:extLst>
+  </p:cSld>
+  <p:clrMapOvr>
+    <a:masterClrMapping/>
+  </p:clrMapOvr>
+</p:sld>
+</file>
+
+<file path=ppt/slides/slide9.xml><?xml version="1.0" encoding="utf-8"?>
+<p:sld xmlns:a="http://schemas.openxmlformats.org/drawingml/2006/main" xmlns:r="http://schemas.openxmlformats.org/officeDocument/2006/relationships" xmlns:p="http://schemas.openxmlformats.org/presentationml/2006/main">
+  <p:cSld>
+    <p:spTree>
+      <p:nvGrpSpPr>
+        <p:cNvPr id="1" name=""/>
+        <p:cNvGrpSpPr/>
+        <p:nvPr/>
+      </p:nvGrpSpPr>
+      <p:grpSpPr>
+        <a:xfrm>
+          <a:off x="0" y="0"/>
+          <a:ext cx="0" cy="0"/>
+          <a:chOff x="0" y="0"/>
+          <a:chExt cx="0" cy="0"/>
+        </a:xfrm>
+      </p:grpSpPr>
+      <p:sp>
+        <p:nvSpPr>
+          <p:cNvPr id="5" name="TextBox 4">
+            <a:extLst>
+              <a:ext uri="{FF2B5EF4-FFF2-40B4-BE49-F238E27FC236}">
+                <a16:creationId xmlns:a16="http://schemas.microsoft.com/office/drawing/2014/main" id="{23B592B4-2FBB-0801-A671-3FD4C1C8DB37}"/>
+              </a:ext>
+            </a:extLst>
+          </p:cNvPr>
+          <p:cNvSpPr txBox="1"/>
+          <p:nvPr/>
+        </p:nvSpPr>
+        <p:spPr>
+          <a:xfrm>
+            <a:off x="2458871" y="3525585"/>
+            <a:ext cx="4403770" cy="276999"/>
+          </a:xfrm>
+          <a:prstGeom prst="rect">
+            <a:avLst/>
+          </a:prstGeom>
+          <a:noFill/>
+        </p:spPr>
+        <p:txBody>
+          <a:bodyPr wrap="none" rtlCol="0">
+            <a:spAutoFit/>
+          </a:bodyPr>
+          <a:lstStyle/>
+          <a:p>
+            <a:r>
+              <a:rPr lang="en-US" altLang="ko-KR" sz="1200" dirty="0">
+                <a:solidFill>
+                  <a:srgbClr val="000000"/>
+                </a:solidFill>
+                <a:latin typeface="Cascadia Mono" panose="020B0609020000020004" pitchFamily="49" charset="0"/>
+              </a:rPr>
+              <a:t>drawCmd</a:t>
+            </a:r>
+            <a:r>
+              <a:rPr lang="en-US" altLang="ko-KR" sz="1200" dirty="0">
+                <a:solidFill>
+                  <a:schemeClr val="bg1">
+                    <a:lumMod val="85000"/>
+                  </a:schemeClr>
+                </a:solidFill>
+                <a:latin typeface="Cascadia Mono" panose="020B0609020000020004" pitchFamily="49" charset="0"/>
+              </a:rPr>
+              <a:t>Counter: </a:t>
+            </a:r>
+            <a:r>
+              <a:rPr lang="en-US" altLang="ko-KR" sz="1200" dirty="0">
+                <a:solidFill>
+                  <a:srgbClr val="000000"/>
+                </a:solidFill>
+                <a:latin typeface="Cascadia Mono" panose="020B0609020000020004" pitchFamily="49" charset="0"/>
+              </a:rPr>
+              <a:t>: </a:t>
+            </a:r>
+            <a:r>
+              <a:rPr lang="en-US" altLang="ko-KR" sz="1200" dirty="0">
+                <a:solidFill>
+                  <a:srgbClr val="00B050"/>
+                </a:solidFill>
+                <a:latin typeface="Cascadia Mono" panose="020B0609020000020004" pitchFamily="49" charset="0"/>
+              </a:rPr>
+              <a:t>CoordinatedRungXmlsForCommand</a:t>
+            </a:r>
+            <a:endParaRPr lang="ko-KR" altLang="en-US" sz="1200" dirty="0">
+              <a:solidFill>
+                <a:srgbClr val="00B050"/>
+              </a:solidFill>
+            </a:endParaRPr>
+          </a:p>
+        </p:txBody>
+      </p:sp>
+      <p:sp>
+        <p:nvSpPr>
+          <p:cNvPr id="6" name="TextBox 5">
+            <a:extLst>
+              <a:ext uri="{FF2B5EF4-FFF2-40B4-BE49-F238E27FC236}">
+                <a16:creationId xmlns:a16="http://schemas.microsoft.com/office/drawing/2014/main" id="{EE8826E5-3D09-53C7-7BCB-A17D4E6712FF}"/>
+              </a:ext>
+            </a:extLst>
+          </p:cNvPr>
+          <p:cNvSpPr txBox="1"/>
+          <p:nvPr/>
+        </p:nvSpPr>
+        <p:spPr>
+          <a:xfrm>
+            <a:off x="2122338" y="3133434"/>
+            <a:ext cx="3775393" cy="276999"/>
+          </a:xfrm>
+          <a:prstGeom prst="rect">
+            <a:avLst/>
+          </a:prstGeom>
+          <a:noFill/>
+        </p:spPr>
+        <p:txBody>
+          <a:bodyPr wrap="none" rtlCol="0">
+            <a:spAutoFit/>
+          </a:bodyPr>
+          <a:lstStyle/>
+          <a:p>
+            <a:r>
+              <a:rPr lang="en-US" altLang="ko-KR" sz="1200" dirty="0">
+                <a:solidFill>
+                  <a:srgbClr val="000000"/>
+                </a:solidFill>
+                <a:latin typeface="Cascadia Mono" panose="020B0609020000020004" pitchFamily="49" charset="0"/>
+              </a:rPr>
+              <a:t>drawCommand: </a:t>
+            </a:r>
+            <a:r>
+              <a:rPr lang="en-US" altLang="ko-KR" sz="1200" dirty="0">
+                <a:solidFill>
+                  <a:srgbClr val="00B050"/>
+                </a:solidFill>
+                <a:latin typeface="Cascadia Mono" panose="020B0609020000020004" pitchFamily="49" charset="0"/>
+              </a:rPr>
+              <a:t>int*[CoordinatedXmlElement]</a:t>
+            </a:r>
+            <a:endParaRPr lang="ko-KR" altLang="en-US" sz="1200" dirty="0">
+              <a:solidFill>
+                <a:srgbClr val="00B050"/>
+              </a:solidFill>
+            </a:endParaRPr>
+          </a:p>
+        </p:txBody>
+      </p:sp>
+      <p:sp>
+        <p:nvSpPr>
+          <p:cNvPr id="7" name="TextBox 6">
+            <a:extLst>
+              <a:ext uri="{FF2B5EF4-FFF2-40B4-BE49-F238E27FC236}">
+                <a16:creationId xmlns:a16="http://schemas.microsoft.com/office/drawing/2014/main" id="{465BE005-8E2E-4C14-5709-AAAAF5EC4FAA}"/>
+              </a:ext>
+            </a:extLst>
+          </p:cNvPr>
+          <p:cNvSpPr txBox="1"/>
+          <p:nvPr/>
+        </p:nvSpPr>
+        <p:spPr>
+          <a:xfrm>
+            <a:off x="1776278" y="2046038"/>
+            <a:ext cx="2608406" cy="276999"/>
+          </a:xfrm>
+          <a:prstGeom prst="rect">
+            <a:avLst/>
+          </a:prstGeom>
+          <a:noFill/>
+        </p:spPr>
+        <p:txBody>
+          <a:bodyPr wrap="none" rtlCol="0">
+            <a:spAutoFit/>
+          </a:bodyPr>
+          <a:lstStyle/>
+          <a:p>
+            <a:r>
+              <a:rPr lang="en-US" altLang="ko-KR" sz="1200" dirty="0">
+                <a:solidFill>
+                  <a:srgbClr val="000000"/>
+                </a:solidFill>
+                <a:latin typeface="Cascadia Mono" panose="020B0609020000020004" pitchFamily="49" charset="0"/>
+              </a:rPr>
+              <a:t>rung: </a:t>
+            </a:r>
+            <a:r>
+              <a:rPr lang="en-US" altLang="ko-KR" sz="1200" dirty="0">
+                <a:solidFill>
+                  <a:srgbClr val="00B050"/>
+                </a:solidFill>
+                <a:latin typeface="Cascadia Mono" panose="020B0609020000020004" pitchFamily="49" charset="0"/>
+              </a:rPr>
+              <a:t>CoordinatedXmlElement</a:t>
+            </a:r>
+            <a:endParaRPr lang="ko-KR" altLang="en-US" sz="1200" dirty="0">
+              <a:solidFill>
+                <a:srgbClr val="00B050"/>
+              </a:solidFill>
+            </a:endParaRPr>
+          </a:p>
+        </p:txBody>
+      </p:sp>
+      <p:sp>
+        <p:nvSpPr>
+          <p:cNvPr id="8" name="TextBox 7">
+            <a:extLst>
+              <a:ext uri="{FF2B5EF4-FFF2-40B4-BE49-F238E27FC236}">
+                <a16:creationId xmlns:a16="http://schemas.microsoft.com/office/drawing/2014/main" id="{0FEBF991-8615-2B0D-A95A-B094FE08532B}"/>
+              </a:ext>
+            </a:extLst>
+          </p:cNvPr>
+          <p:cNvSpPr txBox="1"/>
+          <p:nvPr/>
+        </p:nvSpPr>
+        <p:spPr>
+          <a:xfrm>
+            <a:off x="1505863" y="1670502"/>
+            <a:ext cx="2608406" cy="276999"/>
+          </a:xfrm>
+          <a:prstGeom prst="rect">
+            <a:avLst/>
+          </a:prstGeom>
+          <a:noFill/>
+        </p:spPr>
+        <p:txBody>
+          <a:bodyPr wrap="none" rtlCol="0">
+            <a:spAutoFit/>
+          </a:bodyPr>
+          <a:lstStyle/>
+          <a:p>
+            <a:r>
+              <a:rPr lang="en-US" altLang="ko-KR" sz="1200" dirty="0">
+                <a:solidFill>
+                  <a:srgbClr val="000000"/>
+                </a:solidFill>
+                <a:latin typeface="Cascadia Mono" panose="020B0609020000020004" pitchFamily="49" charset="0"/>
+              </a:rPr>
+              <a:t>xmlRung: </a:t>
+            </a:r>
+            <a:r>
+              <a:rPr lang="en-US" altLang="ko-KR" sz="1200" dirty="0">
+                <a:solidFill>
+                  <a:srgbClr val="00B050"/>
+                </a:solidFill>
+                <a:latin typeface="Cascadia Mono" panose="020B0609020000020004" pitchFamily="49" charset="0"/>
+              </a:rPr>
+              <a:t>RungGenerationInfo</a:t>
+            </a:r>
+            <a:endParaRPr lang="ko-KR" altLang="en-US" sz="1200" dirty="0">
+              <a:solidFill>
+                <a:srgbClr val="00B050"/>
+              </a:solidFill>
+            </a:endParaRPr>
+          </a:p>
+        </p:txBody>
+      </p:sp>
+      <p:sp>
+        <p:nvSpPr>
+          <p:cNvPr id="9" name="TextBox 8">
+            <a:extLst>
+              <a:ext uri="{FF2B5EF4-FFF2-40B4-BE49-F238E27FC236}">
+                <a16:creationId xmlns:a16="http://schemas.microsoft.com/office/drawing/2014/main" id="{021979F7-FE3E-8F28-A86A-32DE7D905F4B}"/>
+              </a:ext>
+            </a:extLst>
+          </p:cNvPr>
+          <p:cNvSpPr txBox="1"/>
+          <p:nvPr/>
+        </p:nvSpPr>
+        <p:spPr>
+          <a:xfrm>
+            <a:off x="1155915" y="1324107"/>
+            <a:ext cx="1351652" cy="276999"/>
+          </a:xfrm>
+          <a:prstGeom prst="rect">
+            <a:avLst/>
+          </a:prstGeom>
+          <a:noFill/>
+        </p:spPr>
+        <p:txBody>
+          <a:bodyPr wrap="none" rtlCol="0">
+            <a:spAutoFit/>
+          </a:bodyPr>
+          <a:lstStyle/>
+          <a:p>
+            <a:r>
+              <a:rPr lang="en-US" altLang="ko-KR" sz="1200" dirty="0">
+                <a:solidFill>
+                  <a:srgbClr val="000000"/>
+                </a:solidFill>
+                <a:latin typeface="Cascadia Mono" panose="020B0609020000020004" pitchFamily="49" charset="0"/>
+              </a:rPr>
+              <a:t>generateRungs</a:t>
+            </a:r>
+            <a:endParaRPr lang="ko-KR" altLang="en-US" sz="1200" dirty="0"/>
+          </a:p>
+        </p:txBody>
+      </p:sp>
+      <p:sp>
+        <p:nvSpPr>
+          <p:cNvPr id="10" name="TextBox 9">
+            <a:extLst>
+              <a:ext uri="{FF2B5EF4-FFF2-40B4-BE49-F238E27FC236}">
+                <a16:creationId xmlns:a16="http://schemas.microsoft.com/office/drawing/2014/main" id="{E8AAD77E-F2E2-7521-7A8F-FFE137135B0D}"/>
+              </a:ext>
+            </a:extLst>
+          </p:cNvPr>
+          <p:cNvSpPr txBox="1"/>
+          <p:nvPr/>
+        </p:nvSpPr>
+        <p:spPr>
+          <a:xfrm>
+            <a:off x="443145" y="6096914"/>
             <a:ext cx="1935145" cy="369332"/>
           </a:xfrm>
           <a:prstGeom prst="rect">
@@ -8869,7 +9691,7 @@
           <a:lstStyle/>
           <a:p>
             <a:r>
-              <a:rPr lang="en-US" altLang="ko-KR" sz="1800" dirty="0" err="1">
+              <a:rPr lang="en-US" altLang="ko-KR" sz="1800" dirty="0">
                 <a:solidFill>
                   <a:srgbClr val="000000"/>
                 </a:solidFill>
@@ -8883,10 +9705,10 @@
       </p:sp>
       <p:sp>
         <p:nvSpPr>
-          <p:cNvPr id="10" name="TextBox 9">
-            <a:extLst>
-              <a:ext uri="{FF2B5EF4-FFF2-40B4-BE49-F238E27FC236}">
-                <a16:creationId xmlns:a16="http://schemas.microsoft.com/office/drawing/2014/main" id="{E8AAD77E-F2E2-7521-7A8F-FFE137135B0D}"/>
+          <p:cNvPr id="11" name="TextBox 10">
+            <a:extLst>
+              <a:ext uri="{FF2B5EF4-FFF2-40B4-BE49-F238E27FC236}">
+                <a16:creationId xmlns:a16="http://schemas.microsoft.com/office/drawing/2014/main" id="{8E513A60-98D1-6A30-203C-DD47A80E7ADD}"/>
               </a:ext>
             </a:extLst>
           </p:cNvPr>
@@ -8895,7 +9717,143 @@
         </p:nvSpPr>
         <p:spPr>
           <a:xfrm>
-            <a:off x="713111" y="5652657"/>
+            <a:off x="333747" y="391754"/>
+            <a:ext cx="1172116" cy="276999"/>
+          </a:xfrm>
+          <a:prstGeom prst="rect">
+            <a:avLst/>
+          </a:prstGeom>
+          <a:noFill/>
+        </p:spPr>
+        <p:txBody>
+          <a:bodyPr wrap="none" rtlCol="0">
+            <a:spAutoFit/>
+          </a:bodyPr>
+          <a:lstStyle/>
+          <a:p>
+            <a:r>
+              <a:rPr lang="en-US" altLang="ko-KR" sz="1200" dirty="0">
+                <a:solidFill>
+                  <a:srgbClr val="000000"/>
+                </a:solidFill>
+                <a:latin typeface="Cascadia Mono" panose="020B0609020000020004" pitchFamily="49" charset="0"/>
+              </a:rPr>
+              <a:t>generateXml</a:t>
+            </a:r>
+            <a:endParaRPr lang="ko-KR" altLang="en-US" sz="1200" dirty="0"/>
+          </a:p>
+        </p:txBody>
+      </p:sp>
+      <p:sp>
+        <p:nvSpPr>
+          <p:cNvPr id="12" name="TextBox 11">
+            <a:extLst>
+              <a:ext uri="{FF2B5EF4-FFF2-40B4-BE49-F238E27FC236}">
+                <a16:creationId xmlns:a16="http://schemas.microsoft.com/office/drawing/2014/main" id="{5F71AA54-8FAE-EAF9-2525-DD743F1FF737}"/>
+              </a:ext>
+            </a:extLst>
+          </p:cNvPr>
+          <p:cNvSpPr txBox="1"/>
+          <p:nvPr/>
+        </p:nvSpPr>
+        <p:spPr>
+          <a:xfrm>
+            <a:off x="654519" y="885379"/>
+            <a:ext cx="2608406" cy="276999"/>
+          </a:xfrm>
+          <a:prstGeom prst="rect">
+            <a:avLst/>
+          </a:prstGeom>
+          <a:noFill/>
+        </p:spPr>
+        <p:txBody>
+          <a:bodyPr wrap="none" rtlCol="0">
+            <a:spAutoFit/>
+          </a:bodyPr>
+          <a:lstStyle/>
+          <a:p>
+            <a:r>
+              <a:rPr lang="en-US" altLang="ko-KR" sz="1200" dirty="0">
+                <a:solidFill>
+                  <a:srgbClr val="000000"/>
+                </a:solidFill>
+                <a:latin typeface="Cascadia Mono" panose="020B0609020000020004" pitchFamily="49" charset="0"/>
+              </a:rPr>
+              <a:t>generateXGIXmlFromStatement</a:t>
+            </a:r>
+            <a:endParaRPr lang="ko-KR" altLang="en-US" sz="1200" dirty="0"/>
+          </a:p>
+        </p:txBody>
+      </p:sp>
+      <p:sp>
+        <p:nvSpPr>
+          <p:cNvPr id="13" name="TextBox 12">
+            <a:extLst>
+              <a:ext uri="{FF2B5EF4-FFF2-40B4-BE49-F238E27FC236}">
+                <a16:creationId xmlns:a16="http://schemas.microsoft.com/office/drawing/2014/main" id="{7D9ABF0A-CDF9-77D6-D9E6-32908F04D038}"/>
+              </a:ext>
+            </a:extLst>
+          </p:cNvPr>
+          <p:cNvSpPr txBox="1"/>
+          <p:nvPr/>
+        </p:nvSpPr>
+        <p:spPr>
+          <a:xfrm>
+            <a:off x="2122337" y="3963941"/>
+            <a:ext cx="3506088" cy="276999"/>
+          </a:xfrm>
+          <a:prstGeom prst="rect">
+            <a:avLst/>
+          </a:prstGeom>
+          <a:noFill/>
+        </p:spPr>
+        <p:txBody>
+          <a:bodyPr wrap="none" rtlCol="0">
+            <a:spAutoFit/>
+          </a:bodyPr>
+          <a:lstStyle/>
+          <a:p>
+            <a:r>
+              <a:rPr lang="en-US" altLang="ko-KR" sz="1200" dirty="0">
+                <a:solidFill>
+                  <a:srgbClr val="000000"/>
+                </a:solidFill>
+                <a:latin typeface="Cascadia Mono" panose="020B0609020000020004" pitchFamily="49" charset="0"/>
+              </a:rPr>
+              <a:t>drawCoil: </a:t>
+            </a:r>
+            <a:r>
+              <a:rPr lang="en-US" altLang="ko-KR" sz="1200" dirty="0">
+                <a:solidFill>
+                  <a:srgbClr val="00B050"/>
+                </a:solidFill>
+                <a:latin typeface="Cascadia Mono" panose="020B0609020000020004" pitchFamily="49" charset="0"/>
+              </a:rPr>
+              <a:t>int*[CoordinatedXmlElement]</a:t>
+            </a:r>
+            <a:endParaRPr lang="ko-KR" altLang="en-US" sz="1200" dirty="0">
+              <a:solidFill>
+                <a:srgbClr val="00B050"/>
+              </a:solidFill>
+            </a:endParaRPr>
+          </a:p>
+        </p:txBody>
+      </p:sp>
+      <p:sp>
+        <p:nvSpPr>
+          <p:cNvPr id="2" name="TextBox 1">
+            <a:extLst>
+              <a:ext uri="{FF2B5EF4-FFF2-40B4-BE49-F238E27FC236}">
+                <a16:creationId xmlns:a16="http://schemas.microsoft.com/office/drawing/2014/main" id="{F4229408-EBEA-87C8-07ED-9488C2B6344F}"/>
+              </a:ext>
+            </a:extLst>
+          </p:cNvPr>
+          <p:cNvSpPr txBox="1"/>
+          <p:nvPr/>
+        </p:nvSpPr>
+        <p:spPr>
+          <a:xfrm>
+            <a:off x="530503" y="6596341"/>
             <a:ext cx="1935145" cy="369332"/>
           </a:xfrm>
           <a:prstGeom prst="rect">
@@ -8910,7 +9868,7 @@
           <a:lstStyle/>
           <a:p>
             <a:r>
-              <a:rPr lang="en-US" altLang="ko-KR" sz="1800" dirty="0" err="1">
+              <a:rPr lang="en-US" altLang="ko-KR" sz="1800" dirty="0">
                 <a:solidFill>
                   <a:srgbClr val="000000"/>
                 </a:solidFill>
@@ -8924,10 +9882,10 @@
       </p:sp>
       <p:sp>
         <p:nvSpPr>
-          <p:cNvPr id="11" name="TextBox 10">
-            <a:extLst>
-              <a:ext uri="{FF2B5EF4-FFF2-40B4-BE49-F238E27FC236}">
-                <a16:creationId xmlns:a16="http://schemas.microsoft.com/office/drawing/2014/main" id="{8E513A60-98D1-6A30-203C-DD47A80E7ADD}"/>
+          <p:cNvPr id="3" name="TextBox 2">
+            <a:extLst>
+              <a:ext uri="{FF2B5EF4-FFF2-40B4-BE49-F238E27FC236}">
+                <a16:creationId xmlns:a16="http://schemas.microsoft.com/office/drawing/2014/main" id="{72FE26C6-6716-F565-8D82-A7A7BAFF4853}"/>
               </a:ext>
             </a:extLst>
           </p:cNvPr>
@@ -8936,8 +9894,8 @@
         </p:nvSpPr>
         <p:spPr>
           <a:xfrm>
-            <a:off x="1064093" y="258491"/>
-            <a:ext cx="1665841" cy="369332"/>
+            <a:off x="2650803" y="6147652"/>
+            <a:ext cx="1935145" cy="369332"/>
           </a:xfrm>
           <a:prstGeom prst="rect">
             <a:avLst/>
@@ -8951,13 +9909,13 @@
           <a:lstStyle/>
           <a:p>
             <a:r>
-              <a:rPr lang="en-US" altLang="ko-KR" sz="1800" dirty="0" err="1">
+              <a:rPr lang="en-US" altLang="ko-KR" sz="1800" dirty="0">
                 <a:solidFill>
                   <a:srgbClr val="000000"/>
                 </a:solidFill>
                 <a:latin typeface="Cascadia Mono" panose="020B0609020000020004" pitchFamily="49" charset="0"/>
               </a:rPr>
-              <a:t>generateXml</a:t>
+              <a:t>generateRungs</a:t>
             </a:r>
             <a:endParaRPr lang="ko-KR" altLang="en-US" dirty="0"/>
           </a:p>
@@ -8965,10 +9923,10 @@
       </p:sp>
       <p:sp>
         <p:nvSpPr>
-          <p:cNvPr id="12" name="TextBox 11">
-            <a:extLst>
-              <a:ext uri="{FF2B5EF4-FFF2-40B4-BE49-F238E27FC236}">
-                <a16:creationId xmlns:a16="http://schemas.microsoft.com/office/drawing/2014/main" id="{5F71AA54-8FAE-EAF9-2525-DD743F1FF737}"/>
+          <p:cNvPr id="4" name="TextBox 3">
+            <a:extLst>
+              <a:ext uri="{FF2B5EF4-FFF2-40B4-BE49-F238E27FC236}">
+                <a16:creationId xmlns:a16="http://schemas.microsoft.com/office/drawing/2014/main" id="{0D064F3D-F062-185E-3D95-6EC3CC8E3223}"/>
               </a:ext>
             </a:extLst>
           </p:cNvPr>
@@ -8977,8 +9935,8 @@
         </p:nvSpPr>
         <p:spPr>
           <a:xfrm>
-            <a:off x="1768042" y="766615"/>
-            <a:ext cx="3820277" cy="369332"/>
+            <a:off x="2961938" y="6586380"/>
+            <a:ext cx="1935145" cy="369332"/>
           </a:xfrm>
           <a:prstGeom prst="rect">
             <a:avLst/>
@@ -8992,13 +9950,13 @@
           <a:lstStyle/>
           <a:p>
             <a:r>
-              <a:rPr lang="en-US" altLang="ko-KR" sz="1800" dirty="0" err="1">
+              <a:rPr lang="en-US" altLang="ko-KR" sz="1800" dirty="0">
                 <a:solidFill>
                   <a:srgbClr val="000000"/>
                 </a:solidFill>
                 <a:latin typeface="Cascadia Mono" panose="020B0609020000020004" pitchFamily="49" charset="0"/>
               </a:rPr>
-              <a:t>generateXGIXmlFromStatement</a:t>
+              <a:t>generateRungs</a:t>
             </a:r>
             <a:endParaRPr lang="ko-KR" altLang="en-US" dirty="0"/>
           </a:p>
@@ -9006,10 +9964,10 @@
       </p:sp>
       <p:sp>
         <p:nvSpPr>
-          <p:cNvPr id="13" name="TextBox 12">
-            <a:extLst>
-              <a:ext uri="{FF2B5EF4-FFF2-40B4-BE49-F238E27FC236}">
-                <a16:creationId xmlns:a16="http://schemas.microsoft.com/office/drawing/2014/main" id="{7D9ABF0A-CDF9-77D6-D9E6-32908F04D038}"/>
+          <p:cNvPr id="14" name="TextBox 13">
+            <a:extLst>
+              <a:ext uri="{FF2B5EF4-FFF2-40B4-BE49-F238E27FC236}">
+                <a16:creationId xmlns:a16="http://schemas.microsoft.com/office/drawing/2014/main" id="{6A72DE6F-18DF-6D35-7328-853EA736A475}"/>
               </a:ext>
             </a:extLst>
           </p:cNvPr>
@@ -9018,8 +9976,8 @@
         </p:nvSpPr>
         <p:spPr>
           <a:xfrm>
-            <a:off x="4561114" y="3840143"/>
-            <a:ext cx="1261884" cy="369332"/>
+            <a:off x="6756929" y="6217048"/>
+            <a:ext cx="2608406" cy="369332"/>
           </a:xfrm>
           <a:prstGeom prst="rect">
             <a:avLst/>
@@ -9033,22 +9991,573 @@
           <a:lstStyle/>
           <a:p>
             <a:r>
-              <a:rPr lang="en-US" altLang="ko-KR" sz="1800" dirty="0" err="1">
+              <a:rPr lang="en-US" altLang="ko-KR" sz="1800" dirty="0">
                 <a:solidFill>
                   <a:srgbClr val="000000"/>
                 </a:solidFill>
                 <a:latin typeface="Cascadia Mono" panose="020B0609020000020004" pitchFamily="49" charset="0"/>
               </a:rPr>
-              <a:t>drawCoil</a:t>
+              <a:t>RungGenerationInfo</a:t>
             </a:r>
             <a:endParaRPr lang="ko-KR" altLang="en-US" dirty="0"/>
+          </a:p>
+        </p:txBody>
+      </p:sp>
+      <p:sp>
+        <p:nvSpPr>
+          <p:cNvPr id="15" name="TextBox 14">
+            <a:extLst>
+              <a:ext uri="{FF2B5EF4-FFF2-40B4-BE49-F238E27FC236}">
+                <a16:creationId xmlns:a16="http://schemas.microsoft.com/office/drawing/2014/main" id="{5C49C227-BEDB-6C74-5C41-11E541ECCCDC}"/>
+              </a:ext>
+            </a:extLst>
+          </p:cNvPr>
+          <p:cNvSpPr txBox="1"/>
+          <p:nvPr/>
+        </p:nvSpPr>
+        <p:spPr>
+          <a:xfrm>
+            <a:off x="2122337" y="2483968"/>
+            <a:ext cx="2069797" cy="276999"/>
+          </a:xfrm>
+          <a:prstGeom prst="rect">
+            <a:avLst/>
+          </a:prstGeom>
+          <a:noFill/>
+        </p:spPr>
+        <p:txBody>
+          <a:bodyPr wrap="none" rtlCol="0">
+            <a:spAutoFit/>
+          </a:bodyPr>
+          <a:lstStyle/>
+          <a:p>
+            <a:r>
+              <a:rPr lang="en-US" altLang="ko-KR" sz="1200" dirty="0">
+                <a:solidFill>
+                  <a:srgbClr val="000000"/>
+                </a:solidFill>
+                <a:latin typeface="Cascadia Mono" panose="020B0609020000020004" pitchFamily="49" charset="0"/>
+              </a:rPr>
+              <a:t>rng: </a:t>
+            </a:r>
+            <a:r>
+              <a:rPr lang="en-US" altLang="ko-KR" sz="1200" dirty="0">
+                <a:solidFill>
+                  <a:srgbClr val="00B050"/>
+                </a:solidFill>
+                <a:latin typeface="Cascadia Mono" panose="020B0609020000020004" pitchFamily="49" charset="0"/>
+              </a:rPr>
+              <a:t>RungInfoWithScan</a:t>
+            </a:r>
+            <a:endParaRPr lang="ko-KR" altLang="en-US" sz="1200" dirty="0">
+              <a:solidFill>
+                <a:srgbClr val="00B050"/>
+              </a:solidFill>
+            </a:endParaRPr>
+          </a:p>
+        </p:txBody>
+      </p:sp>
+      <p:sp>
+        <p:nvSpPr>
+          <p:cNvPr id="17" name="TextBox 16">
+            <a:extLst>
+              <a:ext uri="{FF2B5EF4-FFF2-40B4-BE49-F238E27FC236}">
+                <a16:creationId xmlns:a16="http://schemas.microsoft.com/office/drawing/2014/main" id="{1D696EC7-38D6-F19D-3574-128D509B76BC}"/>
+              </a:ext>
+            </a:extLst>
+          </p:cNvPr>
+          <p:cNvSpPr txBox="1"/>
+          <p:nvPr/>
+        </p:nvSpPr>
+        <p:spPr>
+          <a:xfrm>
+            <a:off x="7162757" y="530253"/>
+            <a:ext cx="5140744" cy="5078313"/>
+          </a:xfrm>
+          <a:prstGeom prst="rect">
+            <a:avLst/>
+          </a:prstGeom>
+          <a:noFill/>
+        </p:spPr>
+        <p:txBody>
+          <a:bodyPr wrap="square">
+            <a:spAutoFit/>
+          </a:bodyPr>
+          <a:lstStyle/>
+          <a:p>
+            <a:r>
+              <a:rPr lang="en-US" altLang="ko-KR" sz="1200" dirty="0">
+                <a:solidFill>
+                  <a:srgbClr val="0000FF"/>
+                </a:solidFill>
+                <a:latin typeface="Cascadia Mono" panose="020B0609020000020004" pitchFamily="49" charset="0"/>
+              </a:rPr>
+              <a:t>type</a:t>
+            </a:r>
+            <a:r>
+              <a:rPr lang="en-US" altLang="ko-KR" sz="1200" dirty="0">
+                <a:solidFill>
+                  <a:srgbClr val="000000"/>
+                </a:solidFill>
+                <a:latin typeface="Cascadia Mono" panose="020B0609020000020004" pitchFamily="49" charset="0"/>
+              </a:rPr>
+              <a:t> CoordinatedXmlElement = {</a:t>
+            </a:r>
+          </a:p>
+          <a:p>
+            <a:r>
+              <a:rPr lang="ko-KR" altLang="en-US" sz="1200" dirty="0">
+                <a:solidFill>
+                  <a:srgbClr val="000000"/>
+                </a:solidFill>
+                <a:latin typeface="Cascadia Mono" panose="020B0609020000020004" pitchFamily="49" charset="0"/>
+              </a:rPr>
+              <a:t>    </a:t>
+            </a:r>
+            <a:r>
+              <a:rPr lang="en-US" altLang="ko-KR" sz="1200" dirty="0">
+                <a:solidFill>
+                  <a:srgbClr val="008000"/>
+                </a:solidFill>
+                <a:latin typeface="Cascadia Mono" panose="020B0609020000020004" pitchFamily="49" charset="0"/>
+              </a:rPr>
+              <a:t>/// Xgi </a:t>
+            </a:r>
+            <a:r>
+              <a:rPr lang="ko-KR" altLang="en-US" sz="1200" dirty="0">
+                <a:solidFill>
+                  <a:srgbClr val="008000"/>
+                </a:solidFill>
+                <a:latin typeface="Cascadia Mono" panose="020B0609020000020004" pitchFamily="49" charset="0"/>
+              </a:rPr>
+              <a:t>출력시 순서 결정하기 위한 </a:t>
+            </a:r>
+            <a:r>
+              <a:rPr lang="en-US" altLang="ko-KR" sz="1200" dirty="0">
+                <a:solidFill>
+                  <a:srgbClr val="008000"/>
+                </a:solidFill>
+                <a:latin typeface="Cascadia Mono" panose="020B0609020000020004" pitchFamily="49" charset="0"/>
+              </a:rPr>
+              <a:t>coordinate.</a:t>
+            </a:r>
+            <a:endParaRPr lang="ko-KR" altLang="en-US" sz="1200" dirty="0">
+              <a:solidFill>
+                <a:srgbClr val="000000"/>
+              </a:solidFill>
+              <a:latin typeface="Cascadia Mono" panose="020B0609020000020004" pitchFamily="49" charset="0"/>
+            </a:endParaRPr>
+          </a:p>
+          <a:p>
+            <a:r>
+              <a:rPr lang="en-US" altLang="ko-KR" sz="1200" dirty="0">
+                <a:solidFill>
+                  <a:srgbClr val="000000"/>
+                </a:solidFill>
+                <a:latin typeface="Cascadia Mono" panose="020B0609020000020004" pitchFamily="49" charset="0"/>
+              </a:rPr>
+              <a:t>    Coordinate: EncodedXYCoordinate   </a:t>
+            </a:r>
+            <a:r>
+              <a:rPr lang="en-US" altLang="ko-KR" sz="1200" dirty="0">
+                <a:solidFill>
+                  <a:srgbClr val="008000"/>
+                </a:solidFill>
+                <a:latin typeface="Cascadia Mono" panose="020B0609020000020004" pitchFamily="49" charset="0"/>
+              </a:rPr>
+              <a:t>// int</a:t>
+            </a:r>
+            <a:endParaRPr lang="en-US" altLang="ko-KR" sz="1200" dirty="0">
+              <a:solidFill>
+                <a:srgbClr val="000000"/>
+              </a:solidFill>
+              <a:latin typeface="Cascadia Mono" panose="020B0609020000020004" pitchFamily="49" charset="0"/>
+            </a:endParaRPr>
+          </a:p>
+          <a:p>
+            <a:r>
+              <a:rPr lang="en-US" altLang="ko-KR" sz="1200" dirty="0">
+                <a:solidFill>
+                  <a:srgbClr val="000000"/>
+                </a:solidFill>
+                <a:latin typeface="Cascadia Mono" panose="020B0609020000020004" pitchFamily="49" charset="0"/>
+              </a:rPr>
+              <a:t>    </a:t>
+            </a:r>
+            <a:r>
+              <a:rPr lang="en-US" altLang="ko-KR" sz="1200" dirty="0">
+                <a:solidFill>
+                  <a:srgbClr val="008000"/>
+                </a:solidFill>
+                <a:latin typeface="Cascadia Mono" panose="020B0609020000020004" pitchFamily="49" charset="0"/>
+              </a:rPr>
+              <a:t>/// Xml element </a:t>
+            </a:r>
+            <a:r>
+              <a:rPr lang="ko-KR" altLang="en-US" sz="1200" dirty="0">
+                <a:solidFill>
+                  <a:srgbClr val="008000"/>
+                </a:solidFill>
+                <a:latin typeface="Cascadia Mono" panose="020B0609020000020004" pitchFamily="49" charset="0"/>
+              </a:rPr>
+              <a:t>문자열</a:t>
+            </a:r>
+            <a:endParaRPr lang="ko-KR" altLang="en-US" sz="1200" dirty="0">
+              <a:solidFill>
+                <a:srgbClr val="000000"/>
+              </a:solidFill>
+              <a:latin typeface="Cascadia Mono" panose="020B0609020000020004" pitchFamily="49" charset="0"/>
+            </a:endParaRPr>
+          </a:p>
+          <a:p>
+            <a:r>
+              <a:rPr lang="en-US" altLang="ko-KR" sz="1200" dirty="0">
+                <a:solidFill>
+                  <a:srgbClr val="000000"/>
+                </a:solidFill>
+                <a:latin typeface="Cascadia Mono" panose="020B0609020000020004" pitchFamily="49" charset="0"/>
+              </a:rPr>
+              <a:t>    Xml: XmlOutput                  </a:t>
+            </a:r>
+            <a:r>
+              <a:rPr lang="en-US" altLang="ko-KR" sz="1200" dirty="0">
+                <a:solidFill>
+                  <a:srgbClr val="008000"/>
+                </a:solidFill>
+                <a:latin typeface="Cascadia Mono" panose="020B0609020000020004" pitchFamily="49" charset="0"/>
+              </a:rPr>
+              <a:t>// string</a:t>
+            </a:r>
+            <a:endParaRPr lang="en-US" altLang="ko-KR" sz="1200" dirty="0">
+              <a:solidFill>
+                <a:srgbClr val="000000"/>
+              </a:solidFill>
+              <a:latin typeface="Cascadia Mono" panose="020B0609020000020004" pitchFamily="49" charset="0"/>
+            </a:endParaRPr>
+          </a:p>
+          <a:p>
+            <a:r>
+              <a:rPr lang="en-US" altLang="ko-KR" sz="1200" dirty="0">
+                <a:solidFill>
+                  <a:srgbClr val="000000"/>
+                </a:solidFill>
+                <a:latin typeface="Cascadia Mono" panose="020B0609020000020004" pitchFamily="49" charset="0"/>
+              </a:rPr>
+              <a:t>    SpanX: int</a:t>
+            </a:r>
+          </a:p>
+          <a:p>
+            <a:r>
+              <a:rPr lang="en-US" altLang="ko-KR" sz="1200" dirty="0">
+                <a:solidFill>
+                  <a:srgbClr val="000000"/>
+                </a:solidFill>
+                <a:latin typeface="Cascadia Mono" panose="020B0609020000020004" pitchFamily="49" charset="0"/>
+              </a:rPr>
+              <a:t>    SpanY: int</a:t>
+            </a:r>
+          </a:p>
+          <a:p>
+            <a:r>
+              <a:rPr lang="en-US" altLang="ko-KR" sz="1200" dirty="0">
+                <a:solidFill>
+                  <a:srgbClr val="000000"/>
+                </a:solidFill>
+                <a:latin typeface="Cascadia Mono" panose="020B0609020000020004" pitchFamily="49" charset="0"/>
+              </a:rPr>
+              <a:t>}</a:t>
+            </a:r>
+          </a:p>
+          <a:p>
+            <a:endParaRPr lang="ko-KR" altLang="en-US" sz="1200" dirty="0">
+              <a:solidFill>
+                <a:srgbClr val="000000"/>
+              </a:solidFill>
+              <a:latin typeface="Cascadia Mono" panose="020B0609020000020004" pitchFamily="49" charset="0"/>
+            </a:endParaRPr>
+          </a:p>
+          <a:p>
+            <a:r>
+              <a:rPr lang="en-US" altLang="ko-KR" sz="1200" dirty="0">
+                <a:solidFill>
+                  <a:srgbClr val="0000FF"/>
+                </a:solidFill>
+                <a:latin typeface="Cascadia Mono" panose="020B0609020000020004" pitchFamily="49" charset="0"/>
+              </a:rPr>
+              <a:t>type</a:t>
+            </a:r>
+            <a:r>
+              <a:rPr lang="en-US" altLang="ko-KR" sz="1200" dirty="0">
+                <a:solidFill>
+                  <a:srgbClr val="000000"/>
+                </a:solidFill>
+                <a:latin typeface="Cascadia Mono" panose="020B0609020000020004" pitchFamily="49" charset="0"/>
+              </a:rPr>
+              <a:t> CoordinatedRungXmlsForCommand = {</a:t>
+            </a:r>
+          </a:p>
+          <a:p>
+            <a:r>
+              <a:rPr lang="en-US" altLang="ko-KR" sz="1200" dirty="0">
+                <a:solidFill>
+                  <a:srgbClr val="000000"/>
+                </a:solidFill>
+                <a:latin typeface="Cascadia Mono" panose="020B0609020000020004" pitchFamily="49" charset="0"/>
+              </a:rPr>
+              <a:t>    SpanY: int</a:t>
+            </a:r>
+          </a:p>
+          <a:p>
+            <a:r>
+              <a:rPr lang="en-US" altLang="ko-KR" sz="1200" dirty="0">
+                <a:solidFill>
+                  <a:srgbClr val="000000"/>
+                </a:solidFill>
+                <a:latin typeface="Cascadia Mono" panose="020B0609020000020004" pitchFamily="49" charset="0"/>
+              </a:rPr>
+              <a:t>    PositionedRungXmls: CoordinatedXmlElement list</a:t>
+            </a:r>
+          </a:p>
+          <a:p>
+            <a:r>
+              <a:rPr lang="en-US" altLang="ko-KR" sz="1200" dirty="0">
+                <a:solidFill>
+                  <a:srgbClr val="000000"/>
+                </a:solidFill>
+                <a:latin typeface="Cascadia Mono" panose="020B0609020000020004" pitchFamily="49" charset="0"/>
+              </a:rPr>
+              <a:t>}</a:t>
+            </a:r>
+          </a:p>
+          <a:p>
+            <a:endParaRPr lang="ko-KR" altLang="en-US" sz="1200" dirty="0">
+              <a:solidFill>
+                <a:srgbClr val="000000"/>
+              </a:solidFill>
+              <a:latin typeface="Cascadia Mono" panose="020B0609020000020004" pitchFamily="49" charset="0"/>
+            </a:endParaRPr>
+          </a:p>
+          <a:p>
+            <a:r>
+              <a:rPr lang="en-US" altLang="ko-KR" sz="1200" dirty="0">
+                <a:solidFill>
+                  <a:srgbClr val="0000FF"/>
+                </a:solidFill>
+                <a:latin typeface="Cascadia Mono" panose="020B0609020000020004" pitchFamily="49" charset="0"/>
+              </a:rPr>
+              <a:t>type</a:t>
+            </a:r>
+            <a:r>
+              <a:rPr lang="en-US" altLang="ko-KR" sz="1200" dirty="0">
+                <a:solidFill>
+                  <a:srgbClr val="000000"/>
+                </a:solidFill>
+                <a:latin typeface="Cascadia Mono" panose="020B0609020000020004" pitchFamily="49" charset="0"/>
+              </a:rPr>
+              <a:t> RungInfosWithSpan = {</a:t>
+            </a:r>
+          </a:p>
+          <a:p>
+            <a:r>
+              <a:rPr lang="en-US" altLang="ko-KR" sz="1200" dirty="0">
+                <a:solidFill>
+                  <a:srgbClr val="000000"/>
+                </a:solidFill>
+                <a:latin typeface="Cascadia Mono" panose="020B0609020000020004" pitchFamily="49" charset="0"/>
+              </a:rPr>
+              <a:t>    RungInfos:CoordinatedXmlElement list</a:t>
+            </a:r>
+          </a:p>
+          <a:p>
+            <a:r>
+              <a:rPr lang="en-US" altLang="ko-KR" sz="1200" dirty="0">
+                <a:solidFill>
+                  <a:srgbClr val="000000"/>
+                </a:solidFill>
+                <a:latin typeface="Cascadia Mono" panose="020B0609020000020004" pitchFamily="49" charset="0"/>
+              </a:rPr>
+              <a:t>    X: int</a:t>
+            </a:r>
+          </a:p>
+          <a:p>
+            <a:r>
+              <a:rPr lang="en-US" altLang="ko-KR" sz="1200" dirty="0">
+                <a:solidFill>
+                  <a:srgbClr val="000000"/>
+                </a:solidFill>
+                <a:latin typeface="Cascadia Mono" panose="020B0609020000020004" pitchFamily="49" charset="0"/>
+              </a:rPr>
+              <a:t>    Y: int</a:t>
+            </a:r>
+          </a:p>
+          <a:p>
+            <a:r>
+              <a:rPr lang="en-US" altLang="ko-KR" sz="1200" dirty="0">
+                <a:solidFill>
+                  <a:srgbClr val="000000"/>
+                </a:solidFill>
+                <a:latin typeface="Cascadia Mono" panose="020B0609020000020004" pitchFamily="49" charset="0"/>
+              </a:rPr>
+              <a:t>    SpanX: int</a:t>
+            </a:r>
+          </a:p>
+          <a:p>
+            <a:r>
+              <a:rPr lang="en-US" altLang="ko-KR" sz="1200" dirty="0">
+                <a:solidFill>
+                  <a:srgbClr val="000000"/>
+                </a:solidFill>
+                <a:latin typeface="Cascadia Mono" panose="020B0609020000020004" pitchFamily="49" charset="0"/>
+              </a:rPr>
+              <a:t>    SpanY: int</a:t>
+            </a:r>
+          </a:p>
+          <a:p>
+            <a:r>
+              <a:rPr lang="en-US" altLang="ko-KR" sz="1200" dirty="0">
+                <a:solidFill>
+                  <a:srgbClr val="000000"/>
+                </a:solidFill>
+                <a:latin typeface="Cascadia Mono" panose="020B0609020000020004" pitchFamily="49" charset="0"/>
+              </a:rPr>
+              <a:t>}</a:t>
+            </a:r>
+          </a:p>
+          <a:p>
+            <a:endParaRPr lang="ko-KR" altLang="en-US" sz="1200" dirty="0">
+              <a:solidFill>
+                <a:srgbClr val="000000"/>
+              </a:solidFill>
+              <a:latin typeface="Cascadia Mono" panose="020B0609020000020004" pitchFamily="49" charset="0"/>
+            </a:endParaRPr>
+          </a:p>
+          <a:p>
+            <a:r>
+              <a:rPr lang="en-US" altLang="ko-KR" sz="1200" dirty="0">
+                <a:solidFill>
+                  <a:srgbClr val="0000FF"/>
+                </a:solidFill>
+                <a:latin typeface="Cascadia Mono" panose="020B0609020000020004" pitchFamily="49" charset="0"/>
+              </a:rPr>
+              <a:t>type</a:t>
+            </a:r>
+            <a:r>
+              <a:rPr lang="en-US" altLang="ko-KR" sz="1200" dirty="0">
+                <a:solidFill>
+                  <a:srgbClr val="000000"/>
+                </a:solidFill>
+                <a:latin typeface="Cascadia Mono" panose="020B0609020000020004" pitchFamily="49" charset="0"/>
+              </a:rPr>
+              <a:t> RungGenerationInfo = {</a:t>
+            </a:r>
+          </a:p>
+          <a:p>
+            <a:r>
+              <a:rPr lang="ko-KR" altLang="en-US" sz="1200" dirty="0">
+                <a:solidFill>
+                  <a:srgbClr val="000000"/>
+                </a:solidFill>
+                <a:latin typeface="Cascadia Mono" panose="020B0609020000020004" pitchFamily="49" charset="0"/>
+              </a:rPr>
+              <a:t>    </a:t>
+            </a:r>
+            <a:r>
+              <a:rPr lang="en-US" altLang="ko-KR" sz="1200" dirty="0">
+                <a:solidFill>
+                  <a:srgbClr val="000000"/>
+                </a:solidFill>
+                <a:latin typeface="Cascadia Mono" panose="020B0609020000020004" pitchFamily="49" charset="0"/>
+              </a:rPr>
+              <a:t>Xmls: XmlOutput list   </a:t>
+            </a:r>
+            <a:r>
+              <a:rPr lang="en-US" altLang="ko-KR" sz="1200" dirty="0">
+                <a:solidFill>
+                  <a:srgbClr val="008000"/>
+                </a:solidFill>
+                <a:latin typeface="Cascadia Mono" panose="020B0609020000020004" pitchFamily="49" charset="0"/>
+              </a:rPr>
+              <a:t>// Rung </a:t>
+            </a:r>
+            <a:r>
+              <a:rPr lang="ko-KR" altLang="en-US" sz="1200" dirty="0">
+                <a:solidFill>
+                  <a:srgbClr val="008000"/>
+                </a:solidFill>
+                <a:latin typeface="Cascadia Mono" panose="020B0609020000020004" pitchFamily="49" charset="0"/>
+              </a:rPr>
+              <a:t>별 누적 </a:t>
+            </a:r>
+            <a:r>
+              <a:rPr lang="en-US" altLang="ko-KR" sz="1200" dirty="0">
+                <a:solidFill>
+                  <a:srgbClr val="008000"/>
+                </a:solidFill>
+                <a:latin typeface="Cascadia Mono" panose="020B0609020000020004" pitchFamily="49" charset="0"/>
+              </a:rPr>
+              <a:t>xml.  </a:t>
+            </a:r>
+            <a:r>
+              <a:rPr lang="ko-KR" altLang="en-US" sz="1200" dirty="0">
+                <a:solidFill>
+                  <a:srgbClr val="008000"/>
+                </a:solidFill>
+                <a:latin typeface="Cascadia Mono" panose="020B0609020000020004" pitchFamily="49" charset="0"/>
+              </a:rPr>
+              <a:t>역순으로 추가</a:t>
+            </a:r>
+            <a:r>
+              <a:rPr lang="en-US" altLang="ko-KR" sz="1200" dirty="0">
+                <a:solidFill>
+                  <a:srgbClr val="008000"/>
+                </a:solidFill>
+                <a:latin typeface="Cascadia Mono" panose="020B0609020000020004" pitchFamily="49" charset="0"/>
+              </a:rPr>
+              <a:t>.  </a:t>
+            </a:r>
+            <a:r>
+              <a:rPr lang="ko-KR" altLang="en-US" sz="1200" dirty="0">
+                <a:solidFill>
+                  <a:srgbClr val="008000"/>
+                </a:solidFill>
+                <a:latin typeface="Cascadia Mono" panose="020B0609020000020004" pitchFamily="49" charset="0"/>
+              </a:rPr>
+              <a:t>꺼낼 때 뒤집어야</a:t>
+            </a:r>
+            <a:r>
+              <a:rPr lang="en-US" altLang="ko-KR" sz="1200" dirty="0">
+                <a:solidFill>
+                  <a:srgbClr val="008000"/>
+                </a:solidFill>
+                <a:latin typeface="Cascadia Mono" panose="020B0609020000020004" pitchFamily="49" charset="0"/>
+              </a:rPr>
+              <a:t>..</a:t>
+            </a:r>
+            <a:endParaRPr lang="ko-KR" altLang="en-US" sz="1200" dirty="0">
+              <a:solidFill>
+                <a:srgbClr val="000000"/>
+              </a:solidFill>
+              <a:latin typeface="Cascadia Mono" panose="020B0609020000020004" pitchFamily="49" charset="0"/>
+            </a:endParaRPr>
+          </a:p>
+          <a:p>
+            <a:r>
+              <a:rPr lang="en-US" altLang="ko-KR" sz="1200" dirty="0">
+                <a:solidFill>
+                  <a:srgbClr val="000000"/>
+                </a:solidFill>
+                <a:latin typeface="Cascadia Mono" panose="020B0609020000020004" pitchFamily="49" charset="0"/>
+              </a:rPr>
+              <a:t>    Y: int }</a:t>
+            </a:r>
+            <a:endParaRPr lang="ko-KR" altLang="en-US" sz="1200" dirty="0"/>
           </a:p>
         </p:txBody>
       </p:sp>
     </p:spTree>
     <p:extLst>
       <p:ext uri="{BB962C8B-B14F-4D97-AF65-F5344CB8AC3E}">
-        <p14:creationId xmlns:p14="http://schemas.microsoft.com/office/powerpoint/2010/main" val="3683248096"/>
+        <p14:creationId xmlns:p14="http://schemas.microsoft.com/office/powerpoint/2010/main" val="797562304"/>
       </p:ext>
     </p:extLst>
   </p:cSld>

</xml_diff>

<commit_message>
- XGI PLC : Xml return type 수정 중: BlockSummarizedXmlElements type 추가
</commit_message>
<xml_diff>
--- a/DsDotNet/src/PLC/PLC.CodeGen.LSXGI/Documents/XgiLadder.pptx
+++ b/DsDotNet/src/PLC/PLC.CodeGen.LSXGI/Documents/XgiLadder.pptx
@@ -8465,6 +8465,17 @@
 <file path=ppt/slides/slide8.xml><?xml version="1.0" encoding="utf-8"?>
 <p:sld xmlns:a="http://schemas.openxmlformats.org/drawingml/2006/main" xmlns:r="http://schemas.openxmlformats.org/officeDocument/2006/relationships" xmlns:p="http://schemas.openxmlformats.org/presentationml/2006/main">
   <p:cSld>
+    <p:bg>
+      <p:bgPr>
+        <a:solidFill>
+          <a:schemeClr val="accent6">
+            <a:lumMod val="20000"/>
+            <a:lumOff val="80000"/>
+          </a:schemeClr>
+        </a:solidFill>
+        <a:effectLst/>
+      </p:bgPr>
+    </p:bg>
     <p:spTree>
       <p:nvGrpSpPr>
         <p:cNvPr id="1" name=""/>
@@ -9400,7 +9411,7 @@
         <p:spPr>
           <a:xfrm>
             <a:off x="2458871" y="3525585"/>
-            <a:ext cx="4403770" cy="276999"/>
+            <a:ext cx="3865161" cy="276999"/>
           </a:xfrm>
           <a:prstGeom prst="rect">
             <a:avLst/>
@@ -9449,7 +9460,7 @@
                 </a:solidFill>
                 <a:latin typeface="Cascadia Mono" panose="020B0609020000020004" pitchFamily="49" charset="0"/>
               </a:rPr>
-              <a:t>CoordinatedRungXmlsForCommand</a:t>
+              <a:t>[CoordinatedXmlElement]</a:t>
             </a:r>
             <a:endParaRPr lang="ko-KR" altLang="en-US" sz="1200" dirty="0">
               <a:solidFill>
@@ -9474,7 +9485,7 @@
         <p:spPr>
           <a:xfrm>
             <a:off x="2122338" y="3133434"/>
-            <a:ext cx="3775393" cy="276999"/>
+            <a:ext cx="3416320" cy="276999"/>
           </a:xfrm>
           <a:prstGeom prst="rect">
             <a:avLst/>
@@ -9503,7 +9514,7 @@
                 </a:solidFill>
                 <a:latin typeface="Cascadia Mono" panose="020B0609020000020004" pitchFamily="49" charset="0"/>
               </a:rPr>
-              <a:t>int*[CoordinatedXmlElement]</a:t>
+              <a:t>[CoordinatedXmlElement]</a:t>
             </a:r>
             <a:endParaRPr lang="ko-KR" altLang="en-US" sz="1200" dirty="0">
               <a:solidFill>
@@ -10018,7 +10029,7 @@
         <p:spPr>
           <a:xfrm>
             <a:off x="2122337" y="2483968"/>
-            <a:ext cx="2069797" cy="276999"/>
+            <a:ext cx="4044697" cy="276999"/>
           </a:xfrm>
           <a:prstGeom prst="rect">
             <a:avLst/>
@@ -10038,16 +10049,16 @@
                 </a:solidFill>
                 <a:latin typeface="Cascadia Mono" panose="020B0609020000020004" pitchFamily="49" charset="0"/>
               </a:rPr>
-              <a:t>rng: </a:t>
-            </a:r>
-            <a:r>
-              <a:rPr lang="en-US" altLang="ko-KR" sz="1200" dirty="0">
+              <a:t>drawLadderBlock: </a:t>
+            </a:r>
+            <a:r>
+              <a:rPr lang="en-US" altLang="ko-KR" sz="1200">
                 <a:solidFill>
                   <a:srgbClr val="00B050"/>
                 </a:solidFill>
                 <a:latin typeface="Cascadia Mono" panose="020B0609020000020004" pitchFamily="49" charset="0"/>
               </a:rPr>
-              <a:t>RungInfoWithScan</a:t>
+              <a:t>BlockSummarizedXmlElements</a:t>
             </a:r>
             <a:endParaRPr lang="ko-KR" altLang="en-US" sz="1200" dirty="0">
               <a:solidFill>
@@ -10293,10 +10304,17 @@
                 </a:solidFill>
                 <a:latin typeface="Cascadia Mono" panose="020B0609020000020004" pitchFamily="49" charset="0"/>
               </a:rPr>
-              <a:t> CoordinatedRungXmlsForCommand = {</a:t>
-            </a:r>
-          </a:p>
-          <a:p>
+              <a:t> </a:t>
+            </a:r>
+            <a:r>
+              <a:rPr lang="en-US" altLang="ko-KR" sz="1200" dirty="0" err="1">
+                <a:solidFill>
+                  <a:srgbClr val="000000"/>
+                </a:solidFill>
+                <a:latin typeface="Cascadia Mono" panose="020B0609020000020004" pitchFamily="49" charset="0"/>
+              </a:rPr>
+              <a:t>BlockSummarizedXmlElements</a:t>
+            </a:r>
             <a:r>
               <a:rPr lang="en-US" altLang="ko-KR" sz="1200" dirty="0">
                 <a:solidFill>
@@ -10304,7 +10322,7 @@
                 </a:solidFill>
                 <a:latin typeface="Cascadia Mono" panose="020B0609020000020004" pitchFamily="49" charset="0"/>
               </a:rPr>
-              <a:t>    SpanY: int</a:t>
+              <a:t> = {</a:t>
             </a:r>
           </a:p>
           <a:p>
@@ -10315,7 +10333,83 @@
                 </a:solidFill>
                 <a:latin typeface="Cascadia Mono" panose="020B0609020000020004" pitchFamily="49" charset="0"/>
               </a:rPr>
-              <a:t>    PositionedRungXmls: CoordinatedXmlElement list</a:t>
+              <a:t>    </a:t>
+            </a:r>
+            <a:r>
+              <a:rPr lang="en-US" altLang="ko-KR" sz="1200" dirty="0" err="1">
+                <a:solidFill>
+                  <a:srgbClr val="000000"/>
+                </a:solidFill>
+                <a:latin typeface="Cascadia Mono" panose="020B0609020000020004" pitchFamily="49" charset="0"/>
+              </a:rPr>
+              <a:t>TotalSpanX</a:t>
+            </a:r>
+            <a:r>
+              <a:rPr lang="en-US" altLang="ko-KR" sz="1200" dirty="0">
+                <a:solidFill>
+                  <a:srgbClr val="000000"/>
+                </a:solidFill>
+                <a:latin typeface="Cascadia Mono" panose="020B0609020000020004" pitchFamily="49" charset="0"/>
+              </a:rPr>
+              <a:t>: int</a:t>
+            </a:r>
+          </a:p>
+          <a:p>
+            <a:r>
+              <a:rPr lang="en-US" altLang="ko-KR" sz="1200" dirty="0">
+                <a:solidFill>
+                  <a:srgbClr val="000000"/>
+                </a:solidFill>
+                <a:latin typeface="Cascadia Mono" panose="020B0609020000020004" pitchFamily="49" charset="0"/>
+              </a:rPr>
+              <a:t>    </a:t>
+            </a:r>
+            <a:r>
+              <a:rPr lang="en-US" altLang="ko-KR" sz="1200" dirty="0" err="1">
+                <a:solidFill>
+                  <a:srgbClr val="000000"/>
+                </a:solidFill>
+                <a:latin typeface="Cascadia Mono" panose="020B0609020000020004" pitchFamily="49" charset="0"/>
+              </a:rPr>
+              <a:t>TotalSpanY</a:t>
+            </a:r>
+            <a:r>
+              <a:rPr lang="en-US" altLang="ko-KR" sz="1200" dirty="0">
+                <a:solidFill>
+                  <a:srgbClr val="000000"/>
+                </a:solidFill>
+                <a:latin typeface="Cascadia Mono" panose="020B0609020000020004" pitchFamily="49" charset="0"/>
+              </a:rPr>
+              <a:t>: int</a:t>
+            </a:r>
+          </a:p>
+          <a:p>
+            <a:r>
+              <a:rPr lang="en-US" altLang="ko-KR" sz="1200" dirty="0">
+                <a:solidFill>
+                  <a:srgbClr val="000000"/>
+                </a:solidFill>
+                <a:latin typeface="Cascadia Mono" panose="020B0609020000020004" pitchFamily="49" charset="0"/>
+              </a:rPr>
+              <a:t>    </a:t>
+            </a:r>
+            <a:r>
+              <a:rPr lang="en-US" altLang="ko-KR" sz="1200" dirty="0" err="1">
+                <a:solidFill>
+                  <a:srgbClr val="000000"/>
+                </a:solidFill>
+                <a:latin typeface="Cascadia Mono" panose="020B0609020000020004" pitchFamily="49" charset="0"/>
+              </a:rPr>
+              <a:t>XmlElements</a:t>
+            </a:r>
+            <a:r>
+              <a:rPr lang="en-US" altLang="ko-KR" sz="1200" dirty="0">
+                <a:solidFill>
+                  <a:srgbClr val="000000"/>
+                </a:solidFill>
+                <a:latin typeface="Cascadia Mono" panose="020B0609020000020004" pitchFamily="49" charset="0"/>
+              </a:rPr>
+              <a:t>: CoordinatedXmlElement list</a:t>
             </a:r>
           </a:p>
           <a:p>

</xml_diff>

<commit_message>
- XGI PLC : added CollectStorages() method for Expression, Statement, ActionStatement
</commit_message>
<xml_diff>
--- a/DsDotNet/src/PLC/PLC.CodeGen.LSXGI/Documents/XgiLadder.pptx
+++ b/DsDotNet/src/PLC/PLC.CodeGen.LSXGI/Documents/XgiLadder.pptx
@@ -274,7 +274,7 @@
           <a:p>
             <a:fld id="{A371AD95-3711-4947-8024-9511B852D977}" type="datetimeFigureOut">
               <a:rPr lang="ko-KR" altLang="en-US" smtClean="0"/>
-              <a:t>2023-01-13</a:t>
+              <a:t>2023-01-27</a:t>
             </a:fld>
             <a:endParaRPr lang="ko-KR" altLang="en-US" dirty="0"/>
           </a:p>
@@ -472,7 +472,7 @@
           <a:p>
             <a:fld id="{A371AD95-3711-4947-8024-9511B852D977}" type="datetimeFigureOut">
               <a:rPr lang="ko-KR" altLang="en-US" smtClean="0"/>
-              <a:t>2023-01-13</a:t>
+              <a:t>2023-01-27</a:t>
             </a:fld>
             <a:endParaRPr lang="ko-KR" altLang="en-US" dirty="0"/>
           </a:p>
@@ -680,7 +680,7 @@
           <a:p>
             <a:fld id="{A371AD95-3711-4947-8024-9511B852D977}" type="datetimeFigureOut">
               <a:rPr lang="ko-KR" altLang="en-US" smtClean="0"/>
-              <a:t>2023-01-13</a:t>
+              <a:t>2023-01-27</a:t>
             </a:fld>
             <a:endParaRPr lang="ko-KR" altLang="en-US" dirty="0"/>
           </a:p>
@@ -878,7 +878,7 @@
           <a:p>
             <a:fld id="{A371AD95-3711-4947-8024-9511B852D977}" type="datetimeFigureOut">
               <a:rPr lang="ko-KR" altLang="en-US" smtClean="0"/>
-              <a:t>2023-01-13</a:t>
+              <a:t>2023-01-27</a:t>
             </a:fld>
             <a:endParaRPr lang="ko-KR" altLang="en-US" dirty="0"/>
           </a:p>
@@ -1153,7 +1153,7 @@
           <a:p>
             <a:fld id="{A371AD95-3711-4947-8024-9511B852D977}" type="datetimeFigureOut">
               <a:rPr lang="ko-KR" altLang="en-US" smtClean="0"/>
-              <a:t>2023-01-13</a:t>
+              <a:t>2023-01-27</a:t>
             </a:fld>
             <a:endParaRPr lang="ko-KR" altLang="en-US" dirty="0"/>
           </a:p>
@@ -1418,7 +1418,7 @@
           <a:p>
             <a:fld id="{A371AD95-3711-4947-8024-9511B852D977}" type="datetimeFigureOut">
               <a:rPr lang="ko-KR" altLang="en-US" smtClean="0"/>
-              <a:t>2023-01-13</a:t>
+              <a:t>2023-01-27</a:t>
             </a:fld>
             <a:endParaRPr lang="ko-KR" altLang="en-US" dirty="0"/>
           </a:p>
@@ -1830,7 +1830,7 @@
           <a:p>
             <a:fld id="{A371AD95-3711-4947-8024-9511B852D977}" type="datetimeFigureOut">
               <a:rPr lang="ko-KR" altLang="en-US" smtClean="0"/>
-              <a:t>2023-01-13</a:t>
+              <a:t>2023-01-27</a:t>
             </a:fld>
             <a:endParaRPr lang="ko-KR" altLang="en-US" dirty="0"/>
           </a:p>
@@ -1971,7 +1971,7 @@
           <a:p>
             <a:fld id="{A371AD95-3711-4947-8024-9511B852D977}" type="datetimeFigureOut">
               <a:rPr lang="ko-KR" altLang="en-US" smtClean="0"/>
-              <a:t>2023-01-13</a:t>
+              <a:t>2023-01-27</a:t>
             </a:fld>
             <a:endParaRPr lang="ko-KR" altLang="en-US" dirty="0"/>
           </a:p>
@@ -2084,7 +2084,7 @@
           <a:p>
             <a:fld id="{A371AD95-3711-4947-8024-9511B852D977}" type="datetimeFigureOut">
               <a:rPr lang="ko-KR" altLang="en-US" smtClean="0"/>
-              <a:t>2023-01-13</a:t>
+              <a:t>2023-01-27</a:t>
             </a:fld>
             <a:endParaRPr lang="ko-KR" altLang="en-US" dirty="0"/>
           </a:p>
@@ -2395,7 +2395,7 @@
           <a:p>
             <a:fld id="{A371AD95-3711-4947-8024-9511B852D977}" type="datetimeFigureOut">
               <a:rPr lang="ko-KR" altLang="en-US" smtClean="0"/>
-              <a:t>2023-01-13</a:t>
+              <a:t>2023-01-27</a:t>
             </a:fld>
             <a:endParaRPr lang="ko-KR" altLang="en-US" dirty="0"/>
           </a:p>
@@ -2683,7 +2683,7 @@
           <a:p>
             <a:fld id="{A371AD95-3711-4947-8024-9511B852D977}" type="datetimeFigureOut">
               <a:rPr lang="ko-KR" altLang="en-US" smtClean="0"/>
-              <a:t>2023-01-13</a:t>
+              <a:t>2023-01-27</a:t>
             </a:fld>
             <a:endParaRPr lang="ko-KR" altLang="en-US" dirty="0"/>
           </a:p>
@@ -2924,7 +2924,7 @@
           <a:p>
             <a:fld id="{A371AD95-3711-4947-8024-9511B852D977}" type="datetimeFigureOut">
               <a:rPr lang="ko-KR" altLang="en-US" smtClean="0"/>
-              <a:t>2023-01-13</a:t>
+              <a:t>2023-01-27</a:t>
             </a:fld>
             <a:endParaRPr lang="ko-KR" altLang="en-US" dirty="0"/>
           </a:p>
@@ -3455,7 +3455,7 @@
         </p:nvSpPr>
         <p:spPr>
           <a:xfrm>
-            <a:off x="1727963" y="3423988"/>
+            <a:off x="1727963" y="4328338"/>
             <a:ext cx="3348994" cy="246221"/>
           </a:xfrm>
           <a:prstGeom prst="rect">
@@ -3529,7 +3529,7 @@
         </p:nvSpPr>
         <p:spPr>
           <a:xfrm>
-            <a:off x="1520739" y="3114962"/>
+            <a:off x="1520739" y="4019312"/>
             <a:ext cx="3122971" cy="246221"/>
           </a:xfrm>
           <a:prstGeom prst="rect">
@@ -3583,7 +3583,7 @@
         </p:nvSpPr>
         <p:spPr>
           <a:xfrm>
-            <a:off x="1174679" y="2220073"/>
+            <a:off x="1174679" y="3124423"/>
             <a:ext cx="2218877" cy="246221"/>
           </a:xfrm>
           <a:prstGeom prst="rect">
@@ -3637,7 +3637,7 @@
         </p:nvSpPr>
         <p:spPr>
           <a:xfrm>
-            <a:off x="904264" y="1844537"/>
+            <a:off x="904264" y="2748887"/>
             <a:ext cx="2218877" cy="246221"/>
           </a:xfrm>
           <a:prstGeom prst="rect">
@@ -3691,7 +3691,7 @@
         </p:nvSpPr>
         <p:spPr>
           <a:xfrm>
-            <a:off x="628206" y="1498142"/>
+            <a:off x="628206" y="2402492"/>
             <a:ext cx="1164101" cy="246221"/>
           </a:xfrm>
           <a:prstGeom prst="rect">
@@ -3733,7 +3733,7 @@
         <p:spPr>
           <a:xfrm>
             <a:off x="0" y="373282"/>
-            <a:ext cx="1013419" cy="246221"/>
+            <a:ext cx="2821606" cy="246221"/>
           </a:xfrm>
           <a:prstGeom prst="rect">
             <a:avLst/>
@@ -3753,7 +3753,7 @@
                 </a:solidFill>
                 <a:latin typeface="Cascadia Mono" panose="020B0609020000020004" pitchFamily="49" charset="0"/>
               </a:rPr>
-              <a:t>generateXml</a:t>
+              <a:t>XgiProjectParams.GenerateXmlString</a:t>
             </a:r>
             <a:endParaRPr lang="ko-KR" altLang="en-US" sz="1000" b="1" dirty="0"/>
           </a:p>
@@ -3773,7 +3773,7 @@
         </p:nvSpPr>
         <p:spPr>
           <a:xfrm>
-            <a:off x="320772" y="1167701"/>
+            <a:off x="320772" y="2072051"/>
             <a:ext cx="2218877" cy="246221"/>
           </a:xfrm>
           <a:prstGeom prst="rect">
@@ -3814,7 +3814,7 @@
         </p:nvSpPr>
         <p:spPr>
           <a:xfrm>
-            <a:off x="1445081" y="5531704"/>
+            <a:off x="1445081" y="6436054"/>
             <a:ext cx="2896947" cy="246221"/>
           </a:xfrm>
           <a:prstGeom prst="rect">
@@ -3868,7 +3868,7 @@
         </p:nvSpPr>
         <p:spPr>
           <a:xfrm>
-            <a:off x="1520738" y="2658003"/>
+            <a:off x="1520738" y="3562353"/>
             <a:ext cx="3424335" cy="246221"/>
           </a:xfrm>
           <a:prstGeom prst="rect">
@@ -4460,7 +4460,7 @@
         </p:nvSpPr>
         <p:spPr>
           <a:xfrm>
-            <a:off x="1734740" y="3692880"/>
+            <a:off x="1734740" y="4597230"/>
             <a:ext cx="1088760" cy="246221"/>
           </a:xfrm>
           <a:prstGeom prst="rect">
@@ -4505,7 +4505,7 @@
         </p:nvSpPr>
         <p:spPr>
           <a:xfrm>
-            <a:off x="1727963" y="3955955"/>
+            <a:off x="1727963" y="4860305"/>
             <a:ext cx="938077" cy="246221"/>
           </a:xfrm>
           <a:prstGeom prst="rect">
@@ -4550,7 +4550,7 @@
         </p:nvSpPr>
         <p:spPr>
           <a:xfrm>
-            <a:off x="1710576" y="4223932"/>
+            <a:off x="1710576" y="5128282"/>
             <a:ext cx="1842171" cy="246221"/>
           </a:xfrm>
           <a:prstGeom prst="rect">
@@ -4595,7 +4595,7 @@
         </p:nvSpPr>
         <p:spPr>
           <a:xfrm>
-            <a:off x="1734740" y="4457196"/>
+            <a:off x="1734740" y="5361546"/>
             <a:ext cx="1992853" cy="246221"/>
           </a:xfrm>
           <a:prstGeom prst="rect">
@@ -4640,7 +4640,7 @@
         </p:nvSpPr>
         <p:spPr>
           <a:xfrm>
-            <a:off x="2096377" y="4778305"/>
+            <a:off x="2096377" y="5682655"/>
             <a:ext cx="4705134" cy="246221"/>
           </a:xfrm>
           <a:prstGeom prst="rect">
@@ -4714,7 +4714,7 @@
         </p:nvSpPr>
         <p:spPr>
           <a:xfrm>
-            <a:off x="2491678" y="5039937"/>
+            <a:off x="2491678" y="5944287"/>
             <a:ext cx="3348994" cy="246221"/>
           </a:xfrm>
           <a:prstGeom prst="rect">
@@ -4828,7 +4828,7 @@
         </p:nvSpPr>
         <p:spPr>
           <a:xfrm>
-            <a:off x="312398" y="857878"/>
+            <a:off x="312398" y="1762228"/>
             <a:ext cx="3273653" cy="246221"/>
           </a:xfrm>
           <a:prstGeom prst="rect">
@@ -4852,6 +4852,53 @@
               <a:t>commentedStatement2CommentedXgiStatements</a:t>
             </a:r>
             <a:endParaRPr lang="ko-KR" altLang="en-US" sz="1000" dirty="0"/>
+          </a:p>
+        </p:txBody>
+      </p:sp>
+      <p:sp>
+        <p:nvSpPr>
+          <p:cNvPr id="3" name="TextBox 2">
+            <a:extLst>
+              <a:ext uri="{FF2B5EF4-FFF2-40B4-BE49-F238E27FC236}">
+                <a16:creationId xmlns:a16="http://schemas.microsoft.com/office/drawing/2014/main" id="{97C774A0-0786-B8AF-DB82-9C229447AE5A}"/>
+              </a:ext>
+            </a:extLst>
+          </p:cNvPr>
+          <p:cNvSpPr txBox="1"/>
+          <p:nvPr/>
+        </p:nvSpPr>
+        <p:spPr>
+          <a:xfrm>
+            <a:off x="245431" y="662939"/>
+            <a:ext cx="2294218" cy="246221"/>
+          </a:xfrm>
+          <a:prstGeom prst="rect">
+            <a:avLst/>
+          </a:prstGeom>
+          <a:noFill/>
+        </p:spPr>
+        <p:txBody>
+          <a:bodyPr wrap="none" rtlCol="0">
+            <a:spAutoFit/>
+          </a:bodyPr>
+          <a:lstStyle>
+            <a:defPPr>
+              <a:defRPr lang="ko-KR"/>
+            </a:defPPr>
+            <a:lvl1pPr>
+              <a:defRPr sz="1000">
+                <a:solidFill>
+                  <a:srgbClr val="000000"/>
+                </a:solidFill>
+                <a:latin typeface="Cascadia Mono" panose="020B0609020000020004" pitchFamily="49" charset="0"/>
+              </a:defRPr>
+            </a:lvl1pPr>
+          </a:lstStyle>
+          <a:p>
+            <a:r>
+              <a:rPr lang="ko-KR" altLang="en-US" dirty="0"/>
+              <a:t>XgiPOUParams.GenerateXmlNode</a:t>
+            </a:r>
           </a:p>
         </p:txBody>
       </p:sp>
@@ -4948,7 +4995,7 @@
               <a:t>commentedStatement2CommentedXgiStatements: </a:t>
             </a:r>
             <a:r>
-              <a:rPr lang="en-US" altLang="ko-KR" sz="1000" dirty="0" err="1">
+              <a:rPr lang="en-US" altLang="ko-KR" sz="1000" dirty="0">
                 <a:solidFill>
                   <a:srgbClr val="00B050"/>
                 </a:solidFill>
@@ -5088,25 +5135,16 @@
           <a:lstStyle/>
           <a:p>
             <a:r>
-              <a:rPr lang="en-US" altLang="ko-KR" sz="1000" dirty="0" err="1">
+              <a:rPr lang="en-US" altLang="ko-KR" sz="1000" dirty="0">
                 <a:solidFill>
                   <a:srgbClr val="000000"/>
                 </a:solidFill>
                 <a:latin typeface="Cascadia Mono" panose="020B0609020000020004" pitchFamily="49" charset="0"/>
               </a:rPr>
-              <a:t>mergeArithmaticOperator</a:t>
+              <a:t>mergeArithmaticOperator: </a:t>
             </a:r>
             <a:r>
               <a:rPr lang="en-US" altLang="ko-KR" sz="1000" dirty="0">
-                <a:solidFill>
-                  <a:srgbClr val="000000"/>
-                </a:solidFill>
-                <a:latin typeface="Cascadia Mono" panose="020B0609020000020004" pitchFamily="49" charset="0"/>
-              </a:rPr>
-              <a:t>: </a:t>
-            </a:r>
-            <a:r>
-              <a:rPr lang="en-US" altLang="ko-KR" sz="1000" dirty="0" err="1">
                 <a:solidFill>
                   <a:srgbClr val="00B050"/>
                 </a:solidFill>
@@ -11767,7 +11805,7 @@
           <a:lstStyle/>
           <a:p>
             <a:r>
-              <a:rPr lang="ko-KR" altLang="en-US" dirty="0" err="1"/>
+              <a:rPr lang="ko-KR" altLang="en-US" dirty="0"/>
               <a:t>O</a:t>
             </a:r>
             <a:r>
@@ -13050,7 +13088,7 @@
           <a:lstStyle/>
           <a:p>
             <a:r>
-              <a:rPr lang="ko-KR" altLang="en-US" sz="4000" dirty="0" err="1"/>
+              <a:rPr lang="ko-KR" altLang="en-US" sz="4000" dirty="0"/>
               <a:t>O</a:t>
             </a:r>
             <a:r>

</xml_diff>